<commit_message>
docs: presentation add qr
</commit_message>
<xml_diff>
--- a/docs/Oopps! Trap!.pptx
+++ b/docs/Oopps! Trap!.pptx
@@ -7,7 +7,7 @@
   <p:sldIdLst>
     <p:sldId id="256" r:id="rId2"/>
     <p:sldId id="258" r:id="rId3"/>
-    <p:sldId id="259" r:id="rId4"/>
+    <p:sldId id="265" r:id="rId4"/>
     <p:sldId id="262" r:id="rId5"/>
     <p:sldId id="264" r:id="rId6"/>
   </p:sldIdLst>
@@ -9019,7 +9019,7 @@
         <p:cNvPr id="1" name="">
           <a:extLst>
             <a:ext uri="{FF2B5EF4-FFF2-40B4-BE49-F238E27FC236}">
-              <a16:creationId xmlns:a16="http://schemas.microsoft.com/office/drawing/2014/main" id="{978024E2-3B83-E574-64AD-2F14425C89F9}"/>
+              <a16:creationId xmlns:a16="http://schemas.microsoft.com/office/drawing/2014/main" id="{84429787-8454-36BA-7097-B6FA45B07871}"/>
             </a:ext>
           </a:extLst>
         </p:cNvPr>
@@ -9034,12 +9034,654 @@
           <a:chExt cx="0" cy="0"/>
         </a:xfrm>
       </p:grpSpPr>
+      <p:sp>
+        <p:nvSpPr>
+          <p:cNvPr id="41" name="Rectangle 40">
+            <a:extLst>
+              <a:ext uri="{FF2B5EF4-FFF2-40B4-BE49-F238E27FC236}">
+                <a16:creationId xmlns:a16="http://schemas.microsoft.com/office/drawing/2014/main" id="{EBDD1931-9E86-4402-9A68-33A2D9EFB198}"/>
+              </a:ext>
+              <a:ext uri="{C183D7F6-B498-43B3-948B-1728B52AA6E4}">
+                <adec:decorative xmlns:adec="http://schemas.microsoft.com/office/drawing/2017/decorative" val="1"/>
+              </a:ext>
+            </a:extLst>
+          </p:cNvPr>
+          <p:cNvSpPr>
+            <a:spLocks noGrp="1" noRot="1" noChangeAspect="1" noMove="1" noResize="1" noEditPoints="1" noAdjustHandles="1" noChangeArrowheads="1" noChangeShapeType="1" noTextEdit="1"/>
+          </p:cNvSpPr>
+          <p:nvPr>
+            <p:extLst>
+              <p:ext uri="{386F3935-93C4-4BCD-93E2-E3B085C9AB24}">
+                <p16:designElem xmlns:p16="http://schemas.microsoft.com/office/powerpoint/2015/main" val="1"/>
+              </p:ext>
+            </p:extLst>
+          </p:nvPr>
+        </p:nvSpPr>
+        <p:spPr>
+          <a:xfrm>
+            <a:off x="838199" y="1709928"/>
+            <a:ext cx="10515600" cy="27432"/>
+          </a:xfrm>
+          <a:custGeom>
+            <a:avLst/>
+            <a:gdLst>
+              <a:gd name="connsiteX0" fmla="*/ 0 w 10515600"/>
+              <a:gd name="connsiteY0" fmla="*/ 0 h 27432"/>
+              <a:gd name="connsiteX1" fmla="*/ 446913 w 10515600"/>
+              <a:gd name="connsiteY1" fmla="*/ 0 h 27432"/>
+              <a:gd name="connsiteX2" fmla="*/ 1104138 w 10515600"/>
+              <a:gd name="connsiteY2" fmla="*/ 0 h 27432"/>
+              <a:gd name="connsiteX3" fmla="*/ 1866519 w 10515600"/>
+              <a:gd name="connsiteY3" fmla="*/ 0 h 27432"/>
+              <a:gd name="connsiteX4" fmla="*/ 2208276 w 10515600"/>
+              <a:gd name="connsiteY4" fmla="*/ 0 h 27432"/>
+              <a:gd name="connsiteX5" fmla="*/ 2550033 w 10515600"/>
+              <a:gd name="connsiteY5" fmla="*/ 0 h 27432"/>
+              <a:gd name="connsiteX6" fmla="*/ 3417570 w 10515600"/>
+              <a:gd name="connsiteY6" fmla="*/ 0 h 27432"/>
+              <a:gd name="connsiteX7" fmla="*/ 4074795 w 10515600"/>
+              <a:gd name="connsiteY7" fmla="*/ 0 h 27432"/>
+              <a:gd name="connsiteX8" fmla="*/ 4416552 w 10515600"/>
+              <a:gd name="connsiteY8" fmla="*/ 0 h 27432"/>
+              <a:gd name="connsiteX9" fmla="*/ 5073777 w 10515600"/>
+              <a:gd name="connsiteY9" fmla="*/ 0 h 27432"/>
+              <a:gd name="connsiteX10" fmla="*/ 5941314 w 10515600"/>
+              <a:gd name="connsiteY10" fmla="*/ 0 h 27432"/>
+              <a:gd name="connsiteX11" fmla="*/ 6493383 w 10515600"/>
+              <a:gd name="connsiteY11" fmla="*/ 0 h 27432"/>
+              <a:gd name="connsiteX12" fmla="*/ 7045452 w 10515600"/>
+              <a:gd name="connsiteY12" fmla="*/ 0 h 27432"/>
+              <a:gd name="connsiteX13" fmla="*/ 7702677 w 10515600"/>
+              <a:gd name="connsiteY13" fmla="*/ 0 h 27432"/>
+              <a:gd name="connsiteX14" fmla="*/ 8465058 w 10515600"/>
+              <a:gd name="connsiteY14" fmla="*/ 0 h 27432"/>
+              <a:gd name="connsiteX15" fmla="*/ 9227439 w 10515600"/>
+              <a:gd name="connsiteY15" fmla="*/ 0 h 27432"/>
+              <a:gd name="connsiteX16" fmla="*/ 10515600 w 10515600"/>
+              <a:gd name="connsiteY16" fmla="*/ 0 h 27432"/>
+              <a:gd name="connsiteX17" fmla="*/ 10515600 w 10515600"/>
+              <a:gd name="connsiteY17" fmla="*/ 27432 h 27432"/>
+              <a:gd name="connsiteX18" fmla="*/ 10068687 w 10515600"/>
+              <a:gd name="connsiteY18" fmla="*/ 27432 h 27432"/>
+              <a:gd name="connsiteX19" fmla="*/ 9201150 w 10515600"/>
+              <a:gd name="connsiteY19" fmla="*/ 27432 h 27432"/>
+              <a:gd name="connsiteX20" fmla="*/ 8543925 w 10515600"/>
+              <a:gd name="connsiteY20" fmla="*/ 27432 h 27432"/>
+              <a:gd name="connsiteX21" fmla="*/ 8202168 w 10515600"/>
+              <a:gd name="connsiteY21" fmla="*/ 27432 h 27432"/>
+              <a:gd name="connsiteX22" fmla="*/ 7544943 w 10515600"/>
+              <a:gd name="connsiteY22" fmla="*/ 27432 h 27432"/>
+              <a:gd name="connsiteX23" fmla="*/ 6992874 w 10515600"/>
+              <a:gd name="connsiteY23" fmla="*/ 27432 h 27432"/>
+              <a:gd name="connsiteX24" fmla="*/ 6440805 w 10515600"/>
+              <a:gd name="connsiteY24" fmla="*/ 27432 h 27432"/>
+              <a:gd name="connsiteX25" fmla="*/ 5888736 w 10515600"/>
+              <a:gd name="connsiteY25" fmla="*/ 27432 h 27432"/>
+              <a:gd name="connsiteX26" fmla="*/ 5336667 w 10515600"/>
+              <a:gd name="connsiteY26" fmla="*/ 27432 h 27432"/>
+              <a:gd name="connsiteX27" fmla="*/ 4574286 w 10515600"/>
+              <a:gd name="connsiteY27" fmla="*/ 27432 h 27432"/>
+              <a:gd name="connsiteX28" fmla="*/ 3917061 w 10515600"/>
+              <a:gd name="connsiteY28" fmla="*/ 27432 h 27432"/>
+              <a:gd name="connsiteX29" fmla="*/ 3575304 w 10515600"/>
+              <a:gd name="connsiteY29" fmla="*/ 27432 h 27432"/>
+              <a:gd name="connsiteX30" fmla="*/ 3023235 w 10515600"/>
+              <a:gd name="connsiteY30" fmla="*/ 27432 h 27432"/>
+              <a:gd name="connsiteX31" fmla="*/ 2260854 w 10515600"/>
+              <a:gd name="connsiteY31" fmla="*/ 27432 h 27432"/>
+              <a:gd name="connsiteX32" fmla="*/ 1813941 w 10515600"/>
+              <a:gd name="connsiteY32" fmla="*/ 27432 h 27432"/>
+              <a:gd name="connsiteX33" fmla="*/ 946404 w 10515600"/>
+              <a:gd name="connsiteY33" fmla="*/ 27432 h 27432"/>
+              <a:gd name="connsiteX34" fmla="*/ 0 w 10515600"/>
+              <a:gd name="connsiteY34" fmla="*/ 27432 h 27432"/>
+              <a:gd name="connsiteX35" fmla="*/ 0 w 10515600"/>
+              <a:gd name="connsiteY35" fmla="*/ 0 h 27432"/>
+            </a:gdLst>
+            <a:ahLst/>
+            <a:cxnLst>
+              <a:cxn ang="0">
+                <a:pos x="connsiteX0" y="connsiteY0"/>
+              </a:cxn>
+              <a:cxn ang="0">
+                <a:pos x="connsiteX1" y="connsiteY1"/>
+              </a:cxn>
+              <a:cxn ang="0">
+                <a:pos x="connsiteX2" y="connsiteY2"/>
+              </a:cxn>
+              <a:cxn ang="0">
+                <a:pos x="connsiteX3" y="connsiteY3"/>
+              </a:cxn>
+              <a:cxn ang="0">
+                <a:pos x="connsiteX4" y="connsiteY4"/>
+              </a:cxn>
+              <a:cxn ang="0">
+                <a:pos x="connsiteX5" y="connsiteY5"/>
+              </a:cxn>
+              <a:cxn ang="0">
+                <a:pos x="connsiteX6" y="connsiteY6"/>
+              </a:cxn>
+              <a:cxn ang="0">
+                <a:pos x="connsiteX7" y="connsiteY7"/>
+              </a:cxn>
+              <a:cxn ang="0">
+                <a:pos x="connsiteX8" y="connsiteY8"/>
+              </a:cxn>
+              <a:cxn ang="0">
+                <a:pos x="connsiteX9" y="connsiteY9"/>
+              </a:cxn>
+              <a:cxn ang="0">
+                <a:pos x="connsiteX10" y="connsiteY10"/>
+              </a:cxn>
+              <a:cxn ang="0">
+                <a:pos x="connsiteX11" y="connsiteY11"/>
+              </a:cxn>
+              <a:cxn ang="0">
+                <a:pos x="connsiteX12" y="connsiteY12"/>
+              </a:cxn>
+              <a:cxn ang="0">
+                <a:pos x="connsiteX13" y="connsiteY13"/>
+              </a:cxn>
+              <a:cxn ang="0">
+                <a:pos x="connsiteX14" y="connsiteY14"/>
+              </a:cxn>
+              <a:cxn ang="0">
+                <a:pos x="connsiteX15" y="connsiteY15"/>
+              </a:cxn>
+              <a:cxn ang="0">
+                <a:pos x="connsiteX16" y="connsiteY16"/>
+              </a:cxn>
+              <a:cxn ang="0">
+                <a:pos x="connsiteX17" y="connsiteY17"/>
+              </a:cxn>
+              <a:cxn ang="0">
+                <a:pos x="connsiteX18" y="connsiteY18"/>
+              </a:cxn>
+              <a:cxn ang="0">
+                <a:pos x="connsiteX19" y="connsiteY19"/>
+              </a:cxn>
+              <a:cxn ang="0">
+                <a:pos x="connsiteX20" y="connsiteY20"/>
+              </a:cxn>
+              <a:cxn ang="0">
+                <a:pos x="connsiteX21" y="connsiteY21"/>
+              </a:cxn>
+              <a:cxn ang="0">
+                <a:pos x="connsiteX22" y="connsiteY22"/>
+              </a:cxn>
+              <a:cxn ang="0">
+                <a:pos x="connsiteX23" y="connsiteY23"/>
+              </a:cxn>
+              <a:cxn ang="0">
+                <a:pos x="connsiteX24" y="connsiteY24"/>
+              </a:cxn>
+              <a:cxn ang="0">
+                <a:pos x="connsiteX25" y="connsiteY25"/>
+              </a:cxn>
+              <a:cxn ang="0">
+                <a:pos x="connsiteX26" y="connsiteY26"/>
+              </a:cxn>
+              <a:cxn ang="0">
+                <a:pos x="connsiteX27" y="connsiteY27"/>
+              </a:cxn>
+              <a:cxn ang="0">
+                <a:pos x="connsiteX28" y="connsiteY28"/>
+              </a:cxn>
+              <a:cxn ang="0">
+                <a:pos x="connsiteX29" y="connsiteY29"/>
+              </a:cxn>
+              <a:cxn ang="0">
+                <a:pos x="connsiteX30" y="connsiteY30"/>
+              </a:cxn>
+              <a:cxn ang="0">
+                <a:pos x="connsiteX31" y="connsiteY31"/>
+              </a:cxn>
+              <a:cxn ang="0">
+                <a:pos x="connsiteX32" y="connsiteY32"/>
+              </a:cxn>
+              <a:cxn ang="0">
+                <a:pos x="connsiteX33" y="connsiteY33"/>
+              </a:cxn>
+              <a:cxn ang="0">
+                <a:pos x="connsiteX34" y="connsiteY34"/>
+              </a:cxn>
+              <a:cxn ang="0">
+                <a:pos x="connsiteX35" y="connsiteY35"/>
+              </a:cxn>
+            </a:cxnLst>
+            <a:rect l="l" t="t" r="r" b="b"/>
+            <a:pathLst>
+              <a:path w="10515600" h="27432" fill="none" extrusionOk="0">
+                <a:moveTo>
+                  <a:pt x="0" y="0"/>
+                </a:moveTo>
+                <a:cubicBezTo>
+                  <a:pt x="119693" y="-14343"/>
+                  <a:pt x="253007" y="-7583"/>
+                  <a:pt x="446913" y="0"/>
+                </a:cubicBezTo>
+                <a:cubicBezTo>
+                  <a:pt x="640819" y="7583"/>
+                  <a:pt x="841419" y="-7067"/>
+                  <a:pt x="1104138" y="0"/>
+                </a:cubicBezTo>
+                <a:cubicBezTo>
+                  <a:pt x="1366858" y="7067"/>
+                  <a:pt x="1495525" y="1255"/>
+                  <a:pt x="1866519" y="0"/>
+                </a:cubicBezTo>
+                <a:cubicBezTo>
+                  <a:pt x="2237513" y="-1255"/>
+                  <a:pt x="2043820" y="12003"/>
+                  <a:pt x="2208276" y="0"/>
+                </a:cubicBezTo>
+                <a:cubicBezTo>
+                  <a:pt x="2372732" y="-12003"/>
+                  <a:pt x="2419452" y="9887"/>
+                  <a:pt x="2550033" y="0"/>
+                </a:cubicBezTo>
+                <a:cubicBezTo>
+                  <a:pt x="2680614" y="-9887"/>
+                  <a:pt x="3098156" y="3827"/>
+                  <a:pt x="3417570" y="0"/>
+                </a:cubicBezTo>
+                <a:cubicBezTo>
+                  <a:pt x="3736984" y="-3827"/>
+                  <a:pt x="3916040" y="-6233"/>
+                  <a:pt x="4074795" y="0"/>
+                </a:cubicBezTo>
+                <a:cubicBezTo>
+                  <a:pt x="4233551" y="6233"/>
+                  <a:pt x="4279253" y="5661"/>
+                  <a:pt x="4416552" y="0"/>
+                </a:cubicBezTo>
+                <a:cubicBezTo>
+                  <a:pt x="4553851" y="-5661"/>
+                  <a:pt x="4915758" y="26022"/>
+                  <a:pt x="5073777" y="0"/>
+                </a:cubicBezTo>
+                <a:cubicBezTo>
+                  <a:pt x="5231797" y="-26022"/>
+                  <a:pt x="5612089" y="32230"/>
+                  <a:pt x="5941314" y="0"/>
+                </a:cubicBezTo>
+                <a:cubicBezTo>
+                  <a:pt x="6270539" y="-32230"/>
+                  <a:pt x="6313600" y="3064"/>
+                  <a:pt x="6493383" y="0"/>
+                </a:cubicBezTo>
+                <a:cubicBezTo>
+                  <a:pt x="6673166" y="-3064"/>
+                  <a:pt x="6902474" y="-21096"/>
+                  <a:pt x="7045452" y="0"/>
+                </a:cubicBezTo>
+                <a:cubicBezTo>
+                  <a:pt x="7188430" y="21096"/>
+                  <a:pt x="7478162" y="17386"/>
+                  <a:pt x="7702677" y="0"/>
+                </a:cubicBezTo>
+                <a:cubicBezTo>
+                  <a:pt x="7927192" y="-17386"/>
+                  <a:pt x="8295683" y="-35143"/>
+                  <a:pt x="8465058" y="0"/>
+                </a:cubicBezTo>
+                <a:cubicBezTo>
+                  <a:pt x="8634433" y="35143"/>
+                  <a:pt x="8927835" y="4103"/>
+                  <a:pt x="9227439" y="0"/>
+                </a:cubicBezTo>
+                <a:cubicBezTo>
+                  <a:pt x="9527043" y="-4103"/>
+                  <a:pt x="10105355" y="-17535"/>
+                  <a:pt x="10515600" y="0"/>
+                </a:cubicBezTo>
+                <a:cubicBezTo>
+                  <a:pt x="10515789" y="12323"/>
+                  <a:pt x="10515633" y="14639"/>
+                  <a:pt x="10515600" y="27432"/>
+                </a:cubicBezTo>
+                <a:cubicBezTo>
+                  <a:pt x="10343646" y="15282"/>
+                  <a:pt x="10223667" y="31057"/>
+                  <a:pt x="10068687" y="27432"/>
+                </a:cubicBezTo>
+                <a:cubicBezTo>
+                  <a:pt x="9913707" y="23807"/>
+                  <a:pt x="9512455" y="4101"/>
+                  <a:pt x="9201150" y="27432"/>
+                </a:cubicBezTo>
+                <a:cubicBezTo>
+                  <a:pt x="8889845" y="50763"/>
+                  <a:pt x="8866277" y="3158"/>
+                  <a:pt x="8543925" y="27432"/>
+                </a:cubicBezTo>
+                <a:cubicBezTo>
+                  <a:pt x="8221573" y="51706"/>
+                  <a:pt x="8288348" y="37286"/>
+                  <a:pt x="8202168" y="27432"/>
+                </a:cubicBezTo>
+                <a:cubicBezTo>
+                  <a:pt x="8115988" y="17578"/>
+                  <a:pt x="7797033" y="6631"/>
+                  <a:pt x="7544943" y="27432"/>
+                </a:cubicBezTo>
+                <a:cubicBezTo>
+                  <a:pt x="7292854" y="48233"/>
+                  <a:pt x="7108060" y="41767"/>
+                  <a:pt x="6992874" y="27432"/>
+                </a:cubicBezTo>
+                <a:cubicBezTo>
+                  <a:pt x="6877688" y="13097"/>
+                  <a:pt x="6668930" y="7947"/>
+                  <a:pt x="6440805" y="27432"/>
+                </a:cubicBezTo>
+                <a:cubicBezTo>
+                  <a:pt x="6212680" y="46917"/>
+                  <a:pt x="6027476" y="35225"/>
+                  <a:pt x="5888736" y="27432"/>
+                </a:cubicBezTo>
+                <a:cubicBezTo>
+                  <a:pt x="5749996" y="19639"/>
+                  <a:pt x="5574559" y="43627"/>
+                  <a:pt x="5336667" y="27432"/>
+                </a:cubicBezTo>
+                <a:cubicBezTo>
+                  <a:pt x="5098775" y="11237"/>
+                  <a:pt x="4837534" y="41882"/>
+                  <a:pt x="4574286" y="27432"/>
+                </a:cubicBezTo>
+                <a:cubicBezTo>
+                  <a:pt x="4311038" y="12982"/>
+                  <a:pt x="4126419" y="26678"/>
+                  <a:pt x="3917061" y="27432"/>
+                </a:cubicBezTo>
+                <a:cubicBezTo>
+                  <a:pt x="3707704" y="28186"/>
+                  <a:pt x="3657291" y="40087"/>
+                  <a:pt x="3575304" y="27432"/>
+                </a:cubicBezTo>
+                <a:cubicBezTo>
+                  <a:pt x="3493317" y="14777"/>
+                  <a:pt x="3185226" y="45867"/>
+                  <a:pt x="3023235" y="27432"/>
+                </a:cubicBezTo>
+                <a:cubicBezTo>
+                  <a:pt x="2861244" y="8997"/>
+                  <a:pt x="2597085" y="35801"/>
+                  <a:pt x="2260854" y="27432"/>
+                </a:cubicBezTo>
+                <a:cubicBezTo>
+                  <a:pt x="1924623" y="19063"/>
+                  <a:pt x="1996678" y="15705"/>
+                  <a:pt x="1813941" y="27432"/>
+                </a:cubicBezTo>
+                <a:cubicBezTo>
+                  <a:pt x="1631204" y="39159"/>
+                  <a:pt x="1187542" y="49167"/>
+                  <a:pt x="946404" y="27432"/>
+                </a:cubicBezTo>
+                <a:cubicBezTo>
+                  <a:pt x="705266" y="5697"/>
+                  <a:pt x="404743" y="28229"/>
+                  <a:pt x="0" y="27432"/>
+                </a:cubicBezTo>
+                <a:cubicBezTo>
+                  <a:pt x="244" y="15297"/>
+                  <a:pt x="645" y="7129"/>
+                  <a:pt x="0" y="0"/>
+                </a:cubicBezTo>
+                <a:close/>
+              </a:path>
+              <a:path w="10515600" h="27432" stroke="0" extrusionOk="0">
+                <a:moveTo>
+                  <a:pt x="0" y="0"/>
+                </a:moveTo>
+                <a:cubicBezTo>
+                  <a:pt x="230793" y="14353"/>
+                  <a:pt x="332416" y="21392"/>
+                  <a:pt x="552069" y="0"/>
+                </a:cubicBezTo>
+                <a:cubicBezTo>
+                  <a:pt x="771722" y="-21392"/>
+                  <a:pt x="761737" y="-14337"/>
+                  <a:pt x="893826" y="0"/>
+                </a:cubicBezTo>
+                <a:cubicBezTo>
+                  <a:pt x="1025915" y="14337"/>
+                  <a:pt x="1441584" y="-15498"/>
+                  <a:pt x="1761363" y="0"/>
+                </a:cubicBezTo>
+                <a:cubicBezTo>
+                  <a:pt x="2081142" y="15498"/>
+                  <a:pt x="2111503" y="7278"/>
+                  <a:pt x="2313432" y="0"/>
+                </a:cubicBezTo>
+                <a:cubicBezTo>
+                  <a:pt x="2515361" y="-7278"/>
+                  <a:pt x="2743584" y="-17845"/>
+                  <a:pt x="2865501" y="0"/>
+                </a:cubicBezTo>
+                <a:cubicBezTo>
+                  <a:pt x="2987418" y="17845"/>
+                  <a:pt x="3345183" y="8208"/>
+                  <a:pt x="3733038" y="0"/>
+                </a:cubicBezTo>
+                <a:cubicBezTo>
+                  <a:pt x="4120893" y="-8208"/>
+                  <a:pt x="4009066" y="-3159"/>
+                  <a:pt x="4179951" y="0"/>
+                </a:cubicBezTo>
+                <a:cubicBezTo>
+                  <a:pt x="4350836" y="3159"/>
+                  <a:pt x="4735020" y="17517"/>
+                  <a:pt x="5047488" y="0"/>
+                </a:cubicBezTo>
+                <a:cubicBezTo>
+                  <a:pt x="5359956" y="-17517"/>
+                  <a:pt x="5662148" y="-17777"/>
+                  <a:pt x="5915025" y="0"/>
+                </a:cubicBezTo>
+                <a:cubicBezTo>
+                  <a:pt x="6167902" y="17777"/>
+                  <a:pt x="6308797" y="30350"/>
+                  <a:pt x="6572250" y="0"/>
+                </a:cubicBezTo>
+                <a:cubicBezTo>
+                  <a:pt x="6835703" y="-30350"/>
+                  <a:pt x="7107419" y="-9627"/>
+                  <a:pt x="7439787" y="0"/>
+                </a:cubicBezTo>
+                <a:cubicBezTo>
+                  <a:pt x="7772155" y="9627"/>
+                  <a:pt x="7844034" y="-9098"/>
+                  <a:pt x="7991856" y="0"/>
+                </a:cubicBezTo>
+                <a:cubicBezTo>
+                  <a:pt x="8139678" y="9098"/>
+                  <a:pt x="8289889" y="-20239"/>
+                  <a:pt x="8543925" y="0"/>
+                </a:cubicBezTo>
+                <a:cubicBezTo>
+                  <a:pt x="8797961" y="20239"/>
+                  <a:pt x="8994198" y="29575"/>
+                  <a:pt x="9306306" y="0"/>
+                </a:cubicBezTo>
+                <a:cubicBezTo>
+                  <a:pt x="9618414" y="-29575"/>
+                  <a:pt x="9739118" y="-23835"/>
+                  <a:pt x="9858375" y="0"/>
+                </a:cubicBezTo>
+                <a:cubicBezTo>
+                  <a:pt x="9977632" y="23835"/>
+                  <a:pt x="10370488" y="-4069"/>
+                  <a:pt x="10515600" y="0"/>
+                </a:cubicBezTo>
+                <a:cubicBezTo>
+                  <a:pt x="10515650" y="5798"/>
+                  <a:pt x="10515903" y="19375"/>
+                  <a:pt x="10515600" y="27432"/>
+                </a:cubicBezTo>
+                <a:cubicBezTo>
+                  <a:pt x="10304538" y="42307"/>
+                  <a:pt x="10069280" y="3335"/>
+                  <a:pt x="9753219" y="27432"/>
+                </a:cubicBezTo>
+                <a:cubicBezTo>
+                  <a:pt x="9437158" y="51529"/>
+                  <a:pt x="9488415" y="23852"/>
+                  <a:pt x="9411462" y="27432"/>
+                </a:cubicBezTo>
+                <a:cubicBezTo>
+                  <a:pt x="9334509" y="31012"/>
+                  <a:pt x="9183755" y="44107"/>
+                  <a:pt x="8964549" y="27432"/>
+                </a:cubicBezTo>
+                <a:cubicBezTo>
+                  <a:pt x="8745343" y="10757"/>
+                  <a:pt x="8279150" y="61693"/>
+                  <a:pt x="8097012" y="27432"/>
+                </a:cubicBezTo>
+                <a:cubicBezTo>
+                  <a:pt x="7914874" y="-6829"/>
+                  <a:pt x="7608717" y="59556"/>
+                  <a:pt x="7439787" y="27432"/>
+                </a:cubicBezTo>
+                <a:cubicBezTo>
+                  <a:pt x="7270858" y="-4692"/>
+                  <a:pt x="7154492" y="27026"/>
+                  <a:pt x="6992874" y="27432"/>
+                </a:cubicBezTo>
+                <a:cubicBezTo>
+                  <a:pt x="6831256" y="27838"/>
+                  <a:pt x="6536817" y="51174"/>
+                  <a:pt x="6335649" y="27432"/>
+                </a:cubicBezTo>
+                <a:cubicBezTo>
+                  <a:pt x="6134481" y="3690"/>
+                  <a:pt x="6097824" y="11070"/>
+                  <a:pt x="5993892" y="27432"/>
+                </a:cubicBezTo>
+                <a:cubicBezTo>
+                  <a:pt x="5889960" y="43794"/>
+                  <a:pt x="5793821" y="34098"/>
+                  <a:pt x="5652135" y="27432"/>
+                </a:cubicBezTo>
+                <a:cubicBezTo>
+                  <a:pt x="5510449" y="20766"/>
+                  <a:pt x="5168382" y="-3650"/>
+                  <a:pt x="4994910" y="27432"/>
+                </a:cubicBezTo>
+                <a:cubicBezTo>
+                  <a:pt x="4821439" y="58514"/>
+                  <a:pt x="4653937" y="21362"/>
+                  <a:pt x="4547997" y="27432"/>
+                </a:cubicBezTo>
+                <a:cubicBezTo>
+                  <a:pt x="4442057" y="33502"/>
+                  <a:pt x="4153363" y="33024"/>
+                  <a:pt x="3785616" y="27432"/>
+                </a:cubicBezTo>
+                <a:cubicBezTo>
+                  <a:pt x="3417869" y="21840"/>
+                  <a:pt x="3544908" y="29840"/>
+                  <a:pt x="3338703" y="27432"/>
+                </a:cubicBezTo>
+                <a:cubicBezTo>
+                  <a:pt x="3132498" y="25024"/>
+                  <a:pt x="2782152" y="45947"/>
+                  <a:pt x="2576322" y="27432"/>
+                </a:cubicBezTo>
+                <a:cubicBezTo>
+                  <a:pt x="2370492" y="8917"/>
+                  <a:pt x="2347214" y="14129"/>
+                  <a:pt x="2234565" y="27432"/>
+                </a:cubicBezTo>
+                <a:cubicBezTo>
+                  <a:pt x="2121916" y="40735"/>
+                  <a:pt x="1785921" y="49081"/>
+                  <a:pt x="1472184" y="27432"/>
+                </a:cubicBezTo>
+                <a:cubicBezTo>
+                  <a:pt x="1158447" y="5783"/>
+                  <a:pt x="1203910" y="37937"/>
+                  <a:pt x="1025271" y="27432"/>
+                </a:cubicBezTo>
+                <a:cubicBezTo>
+                  <a:pt x="846632" y="16927"/>
+                  <a:pt x="846577" y="17996"/>
+                  <a:pt x="683514" y="27432"/>
+                </a:cubicBezTo>
+                <a:cubicBezTo>
+                  <a:pt x="520451" y="36868"/>
+                  <a:pt x="320799" y="46677"/>
+                  <a:pt x="0" y="27432"/>
+                </a:cubicBezTo>
+                <a:cubicBezTo>
+                  <a:pt x="-510" y="19859"/>
+                  <a:pt x="-1106" y="11474"/>
+                  <a:pt x="0" y="0"/>
+                </a:cubicBezTo>
+                <a:close/>
+              </a:path>
+            </a:pathLst>
+          </a:custGeom>
+          <a:solidFill>
+            <a:schemeClr val="tx1"/>
+          </a:solidFill>
+          <a:ln w="38100" cap="rnd">
+            <a:solidFill>
+              <a:schemeClr val="tx1"/>
+            </a:solidFill>
+            <a:round/>
+            <a:extLst>
+              <a:ext uri="{C807C97D-BFC1-408E-A445-0C87EB9F89A2}">
+                <ask:lineSketchStyleProps xmlns:ask="http://schemas.microsoft.com/office/drawing/2018/sketchyshapes" sd="1219033472">
+                  <a:prstGeom prst="rect">
+                    <a:avLst/>
+                  </a:prstGeom>
+                  <ask:type>
+                    <ask:lineSketchFreehand/>
+                  </ask:type>
+                </ask:lineSketchStyleProps>
+              </a:ext>
+            </a:extLst>
+          </a:ln>
+        </p:spPr>
+        <p:style>
+          <a:lnRef idx="2">
+            <a:schemeClr val="accent1">
+              <a:shade val="50000"/>
+            </a:schemeClr>
+          </a:lnRef>
+          <a:fillRef idx="1">
+            <a:schemeClr val="accent1"/>
+          </a:fillRef>
+          <a:effectRef idx="0">
+            <a:schemeClr val="accent1"/>
+          </a:effectRef>
+          <a:fontRef idx="minor">
+            <a:schemeClr val="lt1"/>
+          </a:fontRef>
+        </p:style>
+        <p:txBody>
+          <a:bodyPr rtlCol="0" anchor="ctr"/>
+          <a:lstStyle/>
+          <a:p>
+            <a:pPr algn="ctr"/>
+            <a:endParaRPr lang="en-US">
+              <a:solidFill>
+                <a:schemeClr val="tx1"/>
+              </a:solidFill>
+            </a:endParaRPr>
+          </a:p>
+        </p:txBody>
+      </p:sp>
       <p:sp useBgFill="1">
         <p:nvSpPr>
-          <p:cNvPr id="50" name="Rectangle 49">
+          <p:cNvPr id="43" name="Rectangle 42">
             <a:extLst>
               <a:ext uri="{FF2B5EF4-FFF2-40B4-BE49-F238E27FC236}">
-                <a16:creationId xmlns:a16="http://schemas.microsoft.com/office/drawing/2014/main" id="{AD35AE2F-5E3A-49D9-8DE1-8A333BA4088E}"/>
+                <a16:creationId xmlns:a16="http://schemas.microsoft.com/office/drawing/2014/main" id="{AED1D94F-BC8C-4ABD-9133-E5FE8FD01D22}"/>
               </a:ext>
               <a:ext uri="{C183D7F6-B498-43B3-948B-1728B52AA6E4}">
                 <adec:decorative xmlns:adec="http://schemas.microsoft.com/office/drawing/2017/decorative" val="1"/>
@@ -9099,7 +9741,7 @@
           <p:cNvPr id="7" name="Рисунок 6">
             <a:extLst>
               <a:ext uri="{FF2B5EF4-FFF2-40B4-BE49-F238E27FC236}">
-                <a16:creationId xmlns:a16="http://schemas.microsoft.com/office/drawing/2014/main" id="{96C0D24A-6B73-1477-4EF4-D98E6A3982F1}"/>
+                <a16:creationId xmlns:a16="http://schemas.microsoft.com/office/drawing/2014/main" id="{9DCAA611-5846-2C72-B06D-F5590EF8CCD0}"/>
               </a:ext>
             </a:extLst>
           </p:cNvPr>
@@ -9110,9 +9752,9 @@
         </p:nvPicPr>
         <p:blipFill>
           <a:blip r:embed="rId2">
-            <a:alphaModFix amt="50000"/>
+            <a:alphaModFix amt="40000"/>
           </a:blip>
-          <a:srcRect r="-1" b="15708"/>
+          <a:srcRect b="15730"/>
           <a:stretch>
             <a:fillRect/>
           </a:stretch>
@@ -9120,7 +9762,7 @@
         <p:spPr>
           <a:xfrm>
             <a:off x="20" y="10"/>
-            <a:ext cx="12188931" cy="6857990"/>
+            <a:ext cx="12191979" cy="6857990"/>
           </a:xfrm>
           <a:prstGeom prst="rect">
             <a:avLst/>
@@ -9132,7 +9774,7 @@
           <p:cNvPr id="2" name="Заголовок 1">
             <a:extLst>
               <a:ext uri="{FF2B5EF4-FFF2-40B4-BE49-F238E27FC236}">
-                <a16:creationId xmlns:a16="http://schemas.microsoft.com/office/drawing/2014/main" id="{EF227D95-3737-2CAB-5DE2-3DC5D56A1531}"/>
+                <a16:creationId xmlns:a16="http://schemas.microsoft.com/office/drawing/2014/main" id="{7E3325E1-2505-7D03-C317-399AE1037179}"/>
               </a:ext>
             </a:extLst>
           </p:cNvPr>
@@ -9145,31 +9787,30 @@
         </p:nvSpPr>
         <p:spPr>
           <a:xfrm>
-            <a:off x="1524000" y="1122363"/>
-            <a:ext cx="9144000" cy="3063240"/>
+            <a:off x="7008019" y="494951"/>
+            <a:ext cx="4979194" cy="5722227"/>
           </a:xfrm>
         </p:spPr>
         <p:txBody>
-          <a:bodyPr vert="horz" lIns="91440" tIns="45720" rIns="91440" bIns="45720" rtlCol="0">
+          <a:bodyPr vert="horz" lIns="91440" tIns="45720" rIns="91440" bIns="45720" rtlCol="0" anchor="ctr">
             <a:normAutofit/>
           </a:bodyPr>
           <a:lstStyle/>
           <a:p>
-            <a:pPr algn="ctr"/>
             <a:r>
-              <a:rPr lang="ru-RU"/>
+              <a:rPr lang="ru-RU" sz="7200" dirty="0"/>
               <a:t>Проще показать…</a:t>
             </a:r>
-            <a:endParaRPr lang="en-US"/>
+            <a:endParaRPr lang="en-US" sz="7200" dirty="0"/>
           </a:p>
         </p:txBody>
       </p:sp>
       <p:sp>
         <p:nvSpPr>
-          <p:cNvPr id="52" name="Rectangle 6">
+          <p:cNvPr id="45" name="sketchy content container">
             <a:extLst>
               <a:ext uri="{FF2B5EF4-FFF2-40B4-BE49-F238E27FC236}">
-                <a16:creationId xmlns:a16="http://schemas.microsoft.com/office/drawing/2014/main" id="{04D8AD8F-EF7F-481F-B99A-B8513897050A}"/>
+                <a16:creationId xmlns:a16="http://schemas.microsoft.com/office/drawing/2014/main" id="{65C49067-A40C-4881-A0C6-21B61255100C}"/>
               </a:ext>
               <a:ext uri="{C183D7F6-B498-43B3-948B-1728B52AA6E4}">
                 <adec:decorative xmlns:adec="http://schemas.microsoft.com/office/drawing/2017/decorative" val="1"/>
@@ -9189,46 +9830,86 @@
         </p:nvSpPr>
         <p:spPr>
           <a:xfrm>
-            <a:off x="3974206" y="4419423"/>
-            <a:ext cx="4243589" cy="27432"/>
+            <a:off x="643475" y="494951"/>
+            <a:ext cx="6229604" cy="5722227"/>
           </a:xfrm>
           <a:custGeom>
             <a:avLst/>
             <a:gdLst>
-              <a:gd name="connsiteX0" fmla="*/ 0 w 4243589"/>
-              <a:gd name="connsiteY0" fmla="*/ 0 h 27432"/>
-              <a:gd name="connsiteX1" fmla="*/ 563791 w 4243589"/>
-              <a:gd name="connsiteY1" fmla="*/ 0 h 27432"/>
-              <a:gd name="connsiteX2" fmla="*/ 1042710 w 4243589"/>
-              <a:gd name="connsiteY2" fmla="*/ 0 h 27432"/>
-              <a:gd name="connsiteX3" fmla="*/ 1564066 w 4243589"/>
-              <a:gd name="connsiteY3" fmla="*/ 0 h 27432"/>
-              <a:gd name="connsiteX4" fmla="*/ 2212729 w 4243589"/>
-              <a:gd name="connsiteY4" fmla="*/ 0 h 27432"/>
-              <a:gd name="connsiteX5" fmla="*/ 2776520 w 4243589"/>
-              <a:gd name="connsiteY5" fmla="*/ 0 h 27432"/>
-              <a:gd name="connsiteX6" fmla="*/ 3297875 w 4243589"/>
-              <a:gd name="connsiteY6" fmla="*/ 0 h 27432"/>
-              <a:gd name="connsiteX7" fmla="*/ 4243589 w 4243589"/>
-              <a:gd name="connsiteY7" fmla="*/ 0 h 27432"/>
-              <a:gd name="connsiteX8" fmla="*/ 4243589 w 4243589"/>
-              <a:gd name="connsiteY8" fmla="*/ 27432 h 27432"/>
-              <a:gd name="connsiteX9" fmla="*/ 3637362 w 4243589"/>
-              <a:gd name="connsiteY9" fmla="*/ 27432 h 27432"/>
-              <a:gd name="connsiteX10" fmla="*/ 3116007 w 4243589"/>
-              <a:gd name="connsiteY10" fmla="*/ 27432 h 27432"/>
-              <a:gd name="connsiteX11" fmla="*/ 2424908 w 4243589"/>
-              <a:gd name="connsiteY11" fmla="*/ 27432 h 27432"/>
-              <a:gd name="connsiteX12" fmla="*/ 1861117 w 4243589"/>
-              <a:gd name="connsiteY12" fmla="*/ 27432 h 27432"/>
-              <a:gd name="connsiteX13" fmla="*/ 1382198 w 4243589"/>
-              <a:gd name="connsiteY13" fmla="*/ 27432 h 27432"/>
-              <a:gd name="connsiteX14" fmla="*/ 733535 w 4243589"/>
-              <a:gd name="connsiteY14" fmla="*/ 27432 h 27432"/>
-              <a:gd name="connsiteX15" fmla="*/ 0 w 4243589"/>
-              <a:gd name="connsiteY15" fmla="*/ 27432 h 27432"/>
-              <a:gd name="connsiteX16" fmla="*/ 0 w 4243589"/>
-              <a:gd name="connsiteY16" fmla="*/ 0 h 27432"/>
+              <a:gd name="connsiteX0" fmla="*/ 0 w 6229604"/>
+              <a:gd name="connsiteY0" fmla="*/ 0 h 5722227"/>
+              <a:gd name="connsiteX1" fmla="*/ 629882 w 6229604"/>
+              <a:gd name="connsiteY1" fmla="*/ 0 h 5722227"/>
+              <a:gd name="connsiteX2" fmla="*/ 1135172 w 6229604"/>
+              <a:gd name="connsiteY2" fmla="*/ 0 h 5722227"/>
+              <a:gd name="connsiteX3" fmla="*/ 1951943 w 6229604"/>
+              <a:gd name="connsiteY3" fmla="*/ 0 h 5722227"/>
+              <a:gd name="connsiteX4" fmla="*/ 2581825 w 6229604"/>
+              <a:gd name="connsiteY4" fmla="*/ 0 h 5722227"/>
+              <a:gd name="connsiteX5" fmla="*/ 3211707 w 6229604"/>
+              <a:gd name="connsiteY5" fmla="*/ 0 h 5722227"/>
+              <a:gd name="connsiteX6" fmla="*/ 4028477 w 6229604"/>
+              <a:gd name="connsiteY6" fmla="*/ 0 h 5722227"/>
+              <a:gd name="connsiteX7" fmla="*/ 4596063 w 6229604"/>
+              <a:gd name="connsiteY7" fmla="*/ 0 h 5722227"/>
+              <a:gd name="connsiteX8" fmla="*/ 5412834 w 6229604"/>
+              <a:gd name="connsiteY8" fmla="*/ 0 h 5722227"/>
+              <a:gd name="connsiteX9" fmla="*/ 6229604 w 6229604"/>
+              <a:gd name="connsiteY9" fmla="*/ 0 h 5722227"/>
+              <a:gd name="connsiteX10" fmla="*/ 6229604 w 6229604"/>
+              <a:gd name="connsiteY10" fmla="*/ 635803 h 5722227"/>
+              <a:gd name="connsiteX11" fmla="*/ 6229604 w 6229604"/>
+              <a:gd name="connsiteY11" fmla="*/ 1271606 h 5722227"/>
+              <a:gd name="connsiteX12" fmla="*/ 6229604 w 6229604"/>
+              <a:gd name="connsiteY12" fmla="*/ 1964631 h 5722227"/>
+              <a:gd name="connsiteX13" fmla="*/ 6229604 w 6229604"/>
+              <a:gd name="connsiteY13" fmla="*/ 2428767 h 5722227"/>
+              <a:gd name="connsiteX14" fmla="*/ 6229604 w 6229604"/>
+              <a:gd name="connsiteY14" fmla="*/ 3064570 h 5722227"/>
+              <a:gd name="connsiteX15" fmla="*/ 6229604 w 6229604"/>
+              <a:gd name="connsiteY15" fmla="*/ 3700373 h 5722227"/>
+              <a:gd name="connsiteX16" fmla="*/ 6229604 w 6229604"/>
+              <a:gd name="connsiteY16" fmla="*/ 4336176 h 5722227"/>
+              <a:gd name="connsiteX17" fmla="*/ 6229604 w 6229604"/>
+              <a:gd name="connsiteY17" fmla="*/ 5029202 h 5722227"/>
+              <a:gd name="connsiteX18" fmla="*/ 6229604 w 6229604"/>
+              <a:gd name="connsiteY18" fmla="*/ 5722227 h 5722227"/>
+              <a:gd name="connsiteX19" fmla="*/ 5475130 w 6229604"/>
+              <a:gd name="connsiteY19" fmla="*/ 5722227 h 5722227"/>
+              <a:gd name="connsiteX20" fmla="*/ 4907544 w 6229604"/>
+              <a:gd name="connsiteY20" fmla="*/ 5722227 h 5722227"/>
+              <a:gd name="connsiteX21" fmla="*/ 4090773 w 6229604"/>
+              <a:gd name="connsiteY21" fmla="*/ 5722227 h 5722227"/>
+              <a:gd name="connsiteX22" fmla="*/ 3398595 w 6229604"/>
+              <a:gd name="connsiteY22" fmla="*/ 5722227 h 5722227"/>
+              <a:gd name="connsiteX23" fmla="*/ 2831009 w 6229604"/>
+              <a:gd name="connsiteY23" fmla="*/ 5722227 h 5722227"/>
+              <a:gd name="connsiteX24" fmla="*/ 2138831 w 6229604"/>
+              <a:gd name="connsiteY24" fmla="*/ 5722227 h 5722227"/>
+              <a:gd name="connsiteX25" fmla="*/ 1633541 w 6229604"/>
+              <a:gd name="connsiteY25" fmla="*/ 5722227 h 5722227"/>
+              <a:gd name="connsiteX26" fmla="*/ 1128251 w 6229604"/>
+              <a:gd name="connsiteY26" fmla="*/ 5722227 h 5722227"/>
+              <a:gd name="connsiteX27" fmla="*/ 0 w 6229604"/>
+              <a:gd name="connsiteY27" fmla="*/ 5722227 h 5722227"/>
+              <a:gd name="connsiteX28" fmla="*/ 0 w 6229604"/>
+              <a:gd name="connsiteY28" fmla="*/ 5200869 h 5722227"/>
+              <a:gd name="connsiteX29" fmla="*/ 0 w 6229604"/>
+              <a:gd name="connsiteY29" fmla="*/ 4450621 h 5722227"/>
+              <a:gd name="connsiteX30" fmla="*/ 0 w 6229604"/>
+              <a:gd name="connsiteY30" fmla="*/ 3872040 h 5722227"/>
+              <a:gd name="connsiteX31" fmla="*/ 0 w 6229604"/>
+              <a:gd name="connsiteY31" fmla="*/ 3407904 h 5722227"/>
+              <a:gd name="connsiteX32" fmla="*/ 0 w 6229604"/>
+              <a:gd name="connsiteY32" fmla="*/ 2714879 h 5722227"/>
+              <a:gd name="connsiteX33" fmla="*/ 0 w 6229604"/>
+              <a:gd name="connsiteY33" fmla="*/ 2193520 h 5722227"/>
+              <a:gd name="connsiteX34" fmla="*/ 0 w 6229604"/>
+              <a:gd name="connsiteY34" fmla="*/ 1500495 h 5722227"/>
+              <a:gd name="connsiteX35" fmla="*/ 0 w 6229604"/>
+              <a:gd name="connsiteY35" fmla="*/ 750248 h 5722227"/>
+              <a:gd name="connsiteX36" fmla="*/ 0 w 6229604"/>
+              <a:gd name="connsiteY36" fmla="*/ 0 h 5722227"/>
             </a:gdLst>
             <a:ahLst/>
             <a:cxnLst>
@@ -9283,187 +9964,259 @@
               <a:cxn ang="0">
                 <a:pos x="connsiteX16" y="connsiteY16"/>
               </a:cxn>
+              <a:cxn ang="0">
+                <a:pos x="connsiteX17" y="connsiteY17"/>
+              </a:cxn>
+              <a:cxn ang="0">
+                <a:pos x="connsiteX18" y="connsiteY18"/>
+              </a:cxn>
+              <a:cxn ang="0">
+                <a:pos x="connsiteX19" y="connsiteY19"/>
+              </a:cxn>
+              <a:cxn ang="0">
+                <a:pos x="connsiteX20" y="connsiteY20"/>
+              </a:cxn>
+              <a:cxn ang="0">
+                <a:pos x="connsiteX21" y="connsiteY21"/>
+              </a:cxn>
+              <a:cxn ang="0">
+                <a:pos x="connsiteX22" y="connsiteY22"/>
+              </a:cxn>
+              <a:cxn ang="0">
+                <a:pos x="connsiteX23" y="connsiteY23"/>
+              </a:cxn>
+              <a:cxn ang="0">
+                <a:pos x="connsiteX24" y="connsiteY24"/>
+              </a:cxn>
+              <a:cxn ang="0">
+                <a:pos x="connsiteX25" y="connsiteY25"/>
+              </a:cxn>
+              <a:cxn ang="0">
+                <a:pos x="connsiteX26" y="connsiteY26"/>
+              </a:cxn>
+              <a:cxn ang="0">
+                <a:pos x="connsiteX27" y="connsiteY27"/>
+              </a:cxn>
+              <a:cxn ang="0">
+                <a:pos x="connsiteX28" y="connsiteY28"/>
+              </a:cxn>
+              <a:cxn ang="0">
+                <a:pos x="connsiteX29" y="connsiteY29"/>
+              </a:cxn>
+              <a:cxn ang="0">
+                <a:pos x="connsiteX30" y="connsiteY30"/>
+              </a:cxn>
+              <a:cxn ang="0">
+                <a:pos x="connsiteX31" y="connsiteY31"/>
+              </a:cxn>
+              <a:cxn ang="0">
+                <a:pos x="connsiteX32" y="connsiteY32"/>
+              </a:cxn>
+              <a:cxn ang="0">
+                <a:pos x="connsiteX33" y="connsiteY33"/>
+              </a:cxn>
+              <a:cxn ang="0">
+                <a:pos x="connsiteX34" y="connsiteY34"/>
+              </a:cxn>
+              <a:cxn ang="0">
+                <a:pos x="connsiteX35" y="connsiteY35"/>
+              </a:cxn>
+              <a:cxn ang="0">
+                <a:pos x="connsiteX36" y="connsiteY36"/>
+              </a:cxn>
             </a:cxnLst>
             <a:rect l="l" t="t" r="r" b="b"/>
             <a:pathLst>
-              <a:path w="4243589" h="27432" fill="none" extrusionOk="0">
+              <a:path w="6229604" h="5722227" extrusionOk="0">
                 <a:moveTo>
                   <a:pt x="0" y="0"/>
                 </a:moveTo>
                 <a:cubicBezTo>
-                  <a:pt x="157351" y="-15653"/>
-                  <a:pt x="378877" y="-5828"/>
-                  <a:pt x="563791" y="0"/>
-                </a:cubicBezTo>
-                <a:cubicBezTo>
-                  <a:pt x="748705" y="5828"/>
-                  <a:pt x="905659" y="-5525"/>
-                  <a:pt x="1042710" y="0"/>
-                </a:cubicBezTo>
-                <a:cubicBezTo>
-                  <a:pt x="1179761" y="5525"/>
-                  <a:pt x="1356845" y="-21288"/>
-                  <a:pt x="1564066" y="0"/>
-                </a:cubicBezTo>
-                <a:cubicBezTo>
-                  <a:pt x="1771287" y="21288"/>
-                  <a:pt x="1912099" y="25135"/>
-                  <a:pt x="2212729" y="0"/>
-                </a:cubicBezTo>
-                <a:cubicBezTo>
-                  <a:pt x="2513359" y="-25135"/>
-                  <a:pt x="2514918" y="-27119"/>
-                  <a:pt x="2776520" y="0"/>
-                </a:cubicBezTo>
-                <a:cubicBezTo>
-                  <a:pt x="3038122" y="27119"/>
-                  <a:pt x="3178771" y="18116"/>
-                  <a:pt x="3297875" y="0"/>
-                </a:cubicBezTo>
-                <a:cubicBezTo>
-                  <a:pt x="3416980" y="-18116"/>
-                  <a:pt x="4012240" y="-40869"/>
-                  <a:pt x="4243589" y="0"/>
-                </a:cubicBezTo>
-                <a:cubicBezTo>
-                  <a:pt x="4242616" y="8304"/>
-                  <a:pt x="4243111" y="21512"/>
-                  <a:pt x="4243589" y="27432"/>
-                </a:cubicBezTo>
-                <a:cubicBezTo>
-                  <a:pt x="4112949" y="6289"/>
-                  <a:pt x="3928037" y="10975"/>
-                  <a:pt x="3637362" y="27432"/>
-                </a:cubicBezTo>
-                <a:cubicBezTo>
-                  <a:pt x="3346687" y="43889"/>
-                  <a:pt x="3254446" y="35813"/>
-                  <a:pt x="3116007" y="27432"/>
-                </a:cubicBezTo>
-                <a:cubicBezTo>
-                  <a:pt x="2977569" y="19051"/>
-                  <a:pt x="2620228" y="38017"/>
-                  <a:pt x="2424908" y="27432"/>
-                </a:cubicBezTo>
-                <a:cubicBezTo>
-                  <a:pt x="2229588" y="16847"/>
-                  <a:pt x="2088287" y="5290"/>
-                  <a:pt x="1861117" y="27432"/>
-                </a:cubicBezTo>
-                <a:cubicBezTo>
-                  <a:pt x="1633947" y="49574"/>
-                  <a:pt x="1502447" y="8273"/>
-                  <a:pt x="1382198" y="27432"/>
-                </a:cubicBezTo>
-                <a:cubicBezTo>
-                  <a:pt x="1261949" y="46591"/>
-                  <a:pt x="1045440" y="37497"/>
-                  <a:pt x="733535" y="27432"/>
-                </a:cubicBezTo>
-                <a:cubicBezTo>
-                  <a:pt x="421630" y="17367"/>
-                  <a:pt x="341257" y="-9215"/>
-                  <a:pt x="0" y="27432"/>
-                </a:cubicBezTo>
-                <a:cubicBezTo>
-                  <a:pt x="-1048" y="14992"/>
-                  <a:pt x="-1120" y="7447"/>
-                  <a:pt x="0" y="0"/>
-                </a:cubicBezTo>
-                <a:close/>
-              </a:path>
-              <a:path w="4243589" h="27432" stroke="0" extrusionOk="0">
-                <a:moveTo>
-                  <a:pt x="0" y="0"/>
-                </a:moveTo>
-                <a:cubicBezTo>
-                  <a:pt x="128164" y="17204"/>
-                  <a:pt x="312653" y="1129"/>
-                  <a:pt x="563791" y="0"/>
-                </a:cubicBezTo>
-                <a:cubicBezTo>
-                  <a:pt x="814929" y="-1129"/>
-                  <a:pt x="837271" y="8503"/>
-                  <a:pt x="1042710" y="0"/>
-                </a:cubicBezTo>
-                <a:cubicBezTo>
-                  <a:pt x="1248149" y="-8503"/>
-                  <a:pt x="1588432" y="-28862"/>
-                  <a:pt x="1733809" y="0"/>
-                </a:cubicBezTo>
-                <a:cubicBezTo>
-                  <a:pt x="1879186" y="28862"/>
-                  <a:pt x="2052815" y="5974"/>
-                  <a:pt x="2297600" y="0"/>
-                </a:cubicBezTo>
-                <a:cubicBezTo>
-                  <a:pt x="2542385" y="-5974"/>
-                  <a:pt x="2699960" y="-23550"/>
-                  <a:pt x="2861391" y="0"/>
-                </a:cubicBezTo>
-                <a:cubicBezTo>
-                  <a:pt x="3022822" y="23550"/>
-                  <a:pt x="3390411" y="25272"/>
-                  <a:pt x="3552490" y="0"/>
-                </a:cubicBezTo>
-                <a:cubicBezTo>
-                  <a:pt x="3714569" y="-25272"/>
-                  <a:pt x="3950585" y="-31327"/>
-                  <a:pt x="4243589" y="0"/>
-                </a:cubicBezTo>
-                <a:cubicBezTo>
-                  <a:pt x="4244074" y="9333"/>
-                  <a:pt x="4244867" y="19699"/>
-                  <a:pt x="4243589" y="27432"/>
-                </a:cubicBezTo>
-                <a:cubicBezTo>
-                  <a:pt x="4130424" y="7904"/>
-                  <a:pt x="3932803" y="51393"/>
-                  <a:pt x="3722234" y="27432"/>
-                </a:cubicBezTo>
-                <a:cubicBezTo>
-                  <a:pt x="3511665" y="3471"/>
-                  <a:pt x="3269903" y="55138"/>
-                  <a:pt x="3116007" y="27432"/>
-                </a:cubicBezTo>
-                <a:cubicBezTo>
-                  <a:pt x="2962111" y="-274"/>
-                  <a:pt x="2744280" y="32368"/>
-                  <a:pt x="2509780" y="27432"/>
-                </a:cubicBezTo>
-                <a:cubicBezTo>
-                  <a:pt x="2275280" y="22496"/>
-                  <a:pt x="2066059" y="52808"/>
-                  <a:pt x="1945989" y="27432"/>
-                </a:cubicBezTo>
-                <a:cubicBezTo>
-                  <a:pt x="1825919" y="2056"/>
-                  <a:pt x="1407329" y="21760"/>
-                  <a:pt x="1254890" y="27432"/>
-                </a:cubicBezTo>
-                <a:cubicBezTo>
-                  <a:pt x="1102451" y="33104"/>
-                  <a:pt x="837950" y="40817"/>
-                  <a:pt x="563791" y="27432"/>
-                </a:cubicBezTo>
-                <a:cubicBezTo>
-                  <a:pt x="289632" y="14047"/>
-                  <a:pt x="132768" y="16249"/>
-                  <a:pt x="0" y="27432"/>
-                </a:cubicBezTo>
-                <a:cubicBezTo>
-                  <a:pt x="211" y="18145"/>
-                  <a:pt x="120" y="6480"/>
+                  <a:pt x="134765" y="733"/>
+                  <a:pt x="359555" y="-15387"/>
+                  <a:pt x="629882" y="0"/>
+                </a:cubicBezTo>
+                <a:cubicBezTo>
+                  <a:pt x="900209" y="15387"/>
+                  <a:pt x="965450" y="15937"/>
+                  <a:pt x="1135172" y="0"/>
+                </a:cubicBezTo>
+                <a:cubicBezTo>
+                  <a:pt x="1304894" y="-15937"/>
+                  <a:pt x="1787212" y="10921"/>
+                  <a:pt x="1951943" y="0"/>
+                </a:cubicBezTo>
+                <a:cubicBezTo>
+                  <a:pt x="2116674" y="-10921"/>
+                  <a:pt x="2378222" y="13313"/>
+                  <a:pt x="2581825" y="0"/>
+                </a:cubicBezTo>
+                <a:cubicBezTo>
+                  <a:pt x="2785428" y="-13313"/>
+                  <a:pt x="2915218" y="19972"/>
+                  <a:pt x="3211707" y="0"/>
+                </a:cubicBezTo>
+                <a:cubicBezTo>
+                  <a:pt x="3508196" y="-19972"/>
+                  <a:pt x="3832828" y="-34359"/>
+                  <a:pt x="4028477" y="0"/>
+                </a:cubicBezTo>
+                <a:cubicBezTo>
+                  <a:pt x="4224126" y="34359"/>
+                  <a:pt x="4361257" y="4467"/>
+                  <a:pt x="4596063" y="0"/>
+                </a:cubicBezTo>
+                <a:cubicBezTo>
+                  <a:pt x="4830869" y="-4467"/>
+                  <a:pt x="5091403" y="-7365"/>
+                  <a:pt x="5412834" y="0"/>
+                </a:cubicBezTo>
+                <a:cubicBezTo>
+                  <a:pt x="5734265" y="7365"/>
+                  <a:pt x="6034988" y="-26786"/>
+                  <a:pt x="6229604" y="0"/>
+                </a:cubicBezTo>
+                <a:cubicBezTo>
+                  <a:pt x="6208296" y="256153"/>
+                  <a:pt x="6219810" y="335049"/>
+                  <a:pt x="6229604" y="635803"/>
+                </a:cubicBezTo>
+                <a:cubicBezTo>
+                  <a:pt x="6239398" y="936557"/>
+                  <a:pt x="6230184" y="1092448"/>
+                  <a:pt x="6229604" y="1271606"/>
+                </a:cubicBezTo>
+                <a:cubicBezTo>
+                  <a:pt x="6229024" y="1450764"/>
+                  <a:pt x="6217841" y="1797531"/>
+                  <a:pt x="6229604" y="1964631"/>
+                </a:cubicBezTo>
+                <a:cubicBezTo>
+                  <a:pt x="6241367" y="2131731"/>
+                  <a:pt x="6220367" y="2235822"/>
+                  <a:pt x="6229604" y="2428767"/>
+                </a:cubicBezTo>
+                <a:cubicBezTo>
+                  <a:pt x="6238841" y="2621712"/>
+                  <a:pt x="6220929" y="2925917"/>
+                  <a:pt x="6229604" y="3064570"/>
+                </a:cubicBezTo>
+                <a:cubicBezTo>
+                  <a:pt x="6238279" y="3203223"/>
+                  <a:pt x="6256755" y="3501958"/>
+                  <a:pt x="6229604" y="3700373"/>
+                </a:cubicBezTo>
+                <a:cubicBezTo>
+                  <a:pt x="6202453" y="3898788"/>
+                  <a:pt x="6201714" y="4046823"/>
+                  <a:pt x="6229604" y="4336176"/>
+                </a:cubicBezTo>
+                <a:cubicBezTo>
+                  <a:pt x="6257494" y="4625529"/>
+                  <a:pt x="6258821" y="4774033"/>
+                  <a:pt x="6229604" y="5029202"/>
+                </a:cubicBezTo>
+                <a:cubicBezTo>
+                  <a:pt x="6200387" y="5284371"/>
+                  <a:pt x="6233334" y="5383875"/>
+                  <a:pt x="6229604" y="5722227"/>
+                </a:cubicBezTo>
+                <a:cubicBezTo>
+                  <a:pt x="6016393" y="5707881"/>
+                  <a:pt x="5684528" y="5751176"/>
+                  <a:pt x="5475130" y="5722227"/>
+                </a:cubicBezTo>
+                <a:cubicBezTo>
+                  <a:pt x="5265732" y="5693278"/>
+                  <a:pt x="5082862" y="5732690"/>
+                  <a:pt x="4907544" y="5722227"/>
+                </a:cubicBezTo>
+                <a:cubicBezTo>
+                  <a:pt x="4732226" y="5711764"/>
+                  <a:pt x="4474837" y="5716289"/>
+                  <a:pt x="4090773" y="5722227"/>
+                </a:cubicBezTo>
+                <a:cubicBezTo>
+                  <a:pt x="3706709" y="5728165"/>
+                  <a:pt x="3645902" y="5723973"/>
+                  <a:pt x="3398595" y="5722227"/>
+                </a:cubicBezTo>
+                <a:cubicBezTo>
+                  <a:pt x="3151288" y="5720481"/>
+                  <a:pt x="3001606" y="5732695"/>
+                  <a:pt x="2831009" y="5722227"/>
+                </a:cubicBezTo>
+                <a:cubicBezTo>
+                  <a:pt x="2660412" y="5711759"/>
+                  <a:pt x="2424161" y="5689878"/>
+                  <a:pt x="2138831" y="5722227"/>
+                </a:cubicBezTo>
+                <a:cubicBezTo>
+                  <a:pt x="1853501" y="5754576"/>
+                  <a:pt x="1788223" y="5720540"/>
+                  <a:pt x="1633541" y="5722227"/>
+                </a:cubicBezTo>
+                <a:cubicBezTo>
+                  <a:pt x="1478859" y="5723915"/>
+                  <a:pt x="1324151" y="5739059"/>
+                  <a:pt x="1128251" y="5722227"/>
+                </a:cubicBezTo>
+                <a:cubicBezTo>
+                  <a:pt x="932351" y="5705396"/>
+                  <a:pt x="522340" y="5691488"/>
+                  <a:pt x="0" y="5722227"/>
+                </a:cubicBezTo>
+                <a:cubicBezTo>
+                  <a:pt x="-8445" y="5596771"/>
+                  <a:pt x="-11215" y="5344833"/>
+                  <a:pt x="0" y="5200869"/>
+                </a:cubicBezTo>
+                <a:cubicBezTo>
+                  <a:pt x="11215" y="5056905"/>
+                  <a:pt x="20310" y="4693766"/>
+                  <a:pt x="0" y="4450621"/>
+                </a:cubicBezTo>
+                <a:cubicBezTo>
+                  <a:pt x="-20310" y="4207476"/>
+                  <a:pt x="817" y="4075053"/>
+                  <a:pt x="0" y="3872040"/>
+                </a:cubicBezTo>
+                <a:cubicBezTo>
+                  <a:pt x="-817" y="3669027"/>
+                  <a:pt x="-21729" y="3595882"/>
+                  <a:pt x="0" y="3407904"/>
+                </a:cubicBezTo>
+                <a:cubicBezTo>
+                  <a:pt x="21729" y="3219926"/>
+                  <a:pt x="-30605" y="3052469"/>
+                  <a:pt x="0" y="2714879"/>
+                </a:cubicBezTo>
+                <a:cubicBezTo>
+                  <a:pt x="30605" y="2377289"/>
+                  <a:pt x="-16081" y="2430808"/>
+                  <a:pt x="0" y="2193520"/>
+                </a:cubicBezTo>
+                <a:cubicBezTo>
+                  <a:pt x="16081" y="1956232"/>
+                  <a:pt x="18120" y="1817979"/>
+                  <a:pt x="0" y="1500495"/>
+                </a:cubicBezTo>
+                <a:cubicBezTo>
+                  <a:pt x="-18120" y="1183011"/>
+                  <a:pt x="23969" y="972269"/>
+                  <a:pt x="0" y="750248"/>
+                </a:cubicBezTo>
+                <a:cubicBezTo>
+                  <a:pt x="-23969" y="528227"/>
+                  <a:pt x="-3769" y="358360"/>
                   <a:pt x="0" y="0"/>
                 </a:cubicBezTo>
                 <a:close/>
               </a:path>
             </a:pathLst>
           </a:custGeom>
-          <a:solidFill>
-            <a:schemeClr val="tx1"/>
-          </a:solidFill>
-          <a:ln w="38100" cap="rnd">
+          <a:noFill/>
+          <a:ln w="25400">
             <a:solidFill>
               <a:schemeClr val="tx1"/>
             </a:solidFill>
@@ -9507,545 +10260,985 @@
           </a:p>
         </p:txBody>
       </p:sp>
-      <p:sp>
-        <p:nvSpPr>
-          <p:cNvPr id="54" name="Rectangle 6">
+      <p:cxnSp>
+        <p:nvCxnSpPr>
+          <p:cNvPr id="6" name="Прямая соединительная линия 5">
             <a:extLst>
               <a:ext uri="{FF2B5EF4-FFF2-40B4-BE49-F238E27FC236}">
-                <a16:creationId xmlns:a16="http://schemas.microsoft.com/office/drawing/2014/main" id="{79EB4626-023C-436D-9F57-9EB46080909D}"/>
-              </a:ext>
-              <a:ext uri="{C183D7F6-B498-43B3-948B-1728B52AA6E4}">
-                <adec:decorative xmlns:adec="http://schemas.microsoft.com/office/drawing/2017/decorative" val="1"/>
+                <a16:creationId xmlns:a16="http://schemas.microsoft.com/office/drawing/2014/main" id="{FD34BFF9-D852-76DD-898C-E9531A79D7BF}"/>
               </a:ext>
             </a:extLst>
           </p:cNvPr>
-          <p:cNvSpPr>
-            <a:spLocks noGrp="1" noRot="1" noChangeAspect="1" noMove="1" noResize="1" noEditPoints="1" noAdjustHandles="1" noChangeArrowheads="1" noChangeShapeType="1" noTextEdit="1"/>
-          </p:cNvSpPr>
-          <p:nvPr>
-            <p:extLst>
-              <p:ext uri="{386F3935-93C4-4BCD-93E2-E3B085C9AB24}">
-                <p16:designElem xmlns:p16="http://schemas.microsoft.com/office/powerpoint/2015/main" val="1"/>
-              </p:ext>
-            </p:extLst>
-          </p:nvPr>
-        </p:nvSpPr>
+          <p:cNvCxnSpPr>
+            <a:cxnSpLocks/>
+          </p:cNvCxnSpPr>
+          <p:nvPr/>
+        </p:nvCxnSpPr>
         <p:spPr>
-          <a:xfrm flipV="1">
-            <a:off x="838200" y="720953"/>
-            <a:ext cx="10515600" cy="5416094"/>
+          <a:xfrm>
+            <a:off x="3835825" y="503375"/>
+            <a:ext cx="3030095" cy="1363753"/>
           </a:xfrm>
-          <a:custGeom>
+          <a:prstGeom prst="line">
             <a:avLst/>
-            <a:gdLst>
-              <a:gd name="connsiteX0" fmla="*/ 0 w 10515600"/>
-              <a:gd name="connsiteY0" fmla="*/ 902700 h 5416094"/>
-              <a:gd name="connsiteX1" fmla="*/ 902700 w 10515600"/>
-              <a:gd name="connsiteY1" fmla="*/ 0 h 5416094"/>
-              <a:gd name="connsiteX2" fmla="*/ 1746919 w 10515600"/>
-              <a:gd name="connsiteY2" fmla="*/ 0 h 5416094"/>
-              <a:gd name="connsiteX3" fmla="*/ 2329833 w 10515600"/>
-              <a:gd name="connsiteY3" fmla="*/ 0 h 5416094"/>
-              <a:gd name="connsiteX4" fmla="*/ 2825644 w 10515600"/>
-              <a:gd name="connsiteY4" fmla="*/ 0 h 5416094"/>
-              <a:gd name="connsiteX5" fmla="*/ 3582762 w 10515600"/>
-              <a:gd name="connsiteY5" fmla="*/ 0 h 5416094"/>
-              <a:gd name="connsiteX6" fmla="*/ 4165675 w 10515600"/>
-              <a:gd name="connsiteY6" fmla="*/ 0 h 5416094"/>
-              <a:gd name="connsiteX7" fmla="*/ 5009894 w 10515600"/>
-              <a:gd name="connsiteY7" fmla="*/ 0 h 5416094"/>
-              <a:gd name="connsiteX8" fmla="*/ 5505706 w 10515600"/>
-              <a:gd name="connsiteY8" fmla="*/ 0 h 5416094"/>
-              <a:gd name="connsiteX9" fmla="*/ 6349925 w 10515600"/>
-              <a:gd name="connsiteY9" fmla="*/ 0 h 5416094"/>
-              <a:gd name="connsiteX10" fmla="*/ 6758634 w 10515600"/>
-              <a:gd name="connsiteY10" fmla="*/ 0 h 5416094"/>
-              <a:gd name="connsiteX11" fmla="*/ 7428650 w 10515600"/>
-              <a:gd name="connsiteY11" fmla="*/ 0 h 5416094"/>
-              <a:gd name="connsiteX12" fmla="*/ 8098665 w 10515600"/>
-              <a:gd name="connsiteY12" fmla="*/ 0 h 5416094"/>
-              <a:gd name="connsiteX13" fmla="*/ 8681579 w 10515600"/>
-              <a:gd name="connsiteY13" fmla="*/ 0 h 5416094"/>
-              <a:gd name="connsiteX14" fmla="*/ 9612900 w 10515600"/>
-              <a:gd name="connsiteY14" fmla="*/ 0 h 5416094"/>
-              <a:gd name="connsiteX15" fmla="*/ 10515600 w 10515600"/>
-              <a:gd name="connsiteY15" fmla="*/ 902700 h 5416094"/>
-              <a:gd name="connsiteX16" fmla="*/ 10515600 w 10515600"/>
-              <a:gd name="connsiteY16" fmla="*/ 1504482 h 5416094"/>
-              <a:gd name="connsiteX17" fmla="*/ 10515600 w 10515600"/>
-              <a:gd name="connsiteY17" fmla="*/ 2178479 h 5416094"/>
-              <a:gd name="connsiteX18" fmla="*/ 10515600 w 10515600"/>
-              <a:gd name="connsiteY18" fmla="*/ 2780261 h 5416094"/>
-              <a:gd name="connsiteX19" fmla="*/ 10515600 w 10515600"/>
-              <a:gd name="connsiteY19" fmla="*/ 3273722 h 5416094"/>
-              <a:gd name="connsiteX20" fmla="*/ 10515600 w 10515600"/>
-              <a:gd name="connsiteY20" fmla="*/ 3803291 h 5416094"/>
-              <a:gd name="connsiteX21" fmla="*/ 10515600 w 10515600"/>
-              <a:gd name="connsiteY21" fmla="*/ 4513394 h 5416094"/>
-              <a:gd name="connsiteX22" fmla="*/ 9612900 w 10515600"/>
-              <a:gd name="connsiteY22" fmla="*/ 5416094 h 5416094"/>
-              <a:gd name="connsiteX23" fmla="*/ 9117089 w 10515600"/>
-              <a:gd name="connsiteY23" fmla="*/ 5416094 h 5416094"/>
-              <a:gd name="connsiteX24" fmla="*/ 8708379 w 10515600"/>
-              <a:gd name="connsiteY24" fmla="*/ 5416094 h 5416094"/>
-              <a:gd name="connsiteX25" fmla="*/ 8299670 w 10515600"/>
-              <a:gd name="connsiteY25" fmla="*/ 5416094 h 5416094"/>
-              <a:gd name="connsiteX26" fmla="*/ 7629654 w 10515600"/>
-              <a:gd name="connsiteY26" fmla="*/ 5416094 h 5416094"/>
-              <a:gd name="connsiteX27" fmla="*/ 7133843 w 10515600"/>
-              <a:gd name="connsiteY27" fmla="*/ 5416094 h 5416094"/>
-              <a:gd name="connsiteX28" fmla="*/ 6376726 w 10515600"/>
-              <a:gd name="connsiteY28" fmla="*/ 5416094 h 5416094"/>
-              <a:gd name="connsiteX29" fmla="*/ 5880914 w 10515600"/>
-              <a:gd name="connsiteY29" fmla="*/ 5416094 h 5416094"/>
-              <a:gd name="connsiteX30" fmla="*/ 5123797 w 10515600"/>
-              <a:gd name="connsiteY30" fmla="*/ 5416094 h 5416094"/>
-              <a:gd name="connsiteX31" fmla="*/ 4715088 w 10515600"/>
-              <a:gd name="connsiteY31" fmla="*/ 5416094 h 5416094"/>
-              <a:gd name="connsiteX32" fmla="*/ 3957970 w 10515600"/>
-              <a:gd name="connsiteY32" fmla="*/ 5416094 h 5416094"/>
-              <a:gd name="connsiteX33" fmla="*/ 3462159 w 10515600"/>
-              <a:gd name="connsiteY33" fmla="*/ 5416094 h 5416094"/>
-              <a:gd name="connsiteX34" fmla="*/ 3053449 w 10515600"/>
-              <a:gd name="connsiteY34" fmla="*/ 5416094 h 5416094"/>
-              <a:gd name="connsiteX35" fmla="*/ 2557638 w 10515600"/>
-              <a:gd name="connsiteY35" fmla="*/ 5416094 h 5416094"/>
-              <a:gd name="connsiteX36" fmla="*/ 1800521 w 10515600"/>
-              <a:gd name="connsiteY36" fmla="*/ 5416094 h 5416094"/>
-              <a:gd name="connsiteX37" fmla="*/ 902700 w 10515600"/>
-              <a:gd name="connsiteY37" fmla="*/ 5416094 h 5416094"/>
-              <a:gd name="connsiteX38" fmla="*/ 0 w 10515600"/>
-              <a:gd name="connsiteY38" fmla="*/ 4513394 h 5416094"/>
-              <a:gd name="connsiteX39" fmla="*/ 0 w 10515600"/>
-              <a:gd name="connsiteY39" fmla="*/ 3911612 h 5416094"/>
-              <a:gd name="connsiteX40" fmla="*/ 0 w 10515600"/>
-              <a:gd name="connsiteY40" fmla="*/ 3309829 h 5416094"/>
-              <a:gd name="connsiteX41" fmla="*/ 0 w 10515600"/>
-              <a:gd name="connsiteY41" fmla="*/ 2780261 h 5416094"/>
-              <a:gd name="connsiteX42" fmla="*/ 0 w 10515600"/>
-              <a:gd name="connsiteY42" fmla="*/ 2106265 h 5416094"/>
-              <a:gd name="connsiteX43" fmla="*/ 0 w 10515600"/>
-              <a:gd name="connsiteY43" fmla="*/ 1504482 h 5416094"/>
-              <a:gd name="connsiteX44" fmla="*/ 0 w 10515600"/>
-              <a:gd name="connsiteY44" fmla="*/ 902700 h 5416094"/>
-            </a:gdLst>
-            <a:ahLst/>
-            <a:cxnLst>
-              <a:cxn ang="0">
-                <a:pos x="connsiteX0" y="connsiteY0"/>
-              </a:cxn>
-              <a:cxn ang="0">
-                <a:pos x="connsiteX1" y="connsiteY1"/>
-              </a:cxn>
-              <a:cxn ang="0">
-                <a:pos x="connsiteX2" y="connsiteY2"/>
-              </a:cxn>
-              <a:cxn ang="0">
-                <a:pos x="connsiteX3" y="connsiteY3"/>
-              </a:cxn>
-              <a:cxn ang="0">
-                <a:pos x="connsiteX4" y="connsiteY4"/>
-              </a:cxn>
-              <a:cxn ang="0">
-                <a:pos x="connsiteX5" y="connsiteY5"/>
-              </a:cxn>
-              <a:cxn ang="0">
-                <a:pos x="connsiteX6" y="connsiteY6"/>
-              </a:cxn>
-              <a:cxn ang="0">
-                <a:pos x="connsiteX7" y="connsiteY7"/>
-              </a:cxn>
-              <a:cxn ang="0">
-                <a:pos x="connsiteX8" y="connsiteY8"/>
-              </a:cxn>
-              <a:cxn ang="0">
-                <a:pos x="connsiteX9" y="connsiteY9"/>
-              </a:cxn>
-              <a:cxn ang="0">
-                <a:pos x="connsiteX10" y="connsiteY10"/>
-              </a:cxn>
-              <a:cxn ang="0">
-                <a:pos x="connsiteX11" y="connsiteY11"/>
-              </a:cxn>
-              <a:cxn ang="0">
-                <a:pos x="connsiteX12" y="connsiteY12"/>
-              </a:cxn>
-              <a:cxn ang="0">
-                <a:pos x="connsiteX13" y="connsiteY13"/>
-              </a:cxn>
-              <a:cxn ang="0">
-                <a:pos x="connsiteX14" y="connsiteY14"/>
-              </a:cxn>
-              <a:cxn ang="0">
-                <a:pos x="connsiteX15" y="connsiteY15"/>
-              </a:cxn>
-              <a:cxn ang="0">
-                <a:pos x="connsiteX16" y="connsiteY16"/>
-              </a:cxn>
-              <a:cxn ang="0">
-                <a:pos x="connsiteX17" y="connsiteY17"/>
-              </a:cxn>
-              <a:cxn ang="0">
-                <a:pos x="connsiteX18" y="connsiteY18"/>
-              </a:cxn>
-              <a:cxn ang="0">
-                <a:pos x="connsiteX19" y="connsiteY19"/>
-              </a:cxn>
-              <a:cxn ang="0">
-                <a:pos x="connsiteX20" y="connsiteY20"/>
-              </a:cxn>
-              <a:cxn ang="0">
-                <a:pos x="connsiteX21" y="connsiteY21"/>
-              </a:cxn>
-              <a:cxn ang="0">
-                <a:pos x="connsiteX22" y="connsiteY22"/>
-              </a:cxn>
-              <a:cxn ang="0">
-                <a:pos x="connsiteX23" y="connsiteY23"/>
-              </a:cxn>
-              <a:cxn ang="0">
-                <a:pos x="connsiteX24" y="connsiteY24"/>
-              </a:cxn>
-              <a:cxn ang="0">
-                <a:pos x="connsiteX25" y="connsiteY25"/>
-              </a:cxn>
-              <a:cxn ang="0">
-                <a:pos x="connsiteX26" y="connsiteY26"/>
-              </a:cxn>
-              <a:cxn ang="0">
-                <a:pos x="connsiteX27" y="connsiteY27"/>
-              </a:cxn>
-              <a:cxn ang="0">
-                <a:pos x="connsiteX28" y="connsiteY28"/>
-              </a:cxn>
-              <a:cxn ang="0">
-                <a:pos x="connsiteX29" y="connsiteY29"/>
-              </a:cxn>
-              <a:cxn ang="0">
-                <a:pos x="connsiteX30" y="connsiteY30"/>
-              </a:cxn>
-              <a:cxn ang="0">
-                <a:pos x="connsiteX31" y="connsiteY31"/>
-              </a:cxn>
-              <a:cxn ang="0">
-                <a:pos x="connsiteX32" y="connsiteY32"/>
-              </a:cxn>
-              <a:cxn ang="0">
-                <a:pos x="connsiteX33" y="connsiteY33"/>
-              </a:cxn>
-              <a:cxn ang="0">
-                <a:pos x="connsiteX34" y="connsiteY34"/>
-              </a:cxn>
-              <a:cxn ang="0">
-                <a:pos x="connsiteX35" y="connsiteY35"/>
-              </a:cxn>
-              <a:cxn ang="0">
-                <a:pos x="connsiteX36" y="connsiteY36"/>
-              </a:cxn>
-              <a:cxn ang="0">
-                <a:pos x="connsiteX37" y="connsiteY37"/>
-              </a:cxn>
-              <a:cxn ang="0">
-                <a:pos x="connsiteX38" y="connsiteY38"/>
-              </a:cxn>
-              <a:cxn ang="0">
-                <a:pos x="connsiteX39" y="connsiteY39"/>
-              </a:cxn>
-              <a:cxn ang="0">
-                <a:pos x="connsiteX40" y="connsiteY40"/>
-              </a:cxn>
-              <a:cxn ang="0">
-                <a:pos x="connsiteX41" y="connsiteY41"/>
-              </a:cxn>
-              <a:cxn ang="0">
-                <a:pos x="connsiteX42" y="connsiteY42"/>
-              </a:cxn>
-              <a:cxn ang="0">
-                <a:pos x="connsiteX43" y="connsiteY43"/>
-              </a:cxn>
-              <a:cxn ang="0">
-                <a:pos x="connsiteX44" y="connsiteY44"/>
-              </a:cxn>
-            </a:cxnLst>
-            <a:rect l="l" t="t" r="r" b="b"/>
-            <a:pathLst>
-              <a:path w="10515600" h="5416094" extrusionOk="0">
-                <a:moveTo>
-                  <a:pt x="0" y="902700"/>
-                </a:moveTo>
-                <a:cubicBezTo>
-                  <a:pt x="-57306" y="368805"/>
-                  <a:pt x="305054" y="37193"/>
-                  <a:pt x="902700" y="0"/>
-                </a:cubicBezTo>
-                <a:cubicBezTo>
-                  <a:pt x="1280419" y="-35006"/>
-                  <a:pt x="1407743" y="-35339"/>
-                  <a:pt x="1746919" y="0"/>
-                </a:cubicBezTo>
-                <a:cubicBezTo>
-                  <a:pt x="2086095" y="35339"/>
-                  <a:pt x="2146539" y="-12333"/>
-                  <a:pt x="2329833" y="0"/>
-                </a:cubicBezTo>
-                <a:cubicBezTo>
-                  <a:pt x="2513127" y="12333"/>
-                  <a:pt x="2706706" y="12952"/>
-                  <a:pt x="2825644" y="0"/>
-                </a:cubicBezTo>
-                <a:cubicBezTo>
-                  <a:pt x="2944582" y="-12952"/>
-                  <a:pt x="3420817" y="-27100"/>
-                  <a:pt x="3582762" y="0"/>
-                </a:cubicBezTo>
-                <a:cubicBezTo>
-                  <a:pt x="3744707" y="27100"/>
-                  <a:pt x="4023584" y="-9167"/>
-                  <a:pt x="4165675" y="0"/>
-                </a:cubicBezTo>
-                <a:cubicBezTo>
-                  <a:pt x="4307766" y="9167"/>
-                  <a:pt x="4770188" y="27031"/>
-                  <a:pt x="5009894" y="0"/>
-                </a:cubicBezTo>
-                <a:cubicBezTo>
-                  <a:pt x="5249600" y="-27031"/>
-                  <a:pt x="5349881" y="-194"/>
-                  <a:pt x="5505706" y="0"/>
-                </a:cubicBezTo>
-                <a:cubicBezTo>
-                  <a:pt x="5661531" y="194"/>
-                  <a:pt x="6129254" y="-29363"/>
-                  <a:pt x="6349925" y="0"/>
-                </a:cubicBezTo>
-                <a:cubicBezTo>
-                  <a:pt x="6570596" y="29363"/>
-                  <a:pt x="6581199" y="-14617"/>
-                  <a:pt x="6758634" y="0"/>
-                </a:cubicBezTo>
-                <a:cubicBezTo>
-                  <a:pt x="6936069" y="14617"/>
-                  <a:pt x="7246491" y="25675"/>
-                  <a:pt x="7428650" y="0"/>
-                </a:cubicBezTo>
-                <a:cubicBezTo>
-                  <a:pt x="7610809" y="-25675"/>
-                  <a:pt x="7825190" y="-17078"/>
-                  <a:pt x="8098665" y="0"/>
-                </a:cubicBezTo>
-                <a:cubicBezTo>
-                  <a:pt x="8372141" y="17078"/>
-                  <a:pt x="8559625" y="-21568"/>
-                  <a:pt x="8681579" y="0"/>
-                </a:cubicBezTo>
-                <a:cubicBezTo>
-                  <a:pt x="8803533" y="21568"/>
-                  <a:pt x="9307226" y="-46066"/>
-                  <a:pt x="9612900" y="0"/>
-                </a:cubicBezTo>
-                <a:cubicBezTo>
-                  <a:pt x="10119954" y="-10560"/>
-                  <a:pt x="10418674" y="366684"/>
-                  <a:pt x="10515600" y="902700"/>
-                </a:cubicBezTo>
-                <a:cubicBezTo>
-                  <a:pt x="10494548" y="1140809"/>
-                  <a:pt x="10524881" y="1252168"/>
-                  <a:pt x="10515600" y="1504482"/>
-                </a:cubicBezTo>
-                <a:cubicBezTo>
-                  <a:pt x="10506319" y="1756796"/>
-                  <a:pt x="10494309" y="1995078"/>
-                  <a:pt x="10515600" y="2178479"/>
-                </a:cubicBezTo>
-                <a:cubicBezTo>
-                  <a:pt x="10536891" y="2361880"/>
-                  <a:pt x="10522845" y="2487483"/>
-                  <a:pt x="10515600" y="2780261"/>
-                </a:cubicBezTo>
-                <a:cubicBezTo>
-                  <a:pt x="10508355" y="3073039"/>
-                  <a:pt x="10533694" y="3138252"/>
-                  <a:pt x="10515600" y="3273722"/>
-                </a:cubicBezTo>
-                <a:cubicBezTo>
-                  <a:pt x="10497506" y="3409192"/>
-                  <a:pt x="10514952" y="3569910"/>
-                  <a:pt x="10515600" y="3803291"/>
-                </a:cubicBezTo>
-                <a:cubicBezTo>
-                  <a:pt x="10516248" y="4036672"/>
-                  <a:pt x="10499126" y="4317688"/>
-                  <a:pt x="10515600" y="4513394"/>
-                </a:cubicBezTo>
-                <a:cubicBezTo>
-                  <a:pt x="10585499" y="4997151"/>
-                  <a:pt x="10115437" y="5453981"/>
-                  <a:pt x="9612900" y="5416094"/>
-                </a:cubicBezTo>
-                <a:cubicBezTo>
-                  <a:pt x="9473271" y="5418358"/>
-                  <a:pt x="9316384" y="5423764"/>
-                  <a:pt x="9117089" y="5416094"/>
-                </a:cubicBezTo>
-                <a:cubicBezTo>
-                  <a:pt x="8917794" y="5408424"/>
-                  <a:pt x="8902141" y="5433256"/>
-                  <a:pt x="8708379" y="5416094"/>
-                </a:cubicBezTo>
-                <a:cubicBezTo>
-                  <a:pt x="8514617" y="5398933"/>
-                  <a:pt x="8454700" y="5422387"/>
-                  <a:pt x="8299670" y="5416094"/>
-                </a:cubicBezTo>
-                <a:cubicBezTo>
-                  <a:pt x="8144640" y="5409801"/>
-                  <a:pt x="7907022" y="5398388"/>
-                  <a:pt x="7629654" y="5416094"/>
-                </a:cubicBezTo>
-                <a:cubicBezTo>
-                  <a:pt x="7352286" y="5433800"/>
-                  <a:pt x="7244777" y="5409877"/>
-                  <a:pt x="7133843" y="5416094"/>
-                </a:cubicBezTo>
-                <a:cubicBezTo>
-                  <a:pt x="7022909" y="5422311"/>
-                  <a:pt x="6748865" y="5379753"/>
-                  <a:pt x="6376726" y="5416094"/>
-                </a:cubicBezTo>
-                <a:cubicBezTo>
-                  <a:pt x="6004587" y="5452435"/>
-                  <a:pt x="5991442" y="5438860"/>
-                  <a:pt x="5880914" y="5416094"/>
-                </a:cubicBezTo>
-                <a:cubicBezTo>
-                  <a:pt x="5770386" y="5393328"/>
-                  <a:pt x="5294303" y="5440618"/>
-                  <a:pt x="5123797" y="5416094"/>
-                </a:cubicBezTo>
-                <a:cubicBezTo>
-                  <a:pt x="4953291" y="5391570"/>
-                  <a:pt x="4828705" y="5430421"/>
-                  <a:pt x="4715088" y="5416094"/>
-                </a:cubicBezTo>
-                <a:cubicBezTo>
-                  <a:pt x="4601471" y="5401767"/>
-                  <a:pt x="4227806" y="5381491"/>
-                  <a:pt x="3957970" y="5416094"/>
-                </a:cubicBezTo>
-                <a:cubicBezTo>
-                  <a:pt x="3688134" y="5450697"/>
-                  <a:pt x="3670638" y="5425309"/>
-                  <a:pt x="3462159" y="5416094"/>
-                </a:cubicBezTo>
-                <a:cubicBezTo>
-                  <a:pt x="3253680" y="5406879"/>
-                  <a:pt x="3167443" y="5432031"/>
-                  <a:pt x="3053449" y="5416094"/>
-                </a:cubicBezTo>
-                <a:cubicBezTo>
-                  <a:pt x="2939455" y="5400158"/>
-                  <a:pt x="2701485" y="5433995"/>
-                  <a:pt x="2557638" y="5416094"/>
-                </a:cubicBezTo>
-                <a:cubicBezTo>
-                  <a:pt x="2413791" y="5398193"/>
-                  <a:pt x="2168647" y="5424510"/>
-                  <a:pt x="1800521" y="5416094"/>
-                </a:cubicBezTo>
-                <a:cubicBezTo>
-                  <a:pt x="1432395" y="5407678"/>
-                  <a:pt x="1261364" y="5454497"/>
-                  <a:pt x="902700" y="5416094"/>
-                </a:cubicBezTo>
-                <a:cubicBezTo>
-                  <a:pt x="519468" y="5419760"/>
-                  <a:pt x="63003" y="5077223"/>
-                  <a:pt x="0" y="4513394"/>
-                </a:cubicBezTo>
-                <a:cubicBezTo>
-                  <a:pt x="-20265" y="4243495"/>
-                  <a:pt x="27650" y="4053844"/>
-                  <a:pt x="0" y="3911612"/>
-                </a:cubicBezTo>
-                <a:cubicBezTo>
-                  <a:pt x="-27650" y="3769380"/>
-                  <a:pt x="24988" y="3469350"/>
-                  <a:pt x="0" y="3309829"/>
-                </a:cubicBezTo>
-                <a:cubicBezTo>
-                  <a:pt x="-24988" y="3150308"/>
-                  <a:pt x="-16973" y="2933511"/>
-                  <a:pt x="0" y="2780261"/>
-                </a:cubicBezTo>
-                <a:cubicBezTo>
-                  <a:pt x="16973" y="2627011"/>
-                  <a:pt x="-11552" y="2315258"/>
-                  <a:pt x="0" y="2106265"/>
-                </a:cubicBezTo>
-                <a:cubicBezTo>
-                  <a:pt x="11552" y="1897272"/>
-                  <a:pt x="-9167" y="1726905"/>
-                  <a:pt x="0" y="1504482"/>
-                </a:cubicBezTo>
-                <a:cubicBezTo>
-                  <a:pt x="9167" y="1282059"/>
-                  <a:pt x="10972" y="1160784"/>
-                  <a:pt x="0" y="902700"/>
-                </a:cubicBezTo>
-                <a:close/>
-              </a:path>
-            </a:pathLst>
-          </a:custGeom>
-          <a:noFill/>
-          <a:ln w="60325" cap="rnd">
+          </a:prstGeom>
+          <a:ln w="31750" cmpd="sng">
             <a:solidFill>
               <a:schemeClr val="tx1"/>
             </a:solidFill>
-            <a:round/>
-            <a:extLst>
-              <a:ext uri="{C807C97D-BFC1-408E-A445-0C87EB9F89A2}">
-                <ask:lineSketchStyleProps xmlns:ask="http://schemas.microsoft.com/office/drawing/2018/sketchyshapes" sd="1219033472">
-                  <a:prstGeom prst="roundRect">
-                    <a:avLst/>
-                  </a:prstGeom>
-                  <ask:type>
-                    <ask:lineSketchFreehand/>
-                  </ask:type>
-                </ask:lineSketchStyleProps>
-              </a:ext>
-            </a:extLst>
           </a:ln>
         </p:spPr>
         <p:style>
-          <a:lnRef idx="2">
-            <a:schemeClr val="accent1">
-              <a:shade val="50000"/>
-            </a:schemeClr>
+          <a:lnRef idx="1">
+            <a:schemeClr val="accent1"/>
           </a:lnRef>
-          <a:fillRef idx="1">
+          <a:fillRef idx="0">
             <a:schemeClr val="accent1"/>
           </a:fillRef>
           <a:effectRef idx="0">
             <a:schemeClr val="accent1"/>
           </a:effectRef>
           <a:fontRef idx="minor">
-            <a:schemeClr val="lt1"/>
+            <a:schemeClr val="tx1"/>
           </a:fontRef>
         </p:style>
-        <p:txBody>
-          <a:bodyPr rtlCol="0" anchor="ctr"/>
-          <a:lstStyle/>
-          <a:p>
-            <a:pPr algn="ctr"/>
-            <a:endParaRPr lang="en-US"/>
-          </a:p>
-        </p:txBody>
-      </p:sp>
+      </p:cxnSp>
+      <p:cxnSp>
+        <p:nvCxnSpPr>
+          <p:cNvPr id="10" name="Прямая соединительная линия 9">
+            <a:extLst>
+              <a:ext uri="{FF2B5EF4-FFF2-40B4-BE49-F238E27FC236}">
+                <a16:creationId xmlns:a16="http://schemas.microsoft.com/office/drawing/2014/main" id="{EFAC2EA4-9BAA-B5A6-86BA-BA11672A194A}"/>
+              </a:ext>
+            </a:extLst>
+          </p:cNvPr>
+          <p:cNvCxnSpPr>
+            <a:cxnSpLocks/>
+          </p:cNvCxnSpPr>
+          <p:nvPr/>
+        </p:nvCxnSpPr>
+        <p:spPr>
+          <a:xfrm>
+            <a:off x="6316266" y="5016103"/>
+            <a:ext cx="556813" cy="1167916"/>
+          </a:xfrm>
+          <a:prstGeom prst="line">
+            <a:avLst/>
+          </a:prstGeom>
+          <a:ln w="31750" cmpd="sng">
+            <a:solidFill>
+              <a:schemeClr val="tx1"/>
+            </a:solidFill>
+          </a:ln>
+        </p:spPr>
+        <p:style>
+          <a:lnRef idx="1">
+            <a:schemeClr val="accent1"/>
+          </a:lnRef>
+          <a:fillRef idx="0">
+            <a:schemeClr val="accent1"/>
+          </a:fillRef>
+          <a:effectRef idx="0">
+            <a:schemeClr val="accent1"/>
+          </a:effectRef>
+          <a:fontRef idx="minor">
+            <a:schemeClr val="tx1"/>
+          </a:fontRef>
+        </p:style>
+      </p:cxnSp>
+      <p:cxnSp>
+        <p:nvCxnSpPr>
+          <p:cNvPr id="17" name="Прямая соединительная линия 16">
+            <a:extLst>
+              <a:ext uri="{FF2B5EF4-FFF2-40B4-BE49-F238E27FC236}">
+                <a16:creationId xmlns:a16="http://schemas.microsoft.com/office/drawing/2014/main" id="{EA1A8FE5-35C7-813C-FEAF-69BDB01CDD4D}"/>
+              </a:ext>
+            </a:extLst>
+          </p:cNvPr>
+          <p:cNvCxnSpPr>
+            <a:cxnSpLocks/>
+          </p:cNvCxnSpPr>
+          <p:nvPr/>
+        </p:nvCxnSpPr>
+        <p:spPr>
+          <a:xfrm flipH="1" flipV="1">
+            <a:off x="671783" y="494951"/>
+            <a:ext cx="883634" cy="5689068"/>
+          </a:xfrm>
+          <a:prstGeom prst="line">
+            <a:avLst/>
+          </a:prstGeom>
+          <a:ln w="31750" cmpd="sng">
+            <a:solidFill>
+              <a:schemeClr val="tx1"/>
+            </a:solidFill>
+          </a:ln>
+        </p:spPr>
+        <p:style>
+          <a:lnRef idx="1">
+            <a:schemeClr val="accent1"/>
+          </a:lnRef>
+          <a:fillRef idx="0">
+            <a:schemeClr val="accent1"/>
+          </a:fillRef>
+          <a:effectRef idx="0">
+            <a:schemeClr val="accent1"/>
+          </a:effectRef>
+          <a:fontRef idx="minor">
+            <a:schemeClr val="tx1"/>
+          </a:fontRef>
+        </p:style>
+      </p:cxnSp>
+      <p:cxnSp>
+        <p:nvCxnSpPr>
+          <p:cNvPr id="22" name="Прямая соединительная линия 21">
+            <a:extLst>
+              <a:ext uri="{FF2B5EF4-FFF2-40B4-BE49-F238E27FC236}">
+                <a16:creationId xmlns:a16="http://schemas.microsoft.com/office/drawing/2014/main" id="{08914719-CCCA-7A55-2A29-099EAEB80C12}"/>
+              </a:ext>
+            </a:extLst>
+          </p:cNvPr>
+          <p:cNvCxnSpPr>
+            <a:cxnSpLocks/>
+          </p:cNvCxnSpPr>
+          <p:nvPr/>
+        </p:nvCxnSpPr>
+        <p:spPr>
+          <a:xfrm flipV="1">
+            <a:off x="640428" y="1386874"/>
+            <a:ext cx="6232651" cy="4821881"/>
+          </a:xfrm>
+          <a:prstGeom prst="line">
+            <a:avLst/>
+          </a:prstGeom>
+          <a:ln w="31750" cmpd="sng">
+            <a:solidFill>
+              <a:schemeClr val="tx1"/>
+            </a:solidFill>
+          </a:ln>
+        </p:spPr>
+        <p:style>
+          <a:lnRef idx="1">
+            <a:schemeClr val="accent1"/>
+          </a:lnRef>
+          <a:fillRef idx="0">
+            <a:schemeClr val="accent1"/>
+          </a:fillRef>
+          <a:effectRef idx="0">
+            <a:schemeClr val="accent1"/>
+          </a:effectRef>
+          <a:fontRef idx="minor">
+            <a:schemeClr val="tx1"/>
+          </a:fontRef>
+        </p:style>
+      </p:cxnSp>
+      <p:cxnSp>
+        <p:nvCxnSpPr>
+          <p:cNvPr id="25" name="Прямая соединительная линия 24">
+            <a:extLst>
+              <a:ext uri="{FF2B5EF4-FFF2-40B4-BE49-F238E27FC236}">
+                <a16:creationId xmlns:a16="http://schemas.microsoft.com/office/drawing/2014/main" id="{A9F1129C-02B2-C656-81D0-7AA747C1FBA9}"/>
+              </a:ext>
+            </a:extLst>
+          </p:cNvPr>
+          <p:cNvCxnSpPr>
+            <a:cxnSpLocks/>
+          </p:cNvCxnSpPr>
+          <p:nvPr/>
+        </p:nvCxnSpPr>
+        <p:spPr>
+          <a:xfrm>
+            <a:off x="662642" y="714822"/>
+            <a:ext cx="6210437" cy="2048783"/>
+          </a:xfrm>
+          <a:prstGeom prst="line">
+            <a:avLst/>
+          </a:prstGeom>
+          <a:ln w="31750" cmpd="sng">
+            <a:solidFill>
+              <a:schemeClr val="tx1"/>
+            </a:solidFill>
+          </a:ln>
+        </p:spPr>
+        <p:style>
+          <a:lnRef idx="1">
+            <a:schemeClr val="accent1"/>
+          </a:lnRef>
+          <a:fillRef idx="0">
+            <a:schemeClr val="accent1"/>
+          </a:fillRef>
+          <a:effectRef idx="0">
+            <a:schemeClr val="accent1"/>
+          </a:effectRef>
+          <a:fontRef idx="minor">
+            <a:schemeClr val="tx1"/>
+          </a:fontRef>
+        </p:style>
+      </p:cxnSp>
+      <p:cxnSp>
+        <p:nvCxnSpPr>
+          <p:cNvPr id="26" name="Прямая соединительная линия 25">
+            <a:extLst>
+              <a:ext uri="{FF2B5EF4-FFF2-40B4-BE49-F238E27FC236}">
+                <a16:creationId xmlns:a16="http://schemas.microsoft.com/office/drawing/2014/main" id="{D4557FD8-68C2-41E1-0AEF-9A95C639F138}"/>
+              </a:ext>
+            </a:extLst>
+          </p:cNvPr>
+          <p:cNvCxnSpPr>
+            <a:cxnSpLocks/>
+          </p:cNvCxnSpPr>
+          <p:nvPr/>
+        </p:nvCxnSpPr>
+        <p:spPr>
+          <a:xfrm flipV="1">
+            <a:off x="637381" y="528111"/>
+            <a:ext cx="2064630" cy="4166353"/>
+          </a:xfrm>
+          <a:prstGeom prst="line">
+            <a:avLst/>
+          </a:prstGeom>
+          <a:ln w="31750" cmpd="sng">
+            <a:solidFill>
+              <a:schemeClr val="tx1"/>
+            </a:solidFill>
+          </a:ln>
+        </p:spPr>
+        <p:style>
+          <a:lnRef idx="1">
+            <a:schemeClr val="accent1"/>
+          </a:lnRef>
+          <a:fillRef idx="0">
+            <a:schemeClr val="accent1"/>
+          </a:fillRef>
+          <a:effectRef idx="0">
+            <a:schemeClr val="accent1"/>
+          </a:effectRef>
+          <a:fontRef idx="minor">
+            <a:schemeClr val="tx1"/>
+          </a:fontRef>
+        </p:style>
+      </p:cxnSp>
+      <p:cxnSp>
+        <p:nvCxnSpPr>
+          <p:cNvPr id="27" name="Прямая соединительная линия 26">
+            <a:extLst>
+              <a:ext uri="{FF2B5EF4-FFF2-40B4-BE49-F238E27FC236}">
+                <a16:creationId xmlns:a16="http://schemas.microsoft.com/office/drawing/2014/main" id="{140A9CAA-070D-B7C5-553D-AF2D14997F47}"/>
+              </a:ext>
+            </a:extLst>
+          </p:cNvPr>
+          <p:cNvCxnSpPr>
+            <a:cxnSpLocks/>
+          </p:cNvCxnSpPr>
+          <p:nvPr/>
+        </p:nvCxnSpPr>
+        <p:spPr>
+          <a:xfrm>
+            <a:off x="668736" y="1490541"/>
+            <a:ext cx="2371644" cy="4718214"/>
+          </a:xfrm>
+          <a:prstGeom prst="line">
+            <a:avLst/>
+          </a:prstGeom>
+          <a:ln w="31750" cmpd="sng">
+            <a:solidFill>
+              <a:schemeClr val="tx1"/>
+            </a:solidFill>
+          </a:ln>
+        </p:spPr>
+        <p:style>
+          <a:lnRef idx="1">
+            <a:schemeClr val="accent1"/>
+          </a:lnRef>
+          <a:fillRef idx="0">
+            <a:schemeClr val="accent1"/>
+          </a:fillRef>
+          <a:effectRef idx="0">
+            <a:schemeClr val="accent1"/>
+          </a:effectRef>
+          <a:fontRef idx="minor">
+            <a:schemeClr val="tx1"/>
+          </a:fontRef>
+        </p:style>
+      </p:cxnSp>
+      <p:cxnSp>
+        <p:nvCxnSpPr>
+          <p:cNvPr id="28" name="Прямая соединительная линия 27">
+            <a:extLst>
+              <a:ext uri="{FF2B5EF4-FFF2-40B4-BE49-F238E27FC236}">
+                <a16:creationId xmlns:a16="http://schemas.microsoft.com/office/drawing/2014/main" id="{07F187C4-6CDF-FAD0-A7A7-33F217179574}"/>
+              </a:ext>
+            </a:extLst>
+          </p:cNvPr>
+          <p:cNvCxnSpPr>
+            <a:cxnSpLocks/>
+          </p:cNvCxnSpPr>
+          <p:nvPr/>
+        </p:nvCxnSpPr>
+        <p:spPr>
+          <a:xfrm flipV="1">
+            <a:off x="643475" y="503375"/>
+            <a:ext cx="2822855" cy="5331117"/>
+          </a:xfrm>
+          <a:prstGeom prst="line">
+            <a:avLst/>
+          </a:prstGeom>
+          <a:ln w="31750" cmpd="sng">
+            <a:solidFill>
+              <a:schemeClr val="tx1"/>
+            </a:solidFill>
+          </a:ln>
+        </p:spPr>
+        <p:style>
+          <a:lnRef idx="1">
+            <a:schemeClr val="accent1"/>
+          </a:lnRef>
+          <a:fillRef idx="0">
+            <a:schemeClr val="accent1"/>
+          </a:fillRef>
+          <a:effectRef idx="0">
+            <a:schemeClr val="accent1"/>
+          </a:effectRef>
+          <a:fontRef idx="minor">
+            <a:schemeClr val="tx1"/>
+          </a:fontRef>
+        </p:style>
+      </p:cxnSp>
+      <p:cxnSp>
+        <p:nvCxnSpPr>
+          <p:cNvPr id="30" name="Прямая соединительная линия 29">
+            <a:extLst>
+              <a:ext uri="{FF2B5EF4-FFF2-40B4-BE49-F238E27FC236}">
+                <a16:creationId xmlns:a16="http://schemas.microsoft.com/office/drawing/2014/main" id="{60BCACBF-A662-9243-E9F7-4F9D8853F610}"/>
+              </a:ext>
+            </a:extLst>
+          </p:cNvPr>
+          <p:cNvCxnSpPr>
+            <a:cxnSpLocks/>
+          </p:cNvCxnSpPr>
+          <p:nvPr/>
+        </p:nvCxnSpPr>
+        <p:spPr>
+          <a:xfrm flipV="1">
+            <a:off x="665689" y="494951"/>
+            <a:ext cx="4482960" cy="2934049"/>
+          </a:xfrm>
+          <a:prstGeom prst="line">
+            <a:avLst/>
+          </a:prstGeom>
+          <a:ln w="31750" cmpd="sng">
+            <a:solidFill>
+              <a:schemeClr val="tx1"/>
+            </a:solidFill>
+          </a:ln>
+        </p:spPr>
+        <p:style>
+          <a:lnRef idx="1">
+            <a:schemeClr val="accent1"/>
+          </a:lnRef>
+          <a:fillRef idx="0">
+            <a:schemeClr val="accent1"/>
+          </a:fillRef>
+          <a:effectRef idx="0">
+            <a:schemeClr val="accent1"/>
+          </a:effectRef>
+          <a:fontRef idx="minor">
+            <a:schemeClr val="tx1"/>
+          </a:fontRef>
+        </p:style>
+      </p:cxnSp>
+      <p:cxnSp>
+        <p:nvCxnSpPr>
+          <p:cNvPr id="33" name="Прямая соединительная линия 32">
+            <a:extLst>
+              <a:ext uri="{FF2B5EF4-FFF2-40B4-BE49-F238E27FC236}">
+                <a16:creationId xmlns:a16="http://schemas.microsoft.com/office/drawing/2014/main" id="{B415E712-6B71-E9FF-AE98-6A92B0A6EAF0}"/>
+              </a:ext>
+            </a:extLst>
+          </p:cNvPr>
+          <p:cNvCxnSpPr>
+            <a:cxnSpLocks/>
+          </p:cNvCxnSpPr>
+          <p:nvPr/>
+        </p:nvCxnSpPr>
+        <p:spPr>
+          <a:xfrm>
+            <a:off x="640428" y="2796549"/>
+            <a:ext cx="1667121" cy="3436692"/>
+          </a:xfrm>
+          <a:prstGeom prst="line">
+            <a:avLst/>
+          </a:prstGeom>
+          <a:ln w="31750" cmpd="sng">
+            <a:solidFill>
+              <a:schemeClr val="tx1"/>
+            </a:solidFill>
+          </a:ln>
+        </p:spPr>
+        <p:style>
+          <a:lnRef idx="1">
+            <a:schemeClr val="accent1"/>
+          </a:lnRef>
+          <a:fillRef idx="0">
+            <a:schemeClr val="accent1"/>
+          </a:fillRef>
+          <a:effectRef idx="0">
+            <a:schemeClr val="accent1"/>
+          </a:effectRef>
+          <a:fontRef idx="minor">
+            <a:schemeClr val="tx1"/>
+          </a:fontRef>
+        </p:style>
+      </p:cxnSp>
+      <p:cxnSp>
+        <p:nvCxnSpPr>
+          <p:cNvPr id="38" name="Прямая соединительная линия 37">
+            <a:extLst>
+              <a:ext uri="{FF2B5EF4-FFF2-40B4-BE49-F238E27FC236}">
+                <a16:creationId xmlns:a16="http://schemas.microsoft.com/office/drawing/2014/main" id="{6BD5370D-86F9-2CD5-2DA0-33EE7D2FCAA1}"/>
+              </a:ext>
+            </a:extLst>
+          </p:cNvPr>
+          <p:cNvCxnSpPr>
+            <a:cxnSpLocks/>
+          </p:cNvCxnSpPr>
+          <p:nvPr/>
+        </p:nvCxnSpPr>
+        <p:spPr>
+          <a:xfrm flipH="1">
+            <a:off x="671783" y="478639"/>
+            <a:ext cx="3666315" cy="1806337"/>
+          </a:xfrm>
+          <a:prstGeom prst="line">
+            <a:avLst/>
+          </a:prstGeom>
+          <a:ln w="31750" cmpd="sng">
+            <a:solidFill>
+              <a:schemeClr val="tx1"/>
+            </a:solidFill>
+          </a:ln>
+        </p:spPr>
+        <p:style>
+          <a:lnRef idx="1">
+            <a:schemeClr val="accent1"/>
+          </a:lnRef>
+          <a:fillRef idx="0">
+            <a:schemeClr val="accent1"/>
+          </a:fillRef>
+          <a:effectRef idx="0">
+            <a:schemeClr val="accent1"/>
+          </a:effectRef>
+          <a:fontRef idx="minor">
+            <a:schemeClr val="tx1"/>
+          </a:fontRef>
+        </p:style>
+      </p:cxnSp>
+      <p:cxnSp>
+        <p:nvCxnSpPr>
+          <p:cNvPr id="39" name="Прямая соединительная линия 38">
+            <a:extLst>
+              <a:ext uri="{FF2B5EF4-FFF2-40B4-BE49-F238E27FC236}">
+                <a16:creationId xmlns:a16="http://schemas.microsoft.com/office/drawing/2014/main" id="{B01E8958-7A7C-2A7E-F20E-43049B07AC29}"/>
+              </a:ext>
+            </a:extLst>
+          </p:cNvPr>
+          <p:cNvCxnSpPr>
+            <a:cxnSpLocks/>
+          </p:cNvCxnSpPr>
+          <p:nvPr/>
+        </p:nvCxnSpPr>
+        <p:spPr>
+          <a:xfrm flipH="1" flipV="1">
+            <a:off x="1338512" y="494951"/>
+            <a:ext cx="454551" cy="1952071"/>
+          </a:xfrm>
+          <a:prstGeom prst="line">
+            <a:avLst/>
+          </a:prstGeom>
+          <a:ln w="31750" cmpd="sng">
+            <a:solidFill>
+              <a:schemeClr val="tx1"/>
+            </a:solidFill>
+          </a:ln>
+        </p:spPr>
+        <p:style>
+          <a:lnRef idx="1">
+            <a:schemeClr val="accent1"/>
+          </a:lnRef>
+          <a:fillRef idx="0">
+            <a:schemeClr val="accent1"/>
+          </a:fillRef>
+          <a:effectRef idx="0">
+            <a:schemeClr val="accent1"/>
+          </a:effectRef>
+          <a:fontRef idx="minor">
+            <a:schemeClr val="tx1"/>
+          </a:fontRef>
+        </p:style>
+      </p:cxnSp>
+      <p:cxnSp>
+        <p:nvCxnSpPr>
+          <p:cNvPr id="48" name="Прямая соединительная линия 47">
+            <a:extLst>
+              <a:ext uri="{FF2B5EF4-FFF2-40B4-BE49-F238E27FC236}">
+                <a16:creationId xmlns:a16="http://schemas.microsoft.com/office/drawing/2014/main" id="{BB95BD00-376E-EAE2-1E97-3C166C1BF6BC}"/>
+              </a:ext>
+            </a:extLst>
+          </p:cNvPr>
+          <p:cNvCxnSpPr>
+            <a:cxnSpLocks/>
+          </p:cNvCxnSpPr>
+          <p:nvPr/>
+        </p:nvCxnSpPr>
+        <p:spPr>
+          <a:xfrm flipV="1">
+            <a:off x="659595" y="486527"/>
+            <a:ext cx="1483397" cy="1543702"/>
+          </a:xfrm>
+          <a:prstGeom prst="line">
+            <a:avLst/>
+          </a:prstGeom>
+          <a:ln w="31750" cmpd="sng">
+            <a:solidFill>
+              <a:schemeClr val="tx1"/>
+            </a:solidFill>
+          </a:ln>
+        </p:spPr>
+        <p:style>
+          <a:lnRef idx="1">
+            <a:schemeClr val="accent1"/>
+          </a:lnRef>
+          <a:fillRef idx="0">
+            <a:schemeClr val="accent1"/>
+          </a:fillRef>
+          <a:effectRef idx="0">
+            <a:schemeClr val="accent1"/>
+          </a:effectRef>
+          <a:fontRef idx="minor">
+            <a:schemeClr val="tx1"/>
+          </a:fontRef>
+        </p:style>
+      </p:cxnSp>
+      <p:cxnSp>
+        <p:nvCxnSpPr>
+          <p:cNvPr id="51" name="Прямая соединительная линия 50">
+            <a:extLst>
+              <a:ext uri="{FF2B5EF4-FFF2-40B4-BE49-F238E27FC236}">
+                <a16:creationId xmlns:a16="http://schemas.microsoft.com/office/drawing/2014/main" id="{F1804663-1DC5-03D4-2A8B-5B3FB93A9CA0}"/>
+              </a:ext>
+            </a:extLst>
+          </p:cNvPr>
+          <p:cNvCxnSpPr>
+            <a:cxnSpLocks/>
+          </p:cNvCxnSpPr>
+          <p:nvPr/>
+        </p:nvCxnSpPr>
+        <p:spPr>
+          <a:xfrm flipH="1" flipV="1">
+            <a:off x="2977116" y="494951"/>
+            <a:ext cx="1626567" cy="1989855"/>
+          </a:xfrm>
+          <a:prstGeom prst="line">
+            <a:avLst/>
+          </a:prstGeom>
+          <a:ln w="31750" cmpd="sng">
+            <a:solidFill>
+              <a:schemeClr val="tx1"/>
+            </a:solidFill>
+          </a:ln>
+        </p:spPr>
+        <p:style>
+          <a:lnRef idx="1">
+            <a:schemeClr val="accent1"/>
+          </a:lnRef>
+          <a:fillRef idx="0">
+            <a:schemeClr val="accent1"/>
+          </a:fillRef>
+          <a:effectRef idx="0">
+            <a:schemeClr val="accent1"/>
+          </a:effectRef>
+          <a:fontRef idx="minor">
+            <a:schemeClr val="tx1"/>
+          </a:fontRef>
+        </p:style>
+      </p:cxnSp>
+      <p:cxnSp>
+        <p:nvCxnSpPr>
+          <p:cNvPr id="53" name="Прямая соединительная линия 52">
+            <a:extLst>
+              <a:ext uri="{FF2B5EF4-FFF2-40B4-BE49-F238E27FC236}">
+                <a16:creationId xmlns:a16="http://schemas.microsoft.com/office/drawing/2014/main" id="{6A7897F7-53F3-D914-B4FD-439F9B304D14}"/>
+              </a:ext>
+            </a:extLst>
+          </p:cNvPr>
+          <p:cNvCxnSpPr>
+            <a:cxnSpLocks/>
+          </p:cNvCxnSpPr>
+          <p:nvPr/>
+        </p:nvCxnSpPr>
+        <p:spPr>
+          <a:xfrm flipV="1">
+            <a:off x="3099323" y="494951"/>
+            <a:ext cx="587959" cy="2166524"/>
+          </a:xfrm>
+          <a:prstGeom prst="line">
+            <a:avLst/>
+          </a:prstGeom>
+          <a:ln w="31750" cmpd="sng">
+            <a:solidFill>
+              <a:schemeClr val="tx1"/>
+            </a:solidFill>
+          </a:ln>
+        </p:spPr>
+        <p:style>
+          <a:lnRef idx="1">
+            <a:schemeClr val="accent1"/>
+          </a:lnRef>
+          <a:fillRef idx="0">
+            <a:schemeClr val="accent1"/>
+          </a:fillRef>
+          <a:effectRef idx="0">
+            <a:schemeClr val="accent1"/>
+          </a:effectRef>
+          <a:fontRef idx="minor">
+            <a:schemeClr val="tx1"/>
+          </a:fontRef>
+        </p:style>
+      </p:cxnSp>
+      <p:cxnSp>
+        <p:nvCxnSpPr>
+          <p:cNvPr id="95" name="Прямая соединительная линия 94">
+            <a:extLst>
+              <a:ext uri="{FF2B5EF4-FFF2-40B4-BE49-F238E27FC236}">
+                <a16:creationId xmlns:a16="http://schemas.microsoft.com/office/drawing/2014/main" id="{1D7E35CB-D902-B83A-1CAE-4DA5A511AB38}"/>
+              </a:ext>
+            </a:extLst>
+          </p:cNvPr>
+          <p:cNvCxnSpPr>
+            <a:cxnSpLocks/>
+          </p:cNvCxnSpPr>
+          <p:nvPr/>
+        </p:nvCxnSpPr>
+        <p:spPr>
+          <a:xfrm flipH="1">
+            <a:off x="5849208" y="3305896"/>
+            <a:ext cx="1023871" cy="2902983"/>
+          </a:xfrm>
+          <a:prstGeom prst="line">
+            <a:avLst/>
+          </a:prstGeom>
+          <a:ln w="31750" cmpd="sng">
+            <a:solidFill>
+              <a:schemeClr val="tx1"/>
+            </a:solidFill>
+          </a:ln>
+        </p:spPr>
+        <p:style>
+          <a:lnRef idx="1">
+            <a:schemeClr val="accent1"/>
+          </a:lnRef>
+          <a:fillRef idx="0">
+            <a:schemeClr val="accent1"/>
+          </a:fillRef>
+          <a:effectRef idx="0">
+            <a:schemeClr val="accent1"/>
+          </a:effectRef>
+          <a:fontRef idx="minor">
+            <a:schemeClr val="tx1"/>
+          </a:fontRef>
+        </p:style>
+      </p:cxnSp>
+      <p:cxnSp>
+        <p:nvCxnSpPr>
+          <p:cNvPr id="97" name="Прямая соединительная линия 96">
+            <a:extLst>
+              <a:ext uri="{FF2B5EF4-FFF2-40B4-BE49-F238E27FC236}">
+                <a16:creationId xmlns:a16="http://schemas.microsoft.com/office/drawing/2014/main" id="{2F8B6E91-556B-E8B5-DCCD-899CBD970463}"/>
+              </a:ext>
+            </a:extLst>
+          </p:cNvPr>
+          <p:cNvCxnSpPr>
+            <a:cxnSpLocks/>
+          </p:cNvCxnSpPr>
+          <p:nvPr/>
+        </p:nvCxnSpPr>
+        <p:spPr>
+          <a:xfrm flipV="1">
+            <a:off x="4752109" y="4343400"/>
+            <a:ext cx="2113811" cy="1865355"/>
+          </a:xfrm>
+          <a:prstGeom prst="line">
+            <a:avLst/>
+          </a:prstGeom>
+          <a:ln w="31750" cmpd="sng">
+            <a:solidFill>
+              <a:schemeClr val="tx1"/>
+            </a:solidFill>
+          </a:ln>
+        </p:spPr>
+        <p:style>
+          <a:lnRef idx="1">
+            <a:schemeClr val="accent1"/>
+          </a:lnRef>
+          <a:fillRef idx="0">
+            <a:schemeClr val="accent1"/>
+          </a:fillRef>
+          <a:effectRef idx="0">
+            <a:schemeClr val="accent1"/>
+          </a:effectRef>
+          <a:fontRef idx="minor">
+            <a:schemeClr val="tx1"/>
+          </a:fontRef>
+        </p:style>
+      </p:cxnSp>
+      <p:cxnSp>
+        <p:nvCxnSpPr>
+          <p:cNvPr id="100" name="Прямая соединительная линия 99">
+            <a:extLst>
+              <a:ext uri="{FF2B5EF4-FFF2-40B4-BE49-F238E27FC236}">
+                <a16:creationId xmlns:a16="http://schemas.microsoft.com/office/drawing/2014/main" id="{B10D7A08-C216-0AA8-554C-B55D5EC25D86}"/>
+              </a:ext>
+            </a:extLst>
+          </p:cNvPr>
+          <p:cNvCxnSpPr>
+            <a:cxnSpLocks/>
+          </p:cNvCxnSpPr>
+          <p:nvPr/>
+        </p:nvCxnSpPr>
+        <p:spPr>
+          <a:xfrm>
+            <a:off x="3737625" y="5057294"/>
+            <a:ext cx="556813" cy="1167916"/>
+          </a:xfrm>
+          <a:prstGeom prst="line">
+            <a:avLst/>
+          </a:prstGeom>
+          <a:ln w="31750" cmpd="sng">
+            <a:solidFill>
+              <a:schemeClr val="tx1"/>
+            </a:solidFill>
+          </a:ln>
+        </p:spPr>
+        <p:style>
+          <a:lnRef idx="1">
+            <a:schemeClr val="accent1"/>
+          </a:lnRef>
+          <a:fillRef idx="0">
+            <a:schemeClr val="accent1"/>
+          </a:fillRef>
+          <a:effectRef idx="0">
+            <a:schemeClr val="accent1"/>
+          </a:effectRef>
+          <a:fontRef idx="minor">
+            <a:schemeClr val="tx1"/>
+          </a:fontRef>
+        </p:style>
+      </p:cxnSp>
+      <p:cxnSp>
+        <p:nvCxnSpPr>
+          <p:cNvPr id="101" name="Прямая соединительная линия 100">
+            <a:extLst>
+              <a:ext uri="{FF2B5EF4-FFF2-40B4-BE49-F238E27FC236}">
+                <a16:creationId xmlns:a16="http://schemas.microsoft.com/office/drawing/2014/main" id="{F21A4A38-BE8C-99D8-4211-8F0A6CDA592F}"/>
+              </a:ext>
+            </a:extLst>
+          </p:cNvPr>
+          <p:cNvCxnSpPr>
+            <a:cxnSpLocks/>
+          </p:cNvCxnSpPr>
+          <p:nvPr/>
+        </p:nvCxnSpPr>
+        <p:spPr>
+          <a:xfrm>
+            <a:off x="4927912" y="5057294"/>
+            <a:ext cx="556813" cy="1167916"/>
+          </a:xfrm>
+          <a:prstGeom prst="line">
+            <a:avLst/>
+          </a:prstGeom>
+          <a:ln w="31750" cmpd="sng">
+            <a:solidFill>
+              <a:schemeClr val="tx1"/>
+            </a:solidFill>
+          </a:ln>
+        </p:spPr>
+        <p:style>
+          <a:lnRef idx="1">
+            <a:schemeClr val="accent1"/>
+          </a:lnRef>
+          <a:fillRef idx="0">
+            <a:schemeClr val="accent1"/>
+          </a:fillRef>
+          <a:effectRef idx="0">
+            <a:schemeClr val="accent1"/>
+          </a:effectRef>
+          <a:fontRef idx="minor">
+            <a:schemeClr val="tx1"/>
+          </a:fontRef>
+        </p:style>
+      </p:cxnSp>
+      <p:cxnSp>
+        <p:nvCxnSpPr>
+          <p:cNvPr id="102" name="Прямая соединительная линия 101">
+            <a:extLst>
+              <a:ext uri="{FF2B5EF4-FFF2-40B4-BE49-F238E27FC236}">
+                <a16:creationId xmlns:a16="http://schemas.microsoft.com/office/drawing/2014/main" id="{247169FC-1301-6476-904D-284DAEF29E00}"/>
+              </a:ext>
+            </a:extLst>
+          </p:cNvPr>
+          <p:cNvCxnSpPr>
+            <a:cxnSpLocks/>
+          </p:cNvCxnSpPr>
+          <p:nvPr/>
+        </p:nvCxnSpPr>
+        <p:spPr>
+          <a:xfrm>
+            <a:off x="5924436" y="2347237"/>
+            <a:ext cx="962301" cy="1553911"/>
+          </a:xfrm>
+          <a:prstGeom prst="line">
+            <a:avLst/>
+          </a:prstGeom>
+          <a:ln w="31750" cmpd="sng">
+            <a:solidFill>
+              <a:schemeClr val="tx1"/>
+            </a:solidFill>
+          </a:ln>
+        </p:spPr>
+        <p:style>
+          <a:lnRef idx="1">
+            <a:schemeClr val="accent1"/>
+          </a:lnRef>
+          <a:fillRef idx="0">
+            <a:schemeClr val="accent1"/>
+          </a:fillRef>
+          <a:effectRef idx="0">
+            <a:schemeClr val="accent1"/>
+          </a:effectRef>
+          <a:fontRef idx="minor">
+            <a:schemeClr val="tx1"/>
+          </a:fontRef>
+        </p:style>
+      </p:cxnSp>
+      <p:cxnSp>
+        <p:nvCxnSpPr>
+          <p:cNvPr id="109" name="Прямая соединительная линия 108">
+            <a:extLst>
+              <a:ext uri="{FF2B5EF4-FFF2-40B4-BE49-F238E27FC236}">
+                <a16:creationId xmlns:a16="http://schemas.microsoft.com/office/drawing/2014/main" id="{2C96E060-D6C2-0C77-DFB9-EE4D47E82CA5}"/>
+              </a:ext>
+            </a:extLst>
+          </p:cNvPr>
+          <p:cNvCxnSpPr>
+            <a:cxnSpLocks/>
+          </p:cNvCxnSpPr>
+          <p:nvPr/>
+        </p:nvCxnSpPr>
+        <p:spPr>
+          <a:xfrm>
+            <a:off x="5704366" y="486527"/>
+            <a:ext cx="1161554" cy="2109596"/>
+          </a:xfrm>
+          <a:prstGeom prst="line">
+            <a:avLst/>
+          </a:prstGeom>
+          <a:ln w="31750" cmpd="sng">
+            <a:solidFill>
+              <a:schemeClr val="tx1"/>
+            </a:solidFill>
+          </a:ln>
+        </p:spPr>
+        <p:style>
+          <a:lnRef idx="1">
+            <a:schemeClr val="accent1"/>
+          </a:lnRef>
+          <a:fillRef idx="0">
+            <a:schemeClr val="accent1"/>
+          </a:fillRef>
+          <a:effectRef idx="0">
+            <a:schemeClr val="accent1"/>
+          </a:effectRef>
+          <a:fontRef idx="minor">
+            <a:schemeClr val="tx1"/>
+          </a:fontRef>
+        </p:style>
+      </p:cxnSp>
+      <p:pic>
+        <p:nvPicPr>
+          <p:cNvPr id="66" name="Рисунок 65" descr="Изображение выглядит как Графика, мультфильм, дизайн&#10;&#10;Содержимое, созданное искусственным интеллектом, может быть неверным.">
+            <a:extLst>
+              <a:ext uri="{FF2B5EF4-FFF2-40B4-BE49-F238E27FC236}">
+                <a16:creationId xmlns:a16="http://schemas.microsoft.com/office/drawing/2014/main" id="{84ED9356-94FD-12B4-AEBB-B10E7DD0FC7E}"/>
+              </a:ext>
+            </a:extLst>
+          </p:cNvPr>
+          <p:cNvPicPr>
+            <a:picLocks noChangeAspect="1"/>
+          </p:cNvPicPr>
+          <p:nvPr/>
+        </p:nvPicPr>
+        <p:blipFill>
+          <a:blip r:embed="rId3">
+            <a:extLst>
+              <a:ext uri="{28A0092B-C50C-407E-A947-70E740481C1C}">
+                <a14:useLocalDpi xmlns:a14="http://schemas.microsoft.com/office/drawing/2010/main" val="0"/>
+              </a:ext>
+            </a:extLst>
+          </a:blip>
+          <a:stretch>
+            <a:fillRect/>
+          </a:stretch>
+        </p:blipFill>
+        <p:spPr>
+          <a:xfrm rot="20853295">
+            <a:off x="970616" y="-234954"/>
+            <a:ext cx="3810000" cy="2857500"/>
+          </a:xfrm>
+          <a:prstGeom prst="rect">
+            <a:avLst/>
+          </a:prstGeom>
+        </p:spPr>
+      </p:pic>
+      <p:pic>
+        <p:nvPicPr>
+          <p:cNvPr id="4" name="Рисунок 3">
+            <a:extLst>
+              <a:ext uri="{FF2B5EF4-FFF2-40B4-BE49-F238E27FC236}">
+                <a16:creationId xmlns:a16="http://schemas.microsoft.com/office/drawing/2014/main" id="{8D10F8EB-C7FA-4F43-65D2-BC62649A10B5}"/>
+              </a:ext>
+            </a:extLst>
+          </p:cNvPr>
+          <p:cNvPicPr>
+            <a:picLocks noChangeAspect="1"/>
+          </p:cNvPicPr>
+          <p:nvPr/>
+        </p:nvPicPr>
+        <p:blipFill>
+          <a:blip r:embed="rId4">
+            <a:extLst>
+              <a:ext uri="{28A0092B-C50C-407E-A947-70E740481C1C}">
+                <a14:useLocalDpi xmlns:a14="http://schemas.microsoft.com/office/drawing/2010/main" val="0"/>
+              </a:ext>
+            </a:extLst>
+          </a:blip>
+          <a:stretch>
+            <a:fillRect/>
+          </a:stretch>
+        </p:blipFill>
+        <p:spPr>
+          <a:xfrm rot="20884432">
+            <a:off x="1939863" y="1431057"/>
+            <a:ext cx="4404384" cy="4404384"/>
+          </a:xfrm>
+          <a:prstGeom prst="rect">
+            <a:avLst/>
+          </a:prstGeom>
+        </p:spPr>
+      </p:pic>
     </p:spTree>
     <p:extLst>
       <p:ext uri="{BB962C8B-B14F-4D97-AF65-F5344CB8AC3E}">
-        <p14:creationId xmlns:p14="http://schemas.microsoft.com/office/powerpoint/2010/main" val="3562676915"/>
+        <p14:creationId xmlns:p14="http://schemas.microsoft.com/office/powerpoint/2010/main" val="2560714702"/>
       </p:ext>
     </p:extLst>
   </p:cSld>

</xml_diff>

<commit_message>
docs: presentation add data flow
</commit_message>
<xml_diff>
--- a/docs/Oopps! Trap!.pptx
+++ b/docs/Oopps! Trap!.pptx
@@ -4,12 +4,16 @@
   <p:sldMasterIdLst>
     <p:sldMasterId id="2147483735" r:id="rId1"/>
   </p:sldMasterIdLst>
+  <p:notesMasterIdLst>
+    <p:notesMasterId r:id="rId8"/>
+  </p:notesMasterIdLst>
   <p:sldIdLst>
     <p:sldId id="256" r:id="rId2"/>
     <p:sldId id="258" r:id="rId3"/>
     <p:sldId id="265" r:id="rId4"/>
     <p:sldId id="262" r:id="rId5"/>
-    <p:sldId id="264" r:id="rId6"/>
+    <p:sldId id="266" r:id="rId6"/>
+    <p:sldId id="264" r:id="rId7"/>
   </p:sldIdLst>
   <p:sldSz cx="12192000" cy="6858000"/>
   <p:notesSz cx="6858000" cy="9144000"/>
@@ -109,6 +113,439 @@
     </a:lvl9pPr>
   </p:defaultTextStyle>
 </p:presentation>
+</file>
+
+<file path=ppt/notesMasters/notesMaster1.xml><?xml version="1.0" encoding="utf-8"?>
+<p:notesMaster xmlns:a="http://schemas.openxmlformats.org/drawingml/2006/main" xmlns:r="http://schemas.openxmlformats.org/officeDocument/2006/relationships" xmlns:p="http://schemas.openxmlformats.org/presentationml/2006/main">
+  <p:cSld>
+    <p:bg>
+      <p:bgRef idx="1001">
+        <a:schemeClr val="bg1"/>
+      </p:bgRef>
+    </p:bg>
+    <p:spTree>
+      <p:nvGrpSpPr>
+        <p:cNvPr id="1" name=""/>
+        <p:cNvGrpSpPr/>
+        <p:nvPr/>
+      </p:nvGrpSpPr>
+      <p:grpSpPr>
+        <a:xfrm>
+          <a:off x="0" y="0"/>
+          <a:ext cx="0" cy="0"/>
+          <a:chOff x="0" y="0"/>
+          <a:chExt cx="0" cy="0"/>
+        </a:xfrm>
+      </p:grpSpPr>
+      <p:sp>
+        <p:nvSpPr>
+          <p:cNvPr id="2" name="Верхний колонтитул 1"/>
+          <p:cNvSpPr>
+            <a:spLocks noGrp="1"/>
+          </p:cNvSpPr>
+          <p:nvPr>
+            <p:ph type="hdr" sz="quarter"/>
+          </p:nvPr>
+        </p:nvSpPr>
+        <p:spPr>
+          <a:xfrm>
+            <a:off x="0" y="0"/>
+            <a:ext cx="2971800" cy="458788"/>
+          </a:xfrm>
+          <a:prstGeom prst="rect">
+            <a:avLst/>
+          </a:prstGeom>
+        </p:spPr>
+        <p:txBody>
+          <a:bodyPr vert="horz" lIns="91440" tIns="45720" rIns="91440" bIns="45720" rtlCol="0"/>
+          <a:lstStyle>
+            <a:lvl1pPr algn="l">
+              <a:defRPr sz="1200"/>
+            </a:lvl1pPr>
+          </a:lstStyle>
+          <a:p>
+            <a:endParaRPr lang="ru-RU"/>
+          </a:p>
+        </p:txBody>
+      </p:sp>
+      <p:sp>
+        <p:nvSpPr>
+          <p:cNvPr id="3" name="Дата 2"/>
+          <p:cNvSpPr>
+            <a:spLocks noGrp="1"/>
+          </p:cNvSpPr>
+          <p:nvPr>
+            <p:ph type="dt" idx="1"/>
+          </p:nvPr>
+        </p:nvSpPr>
+        <p:spPr>
+          <a:xfrm>
+            <a:off x="3884613" y="0"/>
+            <a:ext cx="2971800" cy="458788"/>
+          </a:xfrm>
+          <a:prstGeom prst="rect">
+            <a:avLst/>
+          </a:prstGeom>
+        </p:spPr>
+        <p:txBody>
+          <a:bodyPr vert="horz" lIns="91440" tIns="45720" rIns="91440" bIns="45720" rtlCol="0"/>
+          <a:lstStyle>
+            <a:lvl1pPr algn="r">
+              <a:defRPr sz="1200"/>
+            </a:lvl1pPr>
+          </a:lstStyle>
+          <a:p>
+            <a:fld id="{6B26FC14-0283-4E9F-B486-5D7D6FD58771}" type="datetimeFigureOut">
+              <a:rPr lang="ru-RU" smtClean="0"/>
+              <a:t>09.09.2025</a:t>
+            </a:fld>
+            <a:endParaRPr lang="ru-RU"/>
+          </a:p>
+        </p:txBody>
+      </p:sp>
+      <p:sp>
+        <p:nvSpPr>
+          <p:cNvPr id="4" name="Образ слайда 3"/>
+          <p:cNvSpPr>
+            <a:spLocks noGrp="1" noRot="1" noChangeAspect="1"/>
+          </p:cNvSpPr>
+          <p:nvPr>
+            <p:ph type="sldImg" idx="2"/>
+          </p:nvPr>
+        </p:nvSpPr>
+        <p:spPr>
+          <a:xfrm>
+            <a:off x="685800" y="1143000"/>
+            <a:ext cx="5486400" cy="3086100"/>
+          </a:xfrm>
+          <a:prstGeom prst="rect">
+            <a:avLst/>
+          </a:prstGeom>
+          <a:noFill/>
+          <a:ln w="12700">
+            <a:solidFill>
+              <a:prstClr val="black"/>
+            </a:solidFill>
+          </a:ln>
+        </p:spPr>
+        <p:txBody>
+          <a:bodyPr vert="horz" lIns="91440" tIns="45720" rIns="91440" bIns="45720" rtlCol="0" anchor="ctr"/>
+          <a:lstStyle/>
+          <a:p>
+            <a:endParaRPr lang="ru-RU"/>
+          </a:p>
+        </p:txBody>
+      </p:sp>
+      <p:sp>
+        <p:nvSpPr>
+          <p:cNvPr id="5" name="Заметки 4"/>
+          <p:cNvSpPr>
+            <a:spLocks noGrp="1"/>
+          </p:cNvSpPr>
+          <p:nvPr>
+            <p:ph type="body" sz="quarter" idx="3"/>
+          </p:nvPr>
+        </p:nvSpPr>
+        <p:spPr>
+          <a:xfrm>
+            <a:off x="685800" y="4400550"/>
+            <a:ext cx="5486400" cy="3600450"/>
+          </a:xfrm>
+          <a:prstGeom prst="rect">
+            <a:avLst/>
+          </a:prstGeom>
+        </p:spPr>
+        <p:txBody>
+          <a:bodyPr vert="horz" lIns="91440" tIns="45720" rIns="91440" bIns="45720" rtlCol="0"/>
+          <a:lstStyle/>
+          <a:p>
+            <a:pPr lvl="0"/>
+            <a:r>
+              <a:rPr lang="ru-RU"/>
+              <a:t>Образец текста</a:t>
+            </a:r>
+          </a:p>
+          <a:p>
+            <a:pPr lvl="1"/>
+            <a:r>
+              <a:rPr lang="ru-RU"/>
+              <a:t>Второй уровень</a:t>
+            </a:r>
+          </a:p>
+          <a:p>
+            <a:pPr lvl="2"/>
+            <a:r>
+              <a:rPr lang="ru-RU"/>
+              <a:t>Третий уровень</a:t>
+            </a:r>
+          </a:p>
+          <a:p>
+            <a:pPr lvl="3"/>
+            <a:r>
+              <a:rPr lang="ru-RU"/>
+              <a:t>Четвертый уровень</a:t>
+            </a:r>
+          </a:p>
+          <a:p>
+            <a:pPr lvl="4"/>
+            <a:r>
+              <a:rPr lang="ru-RU"/>
+              <a:t>Пятый уровень</a:t>
+            </a:r>
+          </a:p>
+        </p:txBody>
+      </p:sp>
+      <p:sp>
+        <p:nvSpPr>
+          <p:cNvPr id="6" name="Нижний колонтитул 5"/>
+          <p:cNvSpPr>
+            <a:spLocks noGrp="1"/>
+          </p:cNvSpPr>
+          <p:nvPr>
+            <p:ph type="ftr" sz="quarter" idx="4"/>
+          </p:nvPr>
+        </p:nvSpPr>
+        <p:spPr>
+          <a:xfrm>
+            <a:off x="0" y="8685213"/>
+            <a:ext cx="2971800" cy="458787"/>
+          </a:xfrm>
+          <a:prstGeom prst="rect">
+            <a:avLst/>
+          </a:prstGeom>
+        </p:spPr>
+        <p:txBody>
+          <a:bodyPr vert="horz" lIns="91440" tIns="45720" rIns="91440" bIns="45720" rtlCol="0" anchor="b"/>
+          <a:lstStyle>
+            <a:lvl1pPr algn="l">
+              <a:defRPr sz="1200"/>
+            </a:lvl1pPr>
+          </a:lstStyle>
+          <a:p>
+            <a:endParaRPr lang="ru-RU"/>
+          </a:p>
+        </p:txBody>
+      </p:sp>
+      <p:sp>
+        <p:nvSpPr>
+          <p:cNvPr id="7" name="Номер слайда 6"/>
+          <p:cNvSpPr>
+            <a:spLocks noGrp="1"/>
+          </p:cNvSpPr>
+          <p:nvPr>
+            <p:ph type="sldNum" sz="quarter" idx="5"/>
+          </p:nvPr>
+        </p:nvSpPr>
+        <p:spPr>
+          <a:xfrm>
+            <a:off x="3884613" y="8685213"/>
+            <a:ext cx="2971800" cy="458787"/>
+          </a:xfrm>
+          <a:prstGeom prst="rect">
+            <a:avLst/>
+          </a:prstGeom>
+        </p:spPr>
+        <p:txBody>
+          <a:bodyPr vert="horz" lIns="91440" tIns="45720" rIns="91440" bIns="45720" rtlCol="0" anchor="b"/>
+          <a:lstStyle>
+            <a:lvl1pPr algn="r">
+              <a:defRPr sz="1200"/>
+            </a:lvl1pPr>
+          </a:lstStyle>
+          <a:p>
+            <a:fld id="{D815036F-8E96-44FE-A181-6D06A80638A0}" type="slidenum">
+              <a:rPr lang="ru-RU" smtClean="0"/>
+              <a:t>‹#›</a:t>
+            </a:fld>
+            <a:endParaRPr lang="ru-RU"/>
+          </a:p>
+        </p:txBody>
+      </p:sp>
+    </p:spTree>
+    <p:extLst>
+      <p:ext uri="{BB962C8B-B14F-4D97-AF65-F5344CB8AC3E}">
+        <p14:creationId xmlns:p14="http://schemas.microsoft.com/office/powerpoint/2010/main" val="2788503511"/>
+      </p:ext>
+    </p:extLst>
+  </p:cSld>
+  <p:clrMap bg1="lt1" tx1="dk1" bg2="lt2" tx2="dk2" accent1="accent1" accent2="accent2" accent3="accent3" accent4="accent4" accent5="accent5" accent6="accent6" hlink="hlink" folHlink="folHlink"/>
+  <p:notesStyle>
+    <a:lvl1pPr marL="0" algn="l" defTabSz="914400" rtl="0" eaLnBrk="1" latinLnBrk="0" hangingPunct="1">
+      <a:defRPr sz="1200" kern="1200">
+        <a:solidFill>
+          <a:schemeClr val="tx1"/>
+        </a:solidFill>
+        <a:latin typeface="+mn-lt"/>
+        <a:ea typeface="+mn-ea"/>
+        <a:cs typeface="+mn-cs"/>
+      </a:defRPr>
+    </a:lvl1pPr>
+    <a:lvl2pPr marL="457200" algn="l" defTabSz="914400" rtl="0" eaLnBrk="1" latinLnBrk="0" hangingPunct="1">
+      <a:defRPr sz="1200" kern="1200">
+        <a:solidFill>
+          <a:schemeClr val="tx1"/>
+        </a:solidFill>
+        <a:latin typeface="+mn-lt"/>
+        <a:ea typeface="+mn-ea"/>
+        <a:cs typeface="+mn-cs"/>
+      </a:defRPr>
+    </a:lvl2pPr>
+    <a:lvl3pPr marL="914400" algn="l" defTabSz="914400" rtl="0" eaLnBrk="1" latinLnBrk="0" hangingPunct="1">
+      <a:defRPr sz="1200" kern="1200">
+        <a:solidFill>
+          <a:schemeClr val="tx1"/>
+        </a:solidFill>
+        <a:latin typeface="+mn-lt"/>
+        <a:ea typeface="+mn-ea"/>
+        <a:cs typeface="+mn-cs"/>
+      </a:defRPr>
+    </a:lvl3pPr>
+    <a:lvl4pPr marL="1371600" algn="l" defTabSz="914400" rtl="0" eaLnBrk="1" latinLnBrk="0" hangingPunct="1">
+      <a:defRPr sz="1200" kern="1200">
+        <a:solidFill>
+          <a:schemeClr val="tx1"/>
+        </a:solidFill>
+        <a:latin typeface="+mn-lt"/>
+        <a:ea typeface="+mn-ea"/>
+        <a:cs typeface="+mn-cs"/>
+      </a:defRPr>
+    </a:lvl4pPr>
+    <a:lvl5pPr marL="1828800" algn="l" defTabSz="914400" rtl="0" eaLnBrk="1" latinLnBrk="0" hangingPunct="1">
+      <a:defRPr sz="1200" kern="1200">
+        <a:solidFill>
+          <a:schemeClr val="tx1"/>
+        </a:solidFill>
+        <a:latin typeface="+mn-lt"/>
+        <a:ea typeface="+mn-ea"/>
+        <a:cs typeface="+mn-cs"/>
+      </a:defRPr>
+    </a:lvl5pPr>
+    <a:lvl6pPr marL="2286000" algn="l" defTabSz="914400" rtl="0" eaLnBrk="1" latinLnBrk="0" hangingPunct="1">
+      <a:defRPr sz="1200" kern="1200">
+        <a:solidFill>
+          <a:schemeClr val="tx1"/>
+        </a:solidFill>
+        <a:latin typeface="+mn-lt"/>
+        <a:ea typeface="+mn-ea"/>
+        <a:cs typeface="+mn-cs"/>
+      </a:defRPr>
+    </a:lvl6pPr>
+    <a:lvl7pPr marL="2743200" algn="l" defTabSz="914400" rtl="0" eaLnBrk="1" latinLnBrk="0" hangingPunct="1">
+      <a:defRPr sz="1200" kern="1200">
+        <a:solidFill>
+          <a:schemeClr val="tx1"/>
+        </a:solidFill>
+        <a:latin typeface="+mn-lt"/>
+        <a:ea typeface="+mn-ea"/>
+        <a:cs typeface="+mn-cs"/>
+      </a:defRPr>
+    </a:lvl7pPr>
+    <a:lvl8pPr marL="3200400" algn="l" defTabSz="914400" rtl="0" eaLnBrk="1" latinLnBrk="0" hangingPunct="1">
+      <a:defRPr sz="1200" kern="1200">
+        <a:solidFill>
+          <a:schemeClr val="tx1"/>
+        </a:solidFill>
+        <a:latin typeface="+mn-lt"/>
+        <a:ea typeface="+mn-ea"/>
+        <a:cs typeface="+mn-cs"/>
+      </a:defRPr>
+    </a:lvl8pPr>
+    <a:lvl9pPr marL="3657600" algn="l" defTabSz="914400" rtl="0" eaLnBrk="1" latinLnBrk="0" hangingPunct="1">
+      <a:defRPr sz="1200" kern="1200">
+        <a:solidFill>
+          <a:schemeClr val="tx1"/>
+        </a:solidFill>
+        <a:latin typeface="+mn-lt"/>
+        <a:ea typeface="+mn-ea"/>
+        <a:cs typeface="+mn-cs"/>
+      </a:defRPr>
+    </a:lvl9pPr>
+  </p:notesStyle>
+</p:notesMaster>
+</file>
+
+<file path=ppt/notesSlides/notesSlide1.xml><?xml version="1.0" encoding="utf-8"?>
+<p:notes xmlns:a="http://schemas.openxmlformats.org/drawingml/2006/main" xmlns:r="http://schemas.openxmlformats.org/officeDocument/2006/relationships" xmlns:p="http://schemas.openxmlformats.org/presentationml/2006/main">
+  <p:cSld>
+    <p:spTree>
+      <p:nvGrpSpPr>
+        <p:cNvPr id="1" name=""/>
+        <p:cNvGrpSpPr/>
+        <p:nvPr/>
+      </p:nvGrpSpPr>
+      <p:grpSpPr>
+        <a:xfrm>
+          <a:off x="0" y="0"/>
+          <a:ext cx="0" cy="0"/>
+          <a:chOff x="0" y="0"/>
+          <a:chExt cx="0" cy="0"/>
+        </a:xfrm>
+      </p:grpSpPr>
+      <p:sp>
+        <p:nvSpPr>
+          <p:cNvPr id="2" name="Образ слайда 1"/>
+          <p:cNvSpPr>
+            <a:spLocks noGrp="1" noRot="1" noChangeAspect="1"/>
+          </p:cNvSpPr>
+          <p:nvPr>
+            <p:ph type="sldImg"/>
+          </p:nvPr>
+        </p:nvSpPr>
+        <p:spPr/>
+      </p:sp>
+      <p:sp>
+        <p:nvSpPr>
+          <p:cNvPr id="3" name="Заметки 2"/>
+          <p:cNvSpPr>
+            <a:spLocks noGrp="1"/>
+          </p:cNvSpPr>
+          <p:nvPr>
+            <p:ph type="body" idx="1"/>
+          </p:nvPr>
+        </p:nvSpPr>
+        <p:spPr/>
+        <p:txBody>
+          <a:bodyPr/>
+          <a:lstStyle/>
+          <a:p>
+            <a:endParaRPr lang="ru-RU"/>
+          </a:p>
+        </p:txBody>
+      </p:sp>
+      <p:sp>
+        <p:nvSpPr>
+          <p:cNvPr id="4" name="Номер слайда 3"/>
+          <p:cNvSpPr>
+            <a:spLocks noGrp="1"/>
+          </p:cNvSpPr>
+          <p:nvPr>
+            <p:ph type="sldNum" sz="quarter" idx="5"/>
+          </p:nvPr>
+        </p:nvSpPr>
+        <p:spPr/>
+        <p:txBody>
+          <a:bodyPr/>
+          <a:lstStyle/>
+          <a:p>
+            <a:fld id="{D815036F-8E96-44FE-A181-6D06A80638A0}" type="slidenum">
+              <a:rPr lang="ru-RU" smtClean="0"/>
+              <a:t>4</a:t>
+            </a:fld>
+            <a:endParaRPr lang="ru-RU"/>
+          </a:p>
+        </p:txBody>
+      </p:sp>
+    </p:spTree>
+    <p:extLst>
+      <p:ext uri="{BB962C8B-B14F-4D97-AF65-F5344CB8AC3E}">
+        <p14:creationId xmlns:p14="http://schemas.microsoft.com/office/powerpoint/2010/main" val="3601054578"/>
+      </p:ext>
+    </p:extLst>
+  </p:cSld>
+  <p:clrMapOvr>
+    <a:masterClrMapping/>
+  </p:clrMapOvr>
+</p:notes>
 </file>
 
 <file path=ppt/slideLayouts/slideLayout1.xml><?xml version="1.0" encoding="utf-8"?>
@@ -11997,7 +12434,7 @@
           <p:nvPr/>
         </p:nvPicPr>
         <p:blipFill>
-          <a:blip r:embed="rId2">
+          <a:blip r:embed="rId3">
             <a:alphaModFix amt="40000"/>
           </a:blip>
           <a:srcRect b="15730"/>
@@ -12697,52 +13134,53 @@
           </a:p>
         </p:txBody>
       </p:sp>
-      <p:sp>
-        <p:nvSpPr>
-          <p:cNvPr id="3" name="Подзаголовок 2">
+      <p:pic>
+        <p:nvPicPr>
+          <p:cNvPr id="8" name="Рисунок 7">
             <a:extLst>
               <a:ext uri="{FF2B5EF4-FFF2-40B4-BE49-F238E27FC236}">
-                <a16:creationId xmlns:a16="http://schemas.microsoft.com/office/drawing/2014/main" id="{C4D8B2A0-0E48-3DF8-FB9A-0654F5F0E52E}"/>
+                <a16:creationId xmlns:a16="http://schemas.microsoft.com/office/drawing/2014/main" id="{4A15E557-AD22-546C-0845-51B64C45E709}"/>
               </a:ext>
             </a:extLst>
           </p:cNvPr>
-          <p:cNvSpPr>
-            <a:spLocks noGrp="1"/>
-          </p:cNvSpPr>
-          <p:nvPr>
-            <p:ph type="subTitle" idx="1"/>
-          </p:nvPr>
-        </p:nvSpPr>
+          <p:cNvPicPr>
+            <a:picLocks noChangeAspect="1"/>
+          </p:cNvPicPr>
+          <p:nvPr/>
+        </p:nvPicPr>
+        <p:blipFill>
+          <a:blip r:embed="rId4">
+            <a:extLst>
+              <a:ext uri="{BEBA8EAE-BF5A-486C-A8C5-ECC9F3942E4B}">
+                <a14:imgProps xmlns:a14="http://schemas.microsoft.com/office/drawing/2010/main">
+                  <a14:imgLayer r:embed="rId5">
+                    <a14:imgEffect>
+                      <a14:colorTemperature colorTemp="4700"/>
+                    </a14:imgEffect>
+                  </a14:imgLayer>
+                </a14:imgProps>
+              </a:ext>
+            </a:extLst>
+          </a:blip>
+          <a:srcRect l="1833" r="4697"/>
+          <a:stretch>
+            <a:fillRect/>
+          </a:stretch>
+        </p:blipFill>
         <p:spPr>
           <a:xfrm>
-            <a:off x="838200" y="2004446"/>
-            <a:ext cx="2469356" cy="780759"/>
+            <a:off x="2477098" y="1811336"/>
+            <a:ext cx="6202776" cy="4289712"/>
           </a:xfrm>
+          <a:prstGeom prst="rect">
+            <a:avLst/>
+          </a:prstGeom>
+          <a:ln>
+            <a:noFill/>
+          </a:ln>
+          <a:effectLst/>
         </p:spPr>
-        <p:txBody>
-          <a:bodyPr vert="horz" lIns="91440" tIns="45720" rIns="91440" bIns="45720" rtlCol="0">
-            <a:normAutofit/>
-          </a:bodyPr>
-          <a:lstStyle/>
-          <a:p>
-            <a:pPr indent="-228600">
-              <a:lnSpc>
-                <a:spcPct val="100000"/>
-              </a:lnSpc>
-              <a:spcAft>
-                <a:spcPts val="600"/>
-              </a:spcAft>
-              <a:buFont typeface="Arial" panose="020B0604020202020204" pitchFamily="34" charset="0"/>
-              <a:buChar char="•"/>
-            </a:pPr>
-            <a:r>
-              <a:rPr lang="ru-RU" sz="2600" dirty="0"/>
-              <a:t>Сюда схему…</a:t>
-            </a:r>
-            <a:endParaRPr lang="en-US" sz="2600" dirty="0"/>
-          </a:p>
-        </p:txBody>
-      </p:sp>
+      </p:pic>
     </p:spTree>
     <p:extLst>
       <p:ext uri="{BB962C8B-B14F-4D97-AF65-F5344CB8AC3E}">
@@ -12758,6 +13196,1541 @@
 </file>
 
 <file path=ppt/slides/slide5.xml><?xml version="1.0" encoding="utf-8"?>
+<p:sld xmlns:a="http://schemas.openxmlformats.org/drawingml/2006/main" xmlns:r="http://schemas.openxmlformats.org/officeDocument/2006/relationships" xmlns:p="http://schemas.openxmlformats.org/presentationml/2006/main">
+  <p:cSld>
+    <p:bg>
+      <p:bgPr>
+        <a:solidFill>
+          <a:schemeClr val="bg1"/>
+        </a:solidFill>
+        <a:effectLst/>
+      </p:bgPr>
+    </p:bg>
+    <p:spTree>
+      <p:nvGrpSpPr>
+        <p:cNvPr id="1" name="">
+          <a:extLst>
+            <a:ext uri="{FF2B5EF4-FFF2-40B4-BE49-F238E27FC236}">
+              <a16:creationId xmlns:a16="http://schemas.microsoft.com/office/drawing/2014/main" id="{7F5B680A-B77B-14B7-EB86-D90CC655CEF0}"/>
+            </a:ext>
+          </a:extLst>
+        </p:cNvPr>
+        <p:cNvGrpSpPr/>
+        <p:nvPr/>
+      </p:nvGrpSpPr>
+      <p:grpSpPr>
+        <a:xfrm>
+          <a:off x="0" y="0"/>
+          <a:ext cx="0" cy="0"/>
+          <a:chOff x="0" y="0"/>
+          <a:chExt cx="0" cy="0"/>
+        </a:xfrm>
+      </p:grpSpPr>
+      <p:sp>
+        <p:nvSpPr>
+          <p:cNvPr id="41" name="Rectangle 40">
+            <a:extLst>
+              <a:ext uri="{FF2B5EF4-FFF2-40B4-BE49-F238E27FC236}">
+                <a16:creationId xmlns:a16="http://schemas.microsoft.com/office/drawing/2014/main" id="{3702DFE7-8128-27EA-C488-B7D91AA22663}"/>
+              </a:ext>
+              <a:ext uri="{C183D7F6-B498-43B3-948B-1728B52AA6E4}">
+                <adec:decorative xmlns:adec="http://schemas.microsoft.com/office/drawing/2017/decorative" val="1"/>
+              </a:ext>
+            </a:extLst>
+          </p:cNvPr>
+          <p:cNvSpPr>
+            <a:spLocks noGrp="1" noRot="1" noChangeAspect="1" noMove="1" noResize="1" noEditPoints="1" noAdjustHandles="1" noChangeArrowheads="1" noChangeShapeType="1" noTextEdit="1"/>
+          </p:cNvSpPr>
+          <p:nvPr>
+            <p:extLst>
+              <p:ext uri="{386F3935-93C4-4BCD-93E2-E3B085C9AB24}">
+                <p16:designElem xmlns:p16="http://schemas.microsoft.com/office/powerpoint/2015/main" val="1"/>
+              </p:ext>
+            </p:extLst>
+          </p:nvPr>
+        </p:nvSpPr>
+        <p:spPr>
+          <a:xfrm>
+            <a:off x="838199" y="1709928"/>
+            <a:ext cx="10515600" cy="27432"/>
+          </a:xfrm>
+          <a:custGeom>
+            <a:avLst/>
+            <a:gdLst>
+              <a:gd name="connsiteX0" fmla="*/ 0 w 10515600"/>
+              <a:gd name="connsiteY0" fmla="*/ 0 h 27432"/>
+              <a:gd name="connsiteX1" fmla="*/ 446913 w 10515600"/>
+              <a:gd name="connsiteY1" fmla="*/ 0 h 27432"/>
+              <a:gd name="connsiteX2" fmla="*/ 1104138 w 10515600"/>
+              <a:gd name="connsiteY2" fmla="*/ 0 h 27432"/>
+              <a:gd name="connsiteX3" fmla="*/ 1866519 w 10515600"/>
+              <a:gd name="connsiteY3" fmla="*/ 0 h 27432"/>
+              <a:gd name="connsiteX4" fmla="*/ 2208276 w 10515600"/>
+              <a:gd name="connsiteY4" fmla="*/ 0 h 27432"/>
+              <a:gd name="connsiteX5" fmla="*/ 2550033 w 10515600"/>
+              <a:gd name="connsiteY5" fmla="*/ 0 h 27432"/>
+              <a:gd name="connsiteX6" fmla="*/ 3417570 w 10515600"/>
+              <a:gd name="connsiteY6" fmla="*/ 0 h 27432"/>
+              <a:gd name="connsiteX7" fmla="*/ 4074795 w 10515600"/>
+              <a:gd name="connsiteY7" fmla="*/ 0 h 27432"/>
+              <a:gd name="connsiteX8" fmla="*/ 4416552 w 10515600"/>
+              <a:gd name="connsiteY8" fmla="*/ 0 h 27432"/>
+              <a:gd name="connsiteX9" fmla="*/ 5073777 w 10515600"/>
+              <a:gd name="connsiteY9" fmla="*/ 0 h 27432"/>
+              <a:gd name="connsiteX10" fmla="*/ 5941314 w 10515600"/>
+              <a:gd name="connsiteY10" fmla="*/ 0 h 27432"/>
+              <a:gd name="connsiteX11" fmla="*/ 6493383 w 10515600"/>
+              <a:gd name="connsiteY11" fmla="*/ 0 h 27432"/>
+              <a:gd name="connsiteX12" fmla="*/ 7045452 w 10515600"/>
+              <a:gd name="connsiteY12" fmla="*/ 0 h 27432"/>
+              <a:gd name="connsiteX13" fmla="*/ 7702677 w 10515600"/>
+              <a:gd name="connsiteY13" fmla="*/ 0 h 27432"/>
+              <a:gd name="connsiteX14" fmla="*/ 8465058 w 10515600"/>
+              <a:gd name="connsiteY14" fmla="*/ 0 h 27432"/>
+              <a:gd name="connsiteX15" fmla="*/ 9227439 w 10515600"/>
+              <a:gd name="connsiteY15" fmla="*/ 0 h 27432"/>
+              <a:gd name="connsiteX16" fmla="*/ 10515600 w 10515600"/>
+              <a:gd name="connsiteY16" fmla="*/ 0 h 27432"/>
+              <a:gd name="connsiteX17" fmla="*/ 10515600 w 10515600"/>
+              <a:gd name="connsiteY17" fmla="*/ 27432 h 27432"/>
+              <a:gd name="connsiteX18" fmla="*/ 10068687 w 10515600"/>
+              <a:gd name="connsiteY18" fmla="*/ 27432 h 27432"/>
+              <a:gd name="connsiteX19" fmla="*/ 9201150 w 10515600"/>
+              <a:gd name="connsiteY19" fmla="*/ 27432 h 27432"/>
+              <a:gd name="connsiteX20" fmla="*/ 8543925 w 10515600"/>
+              <a:gd name="connsiteY20" fmla="*/ 27432 h 27432"/>
+              <a:gd name="connsiteX21" fmla="*/ 8202168 w 10515600"/>
+              <a:gd name="connsiteY21" fmla="*/ 27432 h 27432"/>
+              <a:gd name="connsiteX22" fmla="*/ 7544943 w 10515600"/>
+              <a:gd name="connsiteY22" fmla="*/ 27432 h 27432"/>
+              <a:gd name="connsiteX23" fmla="*/ 6992874 w 10515600"/>
+              <a:gd name="connsiteY23" fmla="*/ 27432 h 27432"/>
+              <a:gd name="connsiteX24" fmla="*/ 6440805 w 10515600"/>
+              <a:gd name="connsiteY24" fmla="*/ 27432 h 27432"/>
+              <a:gd name="connsiteX25" fmla="*/ 5888736 w 10515600"/>
+              <a:gd name="connsiteY25" fmla="*/ 27432 h 27432"/>
+              <a:gd name="connsiteX26" fmla="*/ 5336667 w 10515600"/>
+              <a:gd name="connsiteY26" fmla="*/ 27432 h 27432"/>
+              <a:gd name="connsiteX27" fmla="*/ 4574286 w 10515600"/>
+              <a:gd name="connsiteY27" fmla="*/ 27432 h 27432"/>
+              <a:gd name="connsiteX28" fmla="*/ 3917061 w 10515600"/>
+              <a:gd name="connsiteY28" fmla="*/ 27432 h 27432"/>
+              <a:gd name="connsiteX29" fmla="*/ 3575304 w 10515600"/>
+              <a:gd name="connsiteY29" fmla="*/ 27432 h 27432"/>
+              <a:gd name="connsiteX30" fmla="*/ 3023235 w 10515600"/>
+              <a:gd name="connsiteY30" fmla="*/ 27432 h 27432"/>
+              <a:gd name="connsiteX31" fmla="*/ 2260854 w 10515600"/>
+              <a:gd name="connsiteY31" fmla="*/ 27432 h 27432"/>
+              <a:gd name="connsiteX32" fmla="*/ 1813941 w 10515600"/>
+              <a:gd name="connsiteY32" fmla="*/ 27432 h 27432"/>
+              <a:gd name="connsiteX33" fmla="*/ 946404 w 10515600"/>
+              <a:gd name="connsiteY33" fmla="*/ 27432 h 27432"/>
+              <a:gd name="connsiteX34" fmla="*/ 0 w 10515600"/>
+              <a:gd name="connsiteY34" fmla="*/ 27432 h 27432"/>
+              <a:gd name="connsiteX35" fmla="*/ 0 w 10515600"/>
+              <a:gd name="connsiteY35" fmla="*/ 0 h 27432"/>
+            </a:gdLst>
+            <a:ahLst/>
+            <a:cxnLst>
+              <a:cxn ang="0">
+                <a:pos x="connsiteX0" y="connsiteY0"/>
+              </a:cxn>
+              <a:cxn ang="0">
+                <a:pos x="connsiteX1" y="connsiteY1"/>
+              </a:cxn>
+              <a:cxn ang="0">
+                <a:pos x="connsiteX2" y="connsiteY2"/>
+              </a:cxn>
+              <a:cxn ang="0">
+                <a:pos x="connsiteX3" y="connsiteY3"/>
+              </a:cxn>
+              <a:cxn ang="0">
+                <a:pos x="connsiteX4" y="connsiteY4"/>
+              </a:cxn>
+              <a:cxn ang="0">
+                <a:pos x="connsiteX5" y="connsiteY5"/>
+              </a:cxn>
+              <a:cxn ang="0">
+                <a:pos x="connsiteX6" y="connsiteY6"/>
+              </a:cxn>
+              <a:cxn ang="0">
+                <a:pos x="connsiteX7" y="connsiteY7"/>
+              </a:cxn>
+              <a:cxn ang="0">
+                <a:pos x="connsiteX8" y="connsiteY8"/>
+              </a:cxn>
+              <a:cxn ang="0">
+                <a:pos x="connsiteX9" y="connsiteY9"/>
+              </a:cxn>
+              <a:cxn ang="0">
+                <a:pos x="connsiteX10" y="connsiteY10"/>
+              </a:cxn>
+              <a:cxn ang="0">
+                <a:pos x="connsiteX11" y="connsiteY11"/>
+              </a:cxn>
+              <a:cxn ang="0">
+                <a:pos x="connsiteX12" y="connsiteY12"/>
+              </a:cxn>
+              <a:cxn ang="0">
+                <a:pos x="connsiteX13" y="connsiteY13"/>
+              </a:cxn>
+              <a:cxn ang="0">
+                <a:pos x="connsiteX14" y="connsiteY14"/>
+              </a:cxn>
+              <a:cxn ang="0">
+                <a:pos x="connsiteX15" y="connsiteY15"/>
+              </a:cxn>
+              <a:cxn ang="0">
+                <a:pos x="connsiteX16" y="connsiteY16"/>
+              </a:cxn>
+              <a:cxn ang="0">
+                <a:pos x="connsiteX17" y="connsiteY17"/>
+              </a:cxn>
+              <a:cxn ang="0">
+                <a:pos x="connsiteX18" y="connsiteY18"/>
+              </a:cxn>
+              <a:cxn ang="0">
+                <a:pos x="connsiteX19" y="connsiteY19"/>
+              </a:cxn>
+              <a:cxn ang="0">
+                <a:pos x="connsiteX20" y="connsiteY20"/>
+              </a:cxn>
+              <a:cxn ang="0">
+                <a:pos x="connsiteX21" y="connsiteY21"/>
+              </a:cxn>
+              <a:cxn ang="0">
+                <a:pos x="connsiteX22" y="connsiteY22"/>
+              </a:cxn>
+              <a:cxn ang="0">
+                <a:pos x="connsiteX23" y="connsiteY23"/>
+              </a:cxn>
+              <a:cxn ang="0">
+                <a:pos x="connsiteX24" y="connsiteY24"/>
+              </a:cxn>
+              <a:cxn ang="0">
+                <a:pos x="connsiteX25" y="connsiteY25"/>
+              </a:cxn>
+              <a:cxn ang="0">
+                <a:pos x="connsiteX26" y="connsiteY26"/>
+              </a:cxn>
+              <a:cxn ang="0">
+                <a:pos x="connsiteX27" y="connsiteY27"/>
+              </a:cxn>
+              <a:cxn ang="0">
+                <a:pos x="connsiteX28" y="connsiteY28"/>
+              </a:cxn>
+              <a:cxn ang="0">
+                <a:pos x="connsiteX29" y="connsiteY29"/>
+              </a:cxn>
+              <a:cxn ang="0">
+                <a:pos x="connsiteX30" y="connsiteY30"/>
+              </a:cxn>
+              <a:cxn ang="0">
+                <a:pos x="connsiteX31" y="connsiteY31"/>
+              </a:cxn>
+              <a:cxn ang="0">
+                <a:pos x="connsiteX32" y="connsiteY32"/>
+              </a:cxn>
+              <a:cxn ang="0">
+                <a:pos x="connsiteX33" y="connsiteY33"/>
+              </a:cxn>
+              <a:cxn ang="0">
+                <a:pos x="connsiteX34" y="connsiteY34"/>
+              </a:cxn>
+              <a:cxn ang="0">
+                <a:pos x="connsiteX35" y="connsiteY35"/>
+              </a:cxn>
+            </a:cxnLst>
+            <a:rect l="l" t="t" r="r" b="b"/>
+            <a:pathLst>
+              <a:path w="10515600" h="27432" fill="none" extrusionOk="0">
+                <a:moveTo>
+                  <a:pt x="0" y="0"/>
+                </a:moveTo>
+                <a:cubicBezTo>
+                  <a:pt x="119693" y="-14343"/>
+                  <a:pt x="253007" y="-7583"/>
+                  <a:pt x="446913" y="0"/>
+                </a:cubicBezTo>
+                <a:cubicBezTo>
+                  <a:pt x="640819" y="7583"/>
+                  <a:pt x="841419" y="-7067"/>
+                  <a:pt x="1104138" y="0"/>
+                </a:cubicBezTo>
+                <a:cubicBezTo>
+                  <a:pt x="1366858" y="7067"/>
+                  <a:pt x="1495525" y="1255"/>
+                  <a:pt x="1866519" y="0"/>
+                </a:cubicBezTo>
+                <a:cubicBezTo>
+                  <a:pt x="2237513" y="-1255"/>
+                  <a:pt x="2043820" y="12003"/>
+                  <a:pt x="2208276" y="0"/>
+                </a:cubicBezTo>
+                <a:cubicBezTo>
+                  <a:pt x="2372732" y="-12003"/>
+                  <a:pt x="2419452" y="9887"/>
+                  <a:pt x="2550033" y="0"/>
+                </a:cubicBezTo>
+                <a:cubicBezTo>
+                  <a:pt x="2680614" y="-9887"/>
+                  <a:pt x="3098156" y="3827"/>
+                  <a:pt x="3417570" y="0"/>
+                </a:cubicBezTo>
+                <a:cubicBezTo>
+                  <a:pt x="3736984" y="-3827"/>
+                  <a:pt x="3916040" y="-6233"/>
+                  <a:pt x="4074795" y="0"/>
+                </a:cubicBezTo>
+                <a:cubicBezTo>
+                  <a:pt x="4233551" y="6233"/>
+                  <a:pt x="4279253" y="5661"/>
+                  <a:pt x="4416552" y="0"/>
+                </a:cubicBezTo>
+                <a:cubicBezTo>
+                  <a:pt x="4553851" y="-5661"/>
+                  <a:pt x="4915758" y="26022"/>
+                  <a:pt x="5073777" y="0"/>
+                </a:cubicBezTo>
+                <a:cubicBezTo>
+                  <a:pt x="5231797" y="-26022"/>
+                  <a:pt x="5612089" y="32230"/>
+                  <a:pt x="5941314" y="0"/>
+                </a:cubicBezTo>
+                <a:cubicBezTo>
+                  <a:pt x="6270539" y="-32230"/>
+                  <a:pt x="6313600" y="3064"/>
+                  <a:pt x="6493383" y="0"/>
+                </a:cubicBezTo>
+                <a:cubicBezTo>
+                  <a:pt x="6673166" y="-3064"/>
+                  <a:pt x="6902474" y="-21096"/>
+                  <a:pt x="7045452" y="0"/>
+                </a:cubicBezTo>
+                <a:cubicBezTo>
+                  <a:pt x="7188430" y="21096"/>
+                  <a:pt x="7478162" y="17386"/>
+                  <a:pt x="7702677" y="0"/>
+                </a:cubicBezTo>
+                <a:cubicBezTo>
+                  <a:pt x="7927192" y="-17386"/>
+                  <a:pt x="8295683" y="-35143"/>
+                  <a:pt x="8465058" y="0"/>
+                </a:cubicBezTo>
+                <a:cubicBezTo>
+                  <a:pt x="8634433" y="35143"/>
+                  <a:pt x="8927835" y="4103"/>
+                  <a:pt x="9227439" y="0"/>
+                </a:cubicBezTo>
+                <a:cubicBezTo>
+                  <a:pt x="9527043" y="-4103"/>
+                  <a:pt x="10105355" y="-17535"/>
+                  <a:pt x="10515600" y="0"/>
+                </a:cubicBezTo>
+                <a:cubicBezTo>
+                  <a:pt x="10515789" y="12323"/>
+                  <a:pt x="10515633" y="14639"/>
+                  <a:pt x="10515600" y="27432"/>
+                </a:cubicBezTo>
+                <a:cubicBezTo>
+                  <a:pt x="10343646" y="15282"/>
+                  <a:pt x="10223667" y="31057"/>
+                  <a:pt x="10068687" y="27432"/>
+                </a:cubicBezTo>
+                <a:cubicBezTo>
+                  <a:pt x="9913707" y="23807"/>
+                  <a:pt x="9512455" y="4101"/>
+                  <a:pt x="9201150" y="27432"/>
+                </a:cubicBezTo>
+                <a:cubicBezTo>
+                  <a:pt x="8889845" y="50763"/>
+                  <a:pt x="8866277" y="3158"/>
+                  <a:pt x="8543925" y="27432"/>
+                </a:cubicBezTo>
+                <a:cubicBezTo>
+                  <a:pt x="8221573" y="51706"/>
+                  <a:pt x="8288348" y="37286"/>
+                  <a:pt x="8202168" y="27432"/>
+                </a:cubicBezTo>
+                <a:cubicBezTo>
+                  <a:pt x="8115988" y="17578"/>
+                  <a:pt x="7797033" y="6631"/>
+                  <a:pt x="7544943" y="27432"/>
+                </a:cubicBezTo>
+                <a:cubicBezTo>
+                  <a:pt x="7292854" y="48233"/>
+                  <a:pt x="7108060" y="41767"/>
+                  <a:pt x="6992874" y="27432"/>
+                </a:cubicBezTo>
+                <a:cubicBezTo>
+                  <a:pt x="6877688" y="13097"/>
+                  <a:pt x="6668930" y="7947"/>
+                  <a:pt x="6440805" y="27432"/>
+                </a:cubicBezTo>
+                <a:cubicBezTo>
+                  <a:pt x="6212680" y="46917"/>
+                  <a:pt x="6027476" y="35225"/>
+                  <a:pt x="5888736" y="27432"/>
+                </a:cubicBezTo>
+                <a:cubicBezTo>
+                  <a:pt x="5749996" y="19639"/>
+                  <a:pt x="5574559" y="43627"/>
+                  <a:pt x="5336667" y="27432"/>
+                </a:cubicBezTo>
+                <a:cubicBezTo>
+                  <a:pt x="5098775" y="11237"/>
+                  <a:pt x="4837534" y="41882"/>
+                  <a:pt x="4574286" y="27432"/>
+                </a:cubicBezTo>
+                <a:cubicBezTo>
+                  <a:pt x="4311038" y="12982"/>
+                  <a:pt x="4126419" y="26678"/>
+                  <a:pt x="3917061" y="27432"/>
+                </a:cubicBezTo>
+                <a:cubicBezTo>
+                  <a:pt x="3707704" y="28186"/>
+                  <a:pt x="3657291" y="40087"/>
+                  <a:pt x="3575304" y="27432"/>
+                </a:cubicBezTo>
+                <a:cubicBezTo>
+                  <a:pt x="3493317" y="14777"/>
+                  <a:pt x="3185226" y="45867"/>
+                  <a:pt x="3023235" y="27432"/>
+                </a:cubicBezTo>
+                <a:cubicBezTo>
+                  <a:pt x="2861244" y="8997"/>
+                  <a:pt x="2597085" y="35801"/>
+                  <a:pt x="2260854" y="27432"/>
+                </a:cubicBezTo>
+                <a:cubicBezTo>
+                  <a:pt x="1924623" y="19063"/>
+                  <a:pt x="1996678" y="15705"/>
+                  <a:pt x="1813941" y="27432"/>
+                </a:cubicBezTo>
+                <a:cubicBezTo>
+                  <a:pt x="1631204" y="39159"/>
+                  <a:pt x="1187542" y="49167"/>
+                  <a:pt x="946404" y="27432"/>
+                </a:cubicBezTo>
+                <a:cubicBezTo>
+                  <a:pt x="705266" y="5697"/>
+                  <a:pt x="404743" y="28229"/>
+                  <a:pt x="0" y="27432"/>
+                </a:cubicBezTo>
+                <a:cubicBezTo>
+                  <a:pt x="244" y="15297"/>
+                  <a:pt x="645" y="7129"/>
+                  <a:pt x="0" y="0"/>
+                </a:cubicBezTo>
+                <a:close/>
+              </a:path>
+              <a:path w="10515600" h="27432" stroke="0" extrusionOk="0">
+                <a:moveTo>
+                  <a:pt x="0" y="0"/>
+                </a:moveTo>
+                <a:cubicBezTo>
+                  <a:pt x="230793" y="14353"/>
+                  <a:pt x="332416" y="21392"/>
+                  <a:pt x="552069" y="0"/>
+                </a:cubicBezTo>
+                <a:cubicBezTo>
+                  <a:pt x="771722" y="-21392"/>
+                  <a:pt x="761737" y="-14337"/>
+                  <a:pt x="893826" y="0"/>
+                </a:cubicBezTo>
+                <a:cubicBezTo>
+                  <a:pt x="1025915" y="14337"/>
+                  <a:pt x="1441584" y="-15498"/>
+                  <a:pt x="1761363" y="0"/>
+                </a:cubicBezTo>
+                <a:cubicBezTo>
+                  <a:pt x="2081142" y="15498"/>
+                  <a:pt x="2111503" y="7278"/>
+                  <a:pt x="2313432" y="0"/>
+                </a:cubicBezTo>
+                <a:cubicBezTo>
+                  <a:pt x="2515361" y="-7278"/>
+                  <a:pt x="2743584" y="-17845"/>
+                  <a:pt x="2865501" y="0"/>
+                </a:cubicBezTo>
+                <a:cubicBezTo>
+                  <a:pt x="2987418" y="17845"/>
+                  <a:pt x="3345183" y="8208"/>
+                  <a:pt x="3733038" y="0"/>
+                </a:cubicBezTo>
+                <a:cubicBezTo>
+                  <a:pt x="4120893" y="-8208"/>
+                  <a:pt x="4009066" y="-3159"/>
+                  <a:pt x="4179951" y="0"/>
+                </a:cubicBezTo>
+                <a:cubicBezTo>
+                  <a:pt x="4350836" y="3159"/>
+                  <a:pt x="4735020" y="17517"/>
+                  <a:pt x="5047488" y="0"/>
+                </a:cubicBezTo>
+                <a:cubicBezTo>
+                  <a:pt x="5359956" y="-17517"/>
+                  <a:pt x="5662148" y="-17777"/>
+                  <a:pt x="5915025" y="0"/>
+                </a:cubicBezTo>
+                <a:cubicBezTo>
+                  <a:pt x="6167902" y="17777"/>
+                  <a:pt x="6308797" y="30350"/>
+                  <a:pt x="6572250" y="0"/>
+                </a:cubicBezTo>
+                <a:cubicBezTo>
+                  <a:pt x="6835703" y="-30350"/>
+                  <a:pt x="7107419" y="-9627"/>
+                  <a:pt x="7439787" y="0"/>
+                </a:cubicBezTo>
+                <a:cubicBezTo>
+                  <a:pt x="7772155" y="9627"/>
+                  <a:pt x="7844034" y="-9098"/>
+                  <a:pt x="7991856" y="0"/>
+                </a:cubicBezTo>
+                <a:cubicBezTo>
+                  <a:pt x="8139678" y="9098"/>
+                  <a:pt x="8289889" y="-20239"/>
+                  <a:pt x="8543925" y="0"/>
+                </a:cubicBezTo>
+                <a:cubicBezTo>
+                  <a:pt x="8797961" y="20239"/>
+                  <a:pt x="8994198" y="29575"/>
+                  <a:pt x="9306306" y="0"/>
+                </a:cubicBezTo>
+                <a:cubicBezTo>
+                  <a:pt x="9618414" y="-29575"/>
+                  <a:pt x="9739118" y="-23835"/>
+                  <a:pt x="9858375" y="0"/>
+                </a:cubicBezTo>
+                <a:cubicBezTo>
+                  <a:pt x="9977632" y="23835"/>
+                  <a:pt x="10370488" y="-4069"/>
+                  <a:pt x="10515600" y="0"/>
+                </a:cubicBezTo>
+                <a:cubicBezTo>
+                  <a:pt x="10515650" y="5798"/>
+                  <a:pt x="10515903" y="19375"/>
+                  <a:pt x="10515600" y="27432"/>
+                </a:cubicBezTo>
+                <a:cubicBezTo>
+                  <a:pt x="10304538" y="42307"/>
+                  <a:pt x="10069280" y="3335"/>
+                  <a:pt x="9753219" y="27432"/>
+                </a:cubicBezTo>
+                <a:cubicBezTo>
+                  <a:pt x="9437158" y="51529"/>
+                  <a:pt x="9488415" y="23852"/>
+                  <a:pt x="9411462" y="27432"/>
+                </a:cubicBezTo>
+                <a:cubicBezTo>
+                  <a:pt x="9334509" y="31012"/>
+                  <a:pt x="9183755" y="44107"/>
+                  <a:pt x="8964549" y="27432"/>
+                </a:cubicBezTo>
+                <a:cubicBezTo>
+                  <a:pt x="8745343" y="10757"/>
+                  <a:pt x="8279150" y="61693"/>
+                  <a:pt x="8097012" y="27432"/>
+                </a:cubicBezTo>
+                <a:cubicBezTo>
+                  <a:pt x="7914874" y="-6829"/>
+                  <a:pt x="7608717" y="59556"/>
+                  <a:pt x="7439787" y="27432"/>
+                </a:cubicBezTo>
+                <a:cubicBezTo>
+                  <a:pt x="7270858" y="-4692"/>
+                  <a:pt x="7154492" y="27026"/>
+                  <a:pt x="6992874" y="27432"/>
+                </a:cubicBezTo>
+                <a:cubicBezTo>
+                  <a:pt x="6831256" y="27838"/>
+                  <a:pt x="6536817" y="51174"/>
+                  <a:pt x="6335649" y="27432"/>
+                </a:cubicBezTo>
+                <a:cubicBezTo>
+                  <a:pt x="6134481" y="3690"/>
+                  <a:pt x="6097824" y="11070"/>
+                  <a:pt x="5993892" y="27432"/>
+                </a:cubicBezTo>
+                <a:cubicBezTo>
+                  <a:pt x="5889960" y="43794"/>
+                  <a:pt x="5793821" y="34098"/>
+                  <a:pt x="5652135" y="27432"/>
+                </a:cubicBezTo>
+                <a:cubicBezTo>
+                  <a:pt x="5510449" y="20766"/>
+                  <a:pt x="5168382" y="-3650"/>
+                  <a:pt x="4994910" y="27432"/>
+                </a:cubicBezTo>
+                <a:cubicBezTo>
+                  <a:pt x="4821439" y="58514"/>
+                  <a:pt x="4653937" y="21362"/>
+                  <a:pt x="4547997" y="27432"/>
+                </a:cubicBezTo>
+                <a:cubicBezTo>
+                  <a:pt x="4442057" y="33502"/>
+                  <a:pt x="4153363" y="33024"/>
+                  <a:pt x="3785616" y="27432"/>
+                </a:cubicBezTo>
+                <a:cubicBezTo>
+                  <a:pt x="3417869" y="21840"/>
+                  <a:pt x="3544908" y="29840"/>
+                  <a:pt x="3338703" y="27432"/>
+                </a:cubicBezTo>
+                <a:cubicBezTo>
+                  <a:pt x="3132498" y="25024"/>
+                  <a:pt x="2782152" y="45947"/>
+                  <a:pt x="2576322" y="27432"/>
+                </a:cubicBezTo>
+                <a:cubicBezTo>
+                  <a:pt x="2370492" y="8917"/>
+                  <a:pt x="2347214" y="14129"/>
+                  <a:pt x="2234565" y="27432"/>
+                </a:cubicBezTo>
+                <a:cubicBezTo>
+                  <a:pt x="2121916" y="40735"/>
+                  <a:pt x="1785921" y="49081"/>
+                  <a:pt x="1472184" y="27432"/>
+                </a:cubicBezTo>
+                <a:cubicBezTo>
+                  <a:pt x="1158447" y="5783"/>
+                  <a:pt x="1203910" y="37937"/>
+                  <a:pt x="1025271" y="27432"/>
+                </a:cubicBezTo>
+                <a:cubicBezTo>
+                  <a:pt x="846632" y="16927"/>
+                  <a:pt x="846577" y="17996"/>
+                  <a:pt x="683514" y="27432"/>
+                </a:cubicBezTo>
+                <a:cubicBezTo>
+                  <a:pt x="520451" y="36868"/>
+                  <a:pt x="320799" y="46677"/>
+                  <a:pt x="0" y="27432"/>
+                </a:cubicBezTo>
+                <a:cubicBezTo>
+                  <a:pt x="-510" y="19859"/>
+                  <a:pt x="-1106" y="11474"/>
+                  <a:pt x="0" y="0"/>
+                </a:cubicBezTo>
+                <a:close/>
+              </a:path>
+            </a:pathLst>
+          </a:custGeom>
+          <a:solidFill>
+            <a:schemeClr val="tx1"/>
+          </a:solidFill>
+          <a:ln w="38100" cap="rnd">
+            <a:solidFill>
+              <a:schemeClr val="tx1"/>
+            </a:solidFill>
+            <a:round/>
+            <a:extLst>
+              <a:ext uri="{C807C97D-BFC1-408E-A445-0C87EB9F89A2}">
+                <ask:lineSketchStyleProps xmlns:ask="http://schemas.microsoft.com/office/drawing/2018/sketchyshapes" sd="1219033472">
+                  <a:prstGeom prst="rect">
+                    <a:avLst/>
+                  </a:prstGeom>
+                  <ask:type>
+                    <ask:lineSketchFreehand/>
+                  </ask:type>
+                </ask:lineSketchStyleProps>
+              </a:ext>
+            </a:extLst>
+          </a:ln>
+        </p:spPr>
+        <p:style>
+          <a:lnRef idx="2">
+            <a:schemeClr val="accent1">
+              <a:shade val="50000"/>
+            </a:schemeClr>
+          </a:lnRef>
+          <a:fillRef idx="1">
+            <a:schemeClr val="accent1"/>
+          </a:fillRef>
+          <a:effectRef idx="0">
+            <a:schemeClr val="accent1"/>
+          </a:effectRef>
+          <a:fontRef idx="minor">
+            <a:schemeClr val="lt1"/>
+          </a:fontRef>
+        </p:style>
+        <p:txBody>
+          <a:bodyPr rtlCol="0" anchor="ctr"/>
+          <a:lstStyle/>
+          <a:p>
+            <a:pPr algn="ctr"/>
+            <a:endParaRPr lang="en-US">
+              <a:solidFill>
+                <a:schemeClr val="tx1"/>
+              </a:solidFill>
+            </a:endParaRPr>
+          </a:p>
+        </p:txBody>
+      </p:sp>
+      <p:sp useBgFill="1">
+        <p:nvSpPr>
+          <p:cNvPr id="43" name="Rectangle 42">
+            <a:extLst>
+              <a:ext uri="{FF2B5EF4-FFF2-40B4-BE49-F238E27FC236}">
+                <a16:creationId xmlns:a16="http://schemas.microsoft.com/office/drawing/2014/main" id="{71429BEC-642E-86CF-23CE-9803A655F08B}"/>
+              </a:ext>
+              <a:ext uri="{C183D7F6-B498-43B3-948B-1728B52AA6E4}">
+                <adec:decorative xmlns:adec="http://schemas.microsoft.com/office/drawing/2017/decorative" val="1"/>
+              </a:ext>
+            </a:extLst>
+          </p:cNvPr>
+          <p:cNvSpPr>
+            <a:spLocks noGrp="1" noRot="1" noChangeAspect="1" noMove="1" noResize="1" noEditPoints="1" noAdjustHandles="1" noChangeArrowheads="1" noChangeShapeType="1" noTextEdit="1"/>
+          </p:cNvSpPr>
+          <p:nvPr>
+            <p:extLst>
+              <p:ext uri="{386F3935-93C4-4BCD-93E2-E3B085C9AB24}">
+                <p16:designElem xmlns:p16="http://schemas.microsoft.com/office/powerpoint/2015/main" val="1"/>
+              </p:ext>
+            </p:extLst>
+          </p:nvPr>
+        </p:nvSpPr>
+        <p:spPr>
+          <a:xfrm>
+            <a:off x="0" y="0"/>
+            <a:ext cx="12188952" cy="6858000"/>
+          </a:xfrm>
+          <a:prstGeom prst="rect">
+            <a:avLst/>
+          </a:prstGeom>
+          <a:ln>
+            <a:noFill/>
+          </a:ln>
+        </p:spPr>
+        <p:style>
+          <a:lnRef idx="2">
+            <a:schemeClr val="accent1">
+              <a:shade val="50000"/>
+            </a:schemeClr>
+          </a:lnRef>
+          <a:fillRef idx="1">
+            <a:schemeClr val="accent1"/>
+          </a:fillRef>
+          <a:effectRef idx="0">
+            <a:schemeClr val="accent1"/>
+          </a:effectRef>
+          <a:fontRef idx="minor">
+            <a:schemeClr val="lt1"/>
+          </a:fontRef>
+        </p:style>
+        <p:txBody>
+          <a:bodyPr rtlCol="0" anchor="ctr"/>
+          <a:lstStyle/>
+          <a:p>
+            <a:pPr algn="ctr"/>
+            <a:endParaRPr lang="en-US"/>
+          </a:p>
+        </p:txBody>
+      </p:sp>
+      <p:pic>
+        <p:nvPicPr>
+          <p:cNvPr id="7" name="Рисунок 6" descr="Изображение выглядит как дерево, пейзаж&#10;&#10;Содержимое, созданное искусственным интеллектом, может быть неверным.">
+            <a:extLst>
+              <a:ext uri="{FF2B5EF4-FFF2-40B4-BE49-F238E27FC236}">
+                <a16:creationId xmlns:a16="http://schemas.microsoft.com/office/drawing/2014/main" id="{2DFE8206-02EE-86E5-EA22-D5BAF55C7744}"/>
+              </a:ext>
+            </a:extLst>
+          </p:cNvPr>
+          <p:cNvPicPr>
+            <a:picLocks noGrp="1" noRot="1" noChangeAspect="1" noMove="1" noResize="1" noEditPoints="1" noAdjustHandles="1" noChangeArrowheads="1" noChangeShapeType="1" noCrop="1"/>
+          </p:cNvPicPr>
+          <p:nvPr/>
+        </p:nvPicPr>
+        <p:blipFill>
+          <a:blip r:embed="rId2">
+            <a:alphaModFix amt="40000"/>
+          </a:blip>
+          <a:srcRect b="15730"/>
+          <a:stretch>
+            <a:fillRect/>
+          </a:stretch>
+        </p:blipFill>
+        <p:spPr>
+          <a:xfrm>
+            <a:off x="20" y="10"/>
+            <a:ext cx="12191979" cy="6857990"/>
+          </a:xfrm>
+          <a:prstGeom prst="rect">
+            <a:avLst/>
+          </a:prstGeom>
+        </p:spPr>
+      </p:pic>
+      <p:sp>
+        <p:nvSpPr>
+          <p:cNvPr id="2" name="Заголовок 1">
+            <a:extLst>
+              <a:ext uri="{FF2B5EF4-FFF2-40B4-BE49-F238E27FC236}">
+                <a16:creationId xmlns:a16="http://schemas.microsoft.com/office/drawing/2014/main" id="{DC9A6373-B7EB-4A34-0AF1-FCB653E2DBA4}"/>
+              </a:ext>
+            </a:extLst>
+          </p:cNvPr>
+          <p:cNvSpPr>
+            <a:spLocks noGrp="1"/>
+          </p:cNvSpPr>
+          <p:nvPr>
+            <p:ph type="ctrTitle"/>
+          </p:nvPr>
+        </p:nvSpPr>
+        <p:spPr>
+          <a:xfrm>
+            <a:off x="838200" y="365125"/>
+            <a:ext cx="10515600" cy="1325563"/>
+          </a:xfrm>
+        </p:spPr>
+        <p:txBody>
+          <a:bodyPr vert="horz" lIns="91440" tIns="45720" rIns="91440" bIns="45720" rtlCol="0" anchor="ctr">
+            <a:normAutofit/>
+          </a:bodyPr>
+          <a:lstStyle/>
+          <a:p>
+            <a:r>
+              <a:rPr lang="ru-RU" sz="7200" dirty="0"/>
+              <a:t>А что по данным</a:t>
+            </a:r>
+            <a:r>
+              <a:rPr lang="en-US" sz="7200" dirty="0"/>
+              <a:t>?</a:t>
+            </a:r>
+            <a:r>
+              <a:rPr lang="ru-RU" sz="7200" dirty="0"/>
+              <a:t>…</a:t>
+            </a:r>
+            <a:endParaRPr lang="en-US" sz="7200" dirty="0"/>
+          </a:p>
+        </p:txBody>
+      </p:sp>
+      <p:sp>
+        <p:nvSpPr>
+          <p:cNvPr id="45" name="Rectangle 6">
+            <a:extLst>
+              <a:ext uri="{FF2B5EF4-FFF2-40B4-BE49-F238E27FC236}">
+                <a16:creationId xmlns:a16="http://schemas.microsoft.com/office/drawing/2014/main" id="{61A63B14-C87D-B8D6-B1D6-FE3D3C13F3DA}"/>
+              </a:ext>
+              <a:ext uri="{C183D7F6-B498-43B3-948B-1728B52AA6E4}">
+                <adec:decorative xmlns:adec="http://schemas.microsoft.com/office/drawing/2017/decorative" val="1"/>
+              </a:ext>
+            </a:extLst>
+          </p:cNvPr>
+          <p:cNvSpPr>
+            <a:spLocks noGrp="1" noRot="1" noChangeAspect="1" noMove="1" noResize="1" noEditPoints="1" noAdjustHandles="1" noChangeArrowheads="1" noChangeShapeType="1" noTextEdit="1"/>
+          </p:cNvSpPr>
+          <p:nvPr>
+            <p:extLst>
+              <p:ext uri="{386F3935-93C4-4BCD-93E2-E3B085C9AB24}">
+                <p16:designElem xmlns:p16="http://schemas.microsoft.com/office/powerpoint/2015/main" val="1"/>
+              </p:ext>
+            </p:extLst>
+          </p:nvPr>
+        </p:nvSpPr>
+        <p:spPr>
+          <a:xfrm>
+            <a:off x="765578" y="1802192"/>
+            <a:ext cx="10853928" cy="18288"/>
+          </a:xfrm>
+          <a:custGeom>
+            <a:avLst/>
+            <a:gdLst>
+              <a:gd name="connsiteX0" fmla="*/ 0 w 10853928"/>
+              <a:gd name="connsiteY0" fmla="*/ 0 h 18288"/>
+              <a:gd name="connsiteX1" fmla="*/ 461292 w 10853928"/>
+              <a:gd name="connsiteY1" fmla="*/ 0 h 18288"/>
+              <a:gd name="connsiteX2" fmla="*/ 1139662 w 10853928"/>
+              <a:gd name="connsiteY2" fmla="*/ 0 h 18288"/>
+              <a:gd name="connsiteX3" fmla="*/ 1926572 w 10853928"/>
+              <a:gd name="connsiteY3" fmla="*/ 0 h 18288"/>
+              <a:gd name="connsiteX4" fmla="*/ 2279325 w 10853928"/>
+              <a:gd name="connsiteY4" fmla="*/ 0 h 18288"/>
+              <a:gd name="connsiteX5" fmla="*/ 2632078 w 10853928"/>
+              <a:gd name="connsiteY5" fmla="*/ 0 h 18288"/>
+              <a:gd name="connsiteX6" fmla="*/ 3527527 w 10853928"/>
+              <a:gd name="connsiteY6" fmla="*/ 0 h 18288"/>
+              <a:gd name="connsiteX7" fmla="*/ 4205897 w 10853928"/>
+              <a:gd name="connsiteY7" fmla="*/ 0 h 18288"/>
+              <a:gd name="connsiteX8" fmla="*/ 4558650 w 10853928"/>
+              <a:gd name="connsiteY8" fmla="*/ 0 h 18288"/>
+              <a:gd name="connsiteX9" fmla="*/ 5237020 w 10853928"/>
+              <a:gd name="connsiteY9" fmla="*/ 0 h 18288"/>
+              <a:gd name="connsiteX10" fmla="*/ 6132469 w 10853928"/>
+              <a:gd name="connsiteY10" fmla="*/ 0 h 18288"/>
+              <a:gd name="connsiteX11" fmla="*/ 6702301 w 10853928"/>
+              <a:gd name="connsiteY11" fmla="*/ 0 h 18288"/>
+              <a:gd name="connsiteX12" fmla="*/ 7272132 w 10853928"/>
+              <a:gd name="connsiteY12" fmla="*/ 0 h 18288"/>
+              <a:gd name="connsiteX13" fmla="*/ 7950502 w 10853928"/>
+              <a:gd name="connsiteY13" fmla="*/ 0 h 18288"/>
+              <a:gd name="connsiteX14" fmla="*/ 8737412 w 10853928"/>
+              <a:gd name="connsiteY14" fmla="*/ 0 h 18288"/>
+              <a:gd name="connsiteX15" fmla="*/ 9524322 w 10853928"/>
+              <a:gd name="connsiteY15" fmla="*/ 0 h 18288"/>
+              <a:gd name="connsiteX16" fmla="*/ 10853928 w 10853928"/>
+              <a:gd name="connsiteY16" fmla="*/ 0 h 18288"/>
+              <a:gd name="connsiteX17" fmla="*/ 10853928 w 10853928"/>
+              <a:gd name="connsiteY17" fmla="*/ 18288 h 18288"/>
+              <a:gd name="connsiteX18" fmla="*/ 10392636 w 10853928"/>
+              <a:gd name="connsiteY18" fmla="*/ 18288 h 18288"/>
+              <a:gd name="connsiteX19" fmla="*/ 9497187 w 10853928"/>
+              <a:gd name="connsiteY19" fmla="*/ 18288 h 18288"/>
+              <a:gd name="connsiteX20" fmla="*/ 8818817 w 10853928"/>
+              <a:gd name="connsiteY20" fmla="*/ 18288 h 18288"/>
+              <a:gd name="connsiteX21" fmla="*/ 8466064 w 10853928"/>
+              <a:gd name="connsiteY21" fmla="*/ 18288 h 18288"/>
+              <a:gd name="connsiteX22" fmla="*/ 7787693 w 10853928"/>
+              <a:gd name="connsiteY22" fmla="*/ 18288 h 18288"/>
+              <a:gd name="connsiteX23" fmla="*/ 7217862 w 10853928"/>
+              <a:gd name="connsiteY23" fmla="*/ 18288 h 18288"/>
+              <a:gd name="connsiteX24" fmla="*/ 6648031 w 10853928"/>
+              <a:gd name="connsiteY24" fmla="*/ 18288 h 18288"/>
+              <a:gd name="connsiteX25" fmla="*/ 6078200 w 10853928"/>
+              <a:gd name="connsiteY25" fmla="*/ 18288 h 18288"/>
+              <a:gd name="connsiteX26" fmla="*/ 5508368 w 10853928"/>
+              <a:gd name="connsiteY26" fmla="*/ 18288 h 18288"/>
+              <a:gd name="connsiteX27" fmla="*/ 4721459 w 10853928"/>
+              <a:gd name="connsiteY27" fmla="*/ 18288 h 18288"/>
+              <a:gd name="connsiteX28" fmla="*/ 4043088 w 10853928"/>
+              <a:gd name="connsiteY28" fmla="*/ 18288 h 18288"/>
+              <a:gd name="connsiteX29" fmla="*/ 3690336 w 10853928"/>
+              <a:gd name="connsiteY29" fmla="*/ 18288 h 18288"/>
+              <a:gd name="connsiteX30" fmla="*/ 3120504 w 10853928"/>
+              <a:gd name="connsiteY30" fmla="*/ 18288 h 18288"/>
+              <a:gd name="connsiteX31" fmla="*/ 2333595 w 10853928"/>
+              <a:gd name="connsiteY31" fmla="*/ 18288 h 18288"/>
+              <a:gd name="connsiteX32" fmla="*/ 1872303 w 10853928"/>
+              <a:gd name="connsiteY32" fmla="*/ 18288 h 18288"/>
+              <a:gd name="connsiteX33" fmla="*/ 976854 w 10853928"/>
+              <a:gd name="connsiteY33" fmla="*/ 18288 h 18288"/>
+              <a:gd name="connsiteX34" fmla="*/ 0 w 10853928"/>
+              <a:gd name="connsiteY34" fmla="*/ 18288 h 18288"/>
+              <a:gd name="connsiteX35" fmla="*/ 0 w 10853928"/>
+              <a:gd name="connsiteY35" fmla="*/ 0 h 18288"/>
+            </a:gdLst>
+            <a:ahLst/>
+            <a:cxnLst>
+              <a:cxn ang="0">
+                <a:pos x="connsiteX0" y="connsiteY0"/>
+              </a:cxn>
+              <a:cxn ang="0">
+                <a:pos x="connsiteX1" y="connsiteY1"/>
+              </a:cxn>
+              <a:cxn ang="0">
+                <a:pos x="connsiteX2" y="connsiteY2"/>
+              </a:cxn>
+              <a:cxn ang="0">
+                <a:pos x="connsiteX3" y="connsiteY3"/>
+              </a:cxn>
+              <a:cxn ang="0">
+                <a:pos x="connsiteX4" y="connsiteY4"/>
+              </a:cxn>
+              <a:cxn ang="0">
+                <a:pos x="connsiteX5" y="connsiteY5"/>
+              </a:cxn>
+              <a:cxn ang="0">
+                <a:pos x="connsiteX6" y="connsiteY6"/>
+              </a:cxn>
+              <a:cxn ang="0">
+                <a:pos x="connsiteX7" y="connsiteY7"/>
+              </a:cxn>
+              <a:cxn ang="0">
+                <a:pos x="connsiteX8" y="connsiteY8"/>
+              </a:cxn>
+              <a:cxn ang="0">
+                <a:pos x="connsiteX9" y="connsiteY9"/>
+              </a:cxn>
+              <a:cxn ang="0">
+                <a:pos x="connsiteX10" y="connsiteY10"/>
+              </a:cxn>
+              <a:cxn ang="0">
+                <a:pos x="connsiteX11" y="connsiteY11"/>
+              </a:cxn>
+              <a:cxn ang="0">
+                <a:pos x="connsiteX12" y="connsiteY12"/>
+              </a:cxn>
+              <a:cxn ang="0">
+                <a:pos x="connsiteX13" y="connsiteY13"/>
+              </a:cxn>
+              <a:cxn ang="0">
+                <a:pos x="connsiteX14" y="connsiteY14"/>
+              </a:cxn>
+              <a:cxn ang="0">
+                <a:pos x="connsiteX15" y="connsiteY15"/>
+              </a:cxn>
+              <a:cxn ang="0">
+                <a:pos x="connsiteX16" y="connsiteY16"/>
+              </a:cxn>
+              <a:cxn ang="0">
+                <a:pos x="connsiteX17" y="connsiteY17"/>
+              </a:cxn>
+              <a:cxn ang="0">
+                <a:pos x="connsiteX18" y="connsiteY18"/>
+              </a:cxn>
+              <a:cxn ang="0">
+                <a:pos x="connsiteX19" y="connsiteY19"/>
+              </a:cxn>
+              <a:cxn ang="0">
+                <a:pos x="connsiteX20" y="connsiteY20"/>
+              </a:cxn>
+              <a:cxn ang="0">
+                <a:pos x="connsiteX21" y="connsiteY21"/>
+              </a:cxn>
+              <a:cxn ang="0">
+                <a:pos x="connsiteX22" y="connsiteY22"/>
+              </a:cxn>
+              <a:cxn ang="0">
+                <a:pos x="connsiteX23" y="connsiteY23"/>
+              </a:cxn>
+              <a:cxn ang="0">
+                <a:pos x="connsiteX24" y="connsiteY24"/>
+              </a:cxn>
+              <a:cxn ang="0">
+                <a:pos x="connsiteX25" y="connsiteY25"/>
+              </a:cxn>
+              <a:cxn ang="0">
+                <a:pos x="connsiteX26" y="connsiteY26"/>
+              </a:cxn>
+              <a:cxn ang="0">
+                <a:pos x="connsiteX27" y="connsiteY27"/>
+              </a:cxn>
+              <a:cxn ang="0">
+                <a:pos x="connsiteX28" y="connsiteY28"/>
+              </a:cxn>
+              <a:cxn ang="0">
+                <a:pos x="connsiteX29" y="connsiteY29"/>
+              </a:cxn>
+              <a:cxn ang="0">
+                <a:pos x="connsiteX30" y="connsiteY30"/>
+              </a:cxn>
+              <a:cxn ang="0">
+                <a:pos x="connsiteX31" y="connsiteY31"/>
+              </a:cxn>
+              <a:cxn ang="0">
+                <a:pos x="connsiteX32" y="connsiteY32"/>
+              </a:cxn>
+              <a:cxn ang="0">
+                <a:pos x="connsiteX33" y="connsiteY33"/>
+              </a:cxn>
+              <a:cxn ang="0">
+                <a:pos x="connsiteX34" y="connsiteY34"/>
+              </a:cxn>
+              <a:cxn ang="0">
+                <a:pos x="connsiteX35" y="connsiteY35"/>
+              </a:cxn>
+            </a:cxnLst>
+            <a:rect l="l" t="t" r="r" b="b"/>
+            <a:pathLst>
+              <a:path w="10853928" h="18288" fill="none" extrusionOk="0">
+                <a:moveTo>
+                  <a:pt x="0" y="0"/>
+                </a:moveTo>
+                <a:cubicBezTo>
+                  <a:pt x="146993" y="-19076"/>
+                  <a:pt x="347684" y="-4790"/>
+                  <a:pt x="461292" y="0"/>
+                </a:cubicBezTo>
+                <a:cubicBezTo>
+                  <a:pt x="574900" y="4790"/>
+                  <a:pt x="808367" y="19821"/>
+                  <a:pt x="1139662" y="0"/>
+                </a:cubicBezTo>
+                <a:cubicBezTo>
+                  <a:pt x="1470957" y="-19821"/>
+                  <a:pt x="1627405" y="5721"/>
+                  <a:pt x="1926572" y="0"/>
+                </a:cubicBezTo>
+                <a:cubicBezTo>
+                  <a:pt x="2225739" y="-5721"/>
+                  <a:pt x="2137730" y="-3235"/>
+                  <a:pt x="2279325" y="0"/>
+                </a:cubicBezTo>
+                <a:cubicBezTo>
+                  <a:pt x="2420920" y="3235"/>
+                  <a:pt x="2456518" y="9685"/>
+                  <a:pt x="2632078" y="0"/>
+                </a:cubicBezTo>
+                <a:cubicBezTo>
+                  <a:pt x="2807638" y="-9685"/>
+                  <a:pt x="3211516" y="-43007"/>
+                  <a:pt x="3527527" y="0"/>
+                </a:cubicBezTo>
+                <a:cubicBezTo>
+                  <a:pt x="3843538" y="43007"/>
+                  <a:pt x="4058833" y="22042"/>
+                  <a:pt x="4205897" y="0"/>
+                </a:cubicBezTo>
+                <a:cubicBezTo>
+                  <a:pt x="4352961" y="-22042"/>
+                  <a:pt x="4474805" y="-11846"/>
+                  <a:pt x="4558650" y="0"/>
+                </a:cubicBezTo>
+                <a:cubicBezTo>
+                  <a:pt x="4642495" y="11846"/>
+                  <a:pt x="5041928" y="-6069"/>
+                  <a:pt x="5237020" y="0"/>
+                </a:cubicBezTo>
+                <a:cubicBezTo>
+                  <a:pt x="5432112" y="6069"/>
+                  <a:pt x="5943266" y="-17479"/>
+                  <a:pt x="6132469" y="0"/>
+                </a:cubicBezTo>
+                <a:cubicBezTo>
+                  <a:pt x="6321672" y="17479"/>
+                  <a:pt x="6483872" y="26234"/>
+                  <a:pt x="6702301" y="0"/>
+                </a:cubicBezTo>
+                <a:cubicBezTo>
+                  <a:pt x="6920730" y="-26234"/>
+                  <a:pt x="6991194" y="-15156"/>
+                  <a:pt x="7272132" y="0"/>
+                </a:cubicBezTo>
+                <a:cubicBezTo>
+                  <a:pt x="7553070" y="15156"/>
+                  <a:pt x="7684444" y="-32961"/>
+                  <a:pt x="7950502" y="0"/>
+                </a:cubicBezTo>
+                <a:cubicBezTo>
+                  <a:pt x="8216560" y="32961"/>
+                  <a:pt x="8493290" y="-10491"/>
+                  <a:pt x="8737412" y="0"/>
+                </a:cubicBezTo>
+                <a:cubicBezTo>
+                  <a:pt x="8981534" y="10491"/>
+                  <a:pt x="9191586" y="-13899"/>
+                  <a:pt x="9524322" y="0"/>
+                </a:cubicBezTo>
+                <a:cubicBezTo>
+                  <a:pt x="9857058" y="13899"/>
+                  <a:pt x="10297509" y="7485"/>
+                  <a:pt x="10853928" y="0"/>
+                </a:cubicBezTo>
+                <a:cubicBezTo>
+                  <a:pt x="10854574" y="4451"/>
+                  <a:pt x="10854418" y="9226"/>
+                  <a:pt x="10853928" y="18288"/>
+                </a:cubicBezTo>
+                <a:cubicBezTo>
+                  <a:pt x="10691638" y="28522"/>
+                  <a:pt x="10574319" y="29578"/>
+                  <a:pt x="10392636" y="18288"/>
+                </a:cubicBezTo>
+                <a:cubicBezTo>
+                  <a:pt x="10210953" y="6998"/>
+                  <a:pt x="9836277" y="-16742"/>
+                  <a:pt x="9497187" y="18288"/>
+                </a:cubicBezTo>
+                <a:cubicBezTo>
+                  <a:pt x="9158097" y="53318"/>
+                  <a:pt x="9119479" y="30714"/>
+                  <a:pt x="8818817" y="18288"/>
+                </a:cubicBezTo>
+                <a:cubicBezTo>
+                  <a:pt x="8518155" y="5863"/>
+                  <a:pt x="8640037" y="6483"/>
+                  <a:pt x="8466064" y="18288"/>
+                </a:cubicBezTo>
+                <a:cubicBezTo>
+                  <a:pt x="8292091" y="30093"/>
+                  <a:pt x="7997656" y="18914"/>
+                  <a:pt x="7787693" y="18288"/>
+                </a:cubicBezTo>
+                <a:cubicBezTo>
+                  <a:pt x="7577730" y="17662"/>
+                  <a:pt x="7412468" y="21416"/>
+                  <a:pt x="7217862" y="18288"/>
+                </a:cubicBezTo>
+                <a:cubicBezTo>
+                  <a:pt x="7023256" y="15160"/>
+                  <a:pt x="6898018" y="14824"/>
+                  <a:pt x="6648031" y="18288"/>
+                </a:cubicBezTo>
+                <a:cubicBezTo>
+                  <a:pt x="6398044" y="21752"/>
+                  <a:pt x="6254402" y="38625"/>
+                  <a:pt x="6078200" y="18288"/>
+                </a:cubicBezTo>
+                <a:cubicBezTo>
+                  <a:pt x="5901998" y="-2049"/>
+                  <a:pt x="5622886" y="3213"/>
+                  <a:pt x="5508368" y="18288"/>
+                </a:cubicBezTo>
+                <a:cubicBezTo>
+                  <a:pt x="5393850" y="33363"/>
+                  <a:pt x="5036260" y="26830"/>
+                  <a:pt x="4721459" y="18288"/>
+                </a:cubicBezTo>
+                <a:cubicBezTo>
+                  <a:pt x="4406658" y="9746"/>
+                  <a:pt x="4239221" y="41551"/>
+                  <a:pt x="4043088" y="18288"/>
+                </a:cubicBezTo>
+                <a:cubicBezTo>
+                  <a:pt x="3846955" y="-4975"/>
+                  <a:pt x="3818802" y="34658"/>
+                  <a:pt x="3690336" y="18288"/>
+                </a:cubicBezTo>
+                <a:cubicBezTo>
+                  <a:pt x="3561870" y="1918"/>
+                  <a:pt x="3265491" y="42194"/>
+                  <a:pt x="3120504" y="18288"/>
+                </a:cubicBezTo>
+                <a:cubicBezTo>
+                  <a:pt x="2975517" y="-5618"/>
+                  <a:pt x="2720254" y="36673"/>
+                  <a:pt x="2333595" y="18288"/>
+                </a:cubicBezTo>
+                <a:cubicBezTo>
+                  <a:pt x="1946936" y="-97"/>
+                  <a:pt x="2097241" y="5776"/>
+                  <a:pt x="1872303" y="18288"/>
+                </a:cubicBezTo>
+                <a:cubicBezTo>
+                  <a:pt x="1647365" y="30800"/>
+                  <a:pt x="1282708" y="45380"/>
+                  <a:pt x="976854" y="18288"/>
+                </a:cubicBezTo>
+                <a:cubicBezTo>
+                  <a:pt x="671000" y="-8804"/>
+                  <a:pt x="408401" y="-12775"/>
+                  <a:pt x="0" y="18288"/>
+                </a:cubicBezTo>
+                <a:cubicBezTo>
+                  <a:pt x="-213" y="9468"/>
+                  <a:pt x="187" y="4459"/>
+                  <a:pt x="0" y="0"/>
+                </a:cubicBezTo>
+                <a:close/>
+              </a:path>
+              <a:path w="10853928" h="18288" stroke="0" extrusionOk="0">
+                <a:moveTo>
+                  <a:pt x="0" y="0"/>
+                </a:moveTo>
+                <a:cubicBezTo>
+                  <a:pt x="267322" y="15284"/>
+                  <a:pt x="415388" y="-21048"/>
+                  <a:pt x="569831" y="0"/>
+                </a:cubicBezTo>
+                <a:cubicBezTo>
+                  <a:pt x="724274" y="21048"/>
+                  <a:pt x="769333" y="-2353"/>
+                  <a:pt x="922584" y="0"/>
+                </a:cubicBezTo>
+                <a:cubicBezTo>
+                  <a:pt x="1075835" y="2353"/>
+                  <a:pt x="1399490" y="-145"/>
+                  <a:pt x="1818033" y="0"/>
+                </a:cubicBezTo>
+                <a:cubicBezTo>
+                  <a:pt x="2236576" y="145"/>
+                  <a:pt x="2145330" y="5482"/>
+                  <a:pt x="2387864" y="0"/>
+                </a:cubicBezTo>
+                <a:cubicBezTo>
+                  <a:pt x="2630398" y="-5482"/>
+                  <a:pt x="2793207" y="18487"/>
+                  <a:pt x="2957695" y="0"/>
+                </a:cubicBezTo>
+                <a:cubicBezTo>
+                  <a:pt x="3122183" y="-18487"/>
+                  <a:pt x="3579141" y="19003"/>
+                  <a:pt x="3853144" y="0"/>
+                </a:cubicBezTo>
+                <a:cubicBezTo>
+                  <a:pt x="4127147" y="-19003"/>
+                  <a:pt x="4209857" y="12211"/>
+                  <a:pt x="4314436" y="0"/>
+                </a:cubicBezTo>
+                <a:cubicBezTo>
+                  <a:pt x="4419015" y="-12211"/>
+                  <a:pt x="4762459" y="-17220"/>
+                  <a:pt x="5209885" y="0"/>
+                </a:cubicBezTo>
+                <a:cubicBezTo>
+                  <a:pt x="5657311" y="17220"/>
+                  <a:pt x="5692663" y="-3290"/>
+                  <a:pt x="6105335" y="0"/>
+                </a:cubicBezTo>
+                <a:cubicBezTo>
+                  <a:pt x="6518007" y="3290"/>
+                  <a:pt x="6455516" y="-5124"/>
+                  <a:pt x="6783705" y="0"/>
+                </a:cubicBezTo>
+                <a:cubicBezTo>
+                  <a:pt x="7111894" y="5124"/>
+                  <a:pt x="7441941" y="-17829"/>
+                  <a:pt x="7679154" y="0"/>
+                </a:cubicBezTo>
+                <a:cubicBezTo>
+                  <a:pt x="7916367" y="17829"/>
+                  <a:pt x="8102967" y="-24363"/>
+                  <a:pt x="8248985" y="0"/>
+                </a:cubicBezTo>
+                <a:cubicBezTo>
+                  <a:pt x="8395003" y="24363"/>
+                  <a:pt x="8552393" y="25505"/>
+                  <a:pt x="8818817" y="0"/>
+                </a:cubicBezTo>
+                <a:cubicBezTo>
+                  <a:pt x="9085241" y="-25505"/>
+                  <a:pt x="9411308" y="38000"/>
+                  <a:pt x="9605726" y="0"/>
+                </a:cubicBezTo>
+                <a:cubicBezTo>
+                  <a:pt x="9800144" y="-38000"/>
+                  <a:pt x="10006468" y="-25741"/>
+                  <a:pt x="10175558" y="0"/>
+                </a:cubicBezTo>
+                <a:cubicBezTo>
+                  <a:pt x="10344648" y="25741"/>
+                  <a:pt x="10696282" y="695"/>
+                  <a:pt x="10853928" y="0"/>
+                </a:cubicBezTo>
+                <a:cubicBezTo>
+                  <a:pt x="10853521" y="8690"/>
+                  <a:pt x="10853774" y="14141"/>
+                  <a:pt x="10853928" y="18288"/>
+                </a:cubicBezTo>
+                <a:cubicBezTo>
+                  <a:pt x="10608124" y="24255"/>
+                  <a:pt x="10343415" y="22307"/>
+                  <a:pt x="10067018" y="18288"/>
+                </a:cubicBezTo>
+                <a:cubicBezTo>
+                  <a:pt x="9790621" y="14270"/>
+                  <a:pt x="9843266" y="3564"/>
+                  <a:pt x="9714266" y="18288"/>
+                </a:cubicBezTo>
+                <a:cubicBezTo>
+                  <a:pt x="9585266" y="33012"/>
+                  <a:pt x="9379484" y="1875"/>
+                  <a:pt x="9252974" y="18288"/>
+                </a:cubicBezTo>
+                <a:cubicBezTo>
+                  <a:pt x="9126464" y="34701"/>
+                  <a:pt x="8580678" y="-4904"/>
+                  <a:pt x="8357525" y="18288"/>
+                </a:cubicBezTo>
+                <a:cubicBezTo>
+                  <a:pt x="8134372" y="41480"/>
+                  <a:pt x="7903199" y="26458"/>
+                  <a:pt x="7679154" y="18288"/>
+                </a:cubicBezTo>
+                <a:cubicBezTo>
+                  <a:pt x="7455109" y="10118"/>
+                  <a:pt x="7435944" y="27109"/>
+                  <a:pt x="7217862" y="18288"/>
+                </a:cubicBezTo>
+                <a:cubicBezTo>
+                  <a:pt x="6999780" y="9467"/>
+                  <a:pt x="6680409" y="18985"/>
+                  <a:pt x="6539492" y="18288"/>
+                </a:cubicBezTo>
+                <a:cubicBezTo>
+                  <a:pt x="6398575" y="17592"/>
+                  <a:pt x="6312077" y="33018"/>
+                  <a:pt x="6186739" y="18288"/>
+                </a:cubicBezTo>
+                <a:cubicBezTo>
+                  <a:pt x="6061401" y="3558"/>
+                  <a:pt x="5947033" y="12075"/>
+                  <a:pt x="5833986" y="18288"/>
+                </a:cubicBezTo>
+                <a:cubicBezTo>
+                  <a:pt x="5720939" y="24501"/>
+                  <a:pt x="5482226" y="8586"/>
+                  <a:pt x="5155616" y="18288"/>
+                </a:cubicBezTo>
+                <a:cubicBezTo>
+                  <a:pt x="4829006" y="27991"/>
+                  <a:pt x="4841274" y="29316"/>
+                  <a:pt x="4694324" y="18288"/>
+                </a:cubicBezTo>
+                <a:cubicBezTo>
+                  <a:pt x="4547374" y="7260"/>
+                  <a:pt x="4077675" y="7013"/>
+                  <a:pt x="3907414" y="18288"/>
+                </a:cubicBezTo>
+                <a:cubicBezTo>
+                  <a:pt x="3737153" y="29564"/>
+                  <a:pt x="3538393" y="21630"/>
+                  <a:pt x="3446122" y="18288"/>
+                </a:cubicBezTo>
+                <a:cubicBezTo>
+                  <a:pt x="3353851" y="14946"/>
+                  <a:pt x="2990320" y="-8091"/>
+                  <a:pt x="2659212" y="18288"/>
+                </a:cubicBezTo>
+                <a:cubicBezTo>
+                  <a:pt x="2328104" y="44667"/>
+                  <a:pt x="2427653" y="9607"/>
+                  <a:pt x="2306460" y="18288"/>
+                </a:cubicBezTo>
+                <a:cubicBezTo>
+                  <a:pt x="2185267" y="26969"/>
+                  <a:pt x="1719763" y="3717"/>
+                  <a:pt x="1519550" y="18288"/>
+                </a:cubicBezTo>
+                <a:cubicBezTo>
+                  <a:pt x="1319337" y="32860"/>
+                  <a:pt x="1167371" y="17040"/>
+                  <a:pt x="1058258" y="18288"/>
+                </a:cubicBezTo>
+                <a:cubicBezTo>
+                  <a:pt x="949145" y="19536"/>
+                  <a:pt x="780234" y="31447"/>
+                  <a:pt x="705505" y="18288"/>
+                </a:cubicBezTo>
+                <a:cubicBezTo>
+                  <a:pt x="630776" y="5129"/>
+                  <a:pt x="215796" y="30056"/>
+                  <a:pt x="0" y="18288"/>
+                </a:cubicBezTo>
+                <a:cubicBezTo>
+                  <a:pt x="-53" y="11301"/>
+                  <a:pt x="-649" y="7756"/>
+                  <a:pt x="0" y="0"/>
+                </a:cubicBezTo>
+                <a:close/>
+              </a:path>
+            </a:pathLst>
+          </a:custGeom>
+          <a:solidFill>
+            <a:schemeClr val="tx1"/>
+          </a:solidFill>
+          <a:ln w="38100" cap="rnd">
+            <a:solidFill>
+              <a:schemeClr val="tx1"/>
+            </a:solidFill>
+            <a:round/>
+            <a:extLst>
+              <a:ext uri="{C807C97D-BFC1-408E-A445-0C87EB9F89A2}">
+                <ask:lineSketchStyleProps xmlns:ask="http://schemas.microsoft.com/office/drawing/2018/sketchyshapes" sd="1219033472">
+                  <a:prstGeom prst="rect">
+                    <a:avLst/>
+                  </a:prstGeom>
+                  <ask:type>
+                    <ask:lineSketchFreehand/>
+                  </ask:type>
+                </ask:lineSketchStyleProps>
+              </a:ext>
+            </a:extLst>
+          </a:ln>
+        </p:spPr>
+        <p:style>
+          <a:lnRef idx="2">
+            <a:schemeClr val="accent1">
+              <a:shade val="50000"/>
+            </a:schemeClr>
+          </a:lnRef>
+          <a:fillRef idx="1">
+            <a:schemeClr val="accent1"/>
+          </a:fillRef>
+          <a:effectRef idx="0">
+            <a:schemeClr val="accent1"/>
+          </a:effectRef>
+          <a:fontRef idx="minor">
+            <a:schemeClr val="lt1"/>
+          </a:fontRef>
+        </p:style>
+        <p:txBody>
+          <a:bodyPr rtlCol="0" anchor="ctr"/>
+          <a:lstStyle/>
+          <a:p>
+            <a:pPr algn="ctr"/>
+            <a:endParaRPr lang="en-US"/>
+          </a:p>
+        </p:txBody>
+      </p:sp>
+      <p:pic>
+        <p:nvPicPr>
+          <p:cNvPr id="8" name="Рисунок 7">
+            <a:extLst>
+              <a:ext uri="{FF2B5EF4-FFF2-40B4-BE49-F238E27FC236}">
+                <a16:creationId xmlns:a16="http://schemas.microsoft.com/office/drawing/2014/main" id="{3608E9A9-A6CB-9A82-434A-017F47840A60}"/>
+              </a:ext>
+            </a:extLst>
+          </p:cNvPr>
+          <p:cNvPicPr>
+            <a:picLocks noChangeAspect="1"/>
+          </p:cNvPicPr>
+          <p:nvPr/>
+        </p:nvPicPr>
+        <p:blipFill>
+          <a:blip r:embed="rId3"/>
+          <a:srcRect l="1833" r="4697"/>
+          <a:stretch>
+            <a:fillRect/>
+          </a:stretch>
+        </p:blipFill>
+        <p:spPr>
+          <a:xfrm>
+            <a:off x="2477098" y="1811336"/>
+            <a:ext cx="6202776" cy="4289712"/>
+          </a:xfrm>
+          <a:prstGeom prst="rect">
+            <a:avLst/>
+          </a:prstGeom>
+        </p:spPr>
+      </p:pic>
+      <p:pic>
+        <p:nvPicPr>
+          <p:cNvPr id="10" name="Рисунок 9">
+            <a:extLst>
+              <a:ext uri="{FF2B5EF4-FFF2-40B4-BE49-F238E27FC236}">
+                <a16:creationId xmlns:a16="http://schemas.microsoft.com/office/drawing/2014/main" id="{EE0E9BB9-94B4-2B80-DAB4-A6ECF07D6E8D}"/>
+              </a:ext>
+            </a:extLst>
+          </p:cNvPr>
+          <p:cNvPicPr>
+            <a:picLocks noChangeAspect="1"/>
+          </p:cNvPicPr>
+          <p:nvPr/>
+        </p:nvPicPr>
+        <p:blipFill>
+          <a:blip r:embed="rId4">
+            <a:extLst>
+              <a:ext uri="{BEBA8EAE-BF5A-486C-A8C5-ECC9F3942E4B}">
+                <a14:imgProps xmlns:a14="http://schemas.microsoft.com/office/drawing/2010/main">
+                  <a14:imgLayer r:embed="rId5">
+                    <a14:imgEffect>
+                      <a14:colorTemperature colorTemp="4700"/>
+                    </a14:imgEffect>
+                  </a14:imgLayer>
+                </a14:imgProps>
+              </a:ext>
+            </a:extLst>
+          </a:blip>
+          <a:stretch>
+            <a:fillRect/>
+          </a:stretch>
+        </p:blipFill>
+        <p:spPr>
+          <a:xfrm>
+            <a:off x="2477098" y="1829624"/>
+            <a:ext cx="6202776" cy="4241705"/>
+          </a:xfrm>
+          <a:prstGeom prst="rect">
+            <a:avLst/>
+          </a:prstGeom>
+        </p:spPr>
+      </p:pic>
+    </p:spTree>
+    <p:extLst>
+      <p:ext uri="{BB962C8B-B14F-4D97-AF65-F5344CB8AC3E}">
+        <p14:creationId xmlns:p14="http://schemas.microsoft.com/office/powerpoint/2010/main" val="4074091609"/>
+      </p:ext>
+    </p:extLst>
+  </p:cSld>
+  <p:clrMapOvr>
+    <a:overrideClrMapping bg1="dk1" tx1="lt1" bg2="dk2" tx2="lt2" accent1="accent1" accent2="accent2" accent3="accent3" accent4="accent4" accent5="accent5" accent6="accent6" hlink="hlink" folHlink="folHlink"/>
+  </p:clrMapOvr>
+  <p:transition spd="slow"/>
+</p:sld>
+</file>
+
+<file path=ppt/slides/slide6.xml><?xml version="1.0" encoding="utf-8"?>
 <p:sld xmlns:a="http://schemas.openxmlformats.org/drawingml/2006/main" xmlns:r="http://schemas.openxmlformats.org/officeDocument/2006/relationships" xmlns:p="http://schemas.openxmlformats.org/presentationml/2006/main">
   <p:cSld>
     <p:bg>
@@ -13486,4 +15459,319 @@
     </a:ext>
   </a:extLst>
 </a:theme>
+</file>
+
+<file path=ppt/theme/theme2.xml><?xml version="1.0" encoding="utf-8"?>
+<a:theme xmlns:a="http://schemas.openxmlformats.org/drawingml/2006/main" name="Тема Office">
+  <a:themeElements>
+    <a:clrScheme name="Стандартная">
+      <a:dk1>
+        <a:sysClr val="windowText" lastClr="000000"/>
+      </a:dk1>
+      <a:lt1>
+        <a:sysClr val="window" lastClr="FFFFFF"/>
+      </a:lt1>
+      <a:dk2>
+        <a:srgbClr val="0E2841"/>
+      </a:dk2>
+      <a:lt2>
+        <a:srgbClr val="E8E8E8"/>
+      </a:lt2>
+      <a:accent1>
+        <a:srgbClr val="156082"/>
+      </a:accent1>
+      <a:accent2>
+        <a:srgbClr val="E97132"/>
+      </a:accent2>
+      <a:accent3>
+        <a:srgbClr val="196B24"/>
+      </a:accent3>
+      <a:accent4>
+        <a:srgbClr val="0F9ED5"/>
+      </a:accent4>
+      <a:accent5>
+        <a:srgbClr val="A02B93"/>
+      </a:accent5>
+      <a:accent6>
+        <a:srgbClr val="4EA72E"/>
+      </a:accent6>
+      <a:hlink>
+        <a:srgbClr val="467886"/>
+      </a:hlink>
+      <a:folHlink>
+        <a:srgbClr val="96607D"/>
+      </a:folHlink>
+    </a:clrScheme>
+    <a:fontScheme name="Стандартная">
+      <a:majorFont>
+        <a:latin typeface="Aptos Display" panose="02110004020202020204"/>
+        <a:ea typeface=""/>
+        <a:cs typeface=""/>
+        <a:font script="Jpan" typeface="游ゴシック Light"/>
+        <a:font script="Hang" typeface="맑은 고딕"/>
+        <a:font script="Hans" typeface="等线 Light"/>
+        <a:font script="Hant" typeface="新細明體"/>
+        <a:font script="Arab" typeface="Times New Roman"/>
+        <a:font script="Hebr" typeface="Times New Roman"/>
+        <a:font script="Thai" typeface="Angsana New"/>
+        <a:font script="Ethi" typeface="Nyala"/>
+        <a:font script="Beng" typeface="Vrinda"/>
+        <a:font script="Gujr" typeface="Shruti"/>
+        <a:font script="Khmr" typeface="MoolBoran"/>
+        <a:font script="Knda" typeface="Tunga"/>
+        <a:font script="Guru" typeface="Raavi"/>
+        <a:font script="Cans" typeface="Euphemia"/>
+        <a:font script="Cher" typeface="Plantagenet Cherokee"/>
+        <a:font script="Yiii" typeface="Microsoft Yi Baiti"/>
+        <a:font script="Tibt" typeface="Microsoft Himalaya"/>
+        <a:font script="Thaa" typeface="MV Boli"/>
+        <a:font script="Deva" typeface="Mangal"/>
+        <a:font script="Telu" typeface="Gautami"/>
+        <a:font script="Taml" typeface="Latha"/>
+        <a:font script="Syrc" typeface="Estrangelo Edessa"/>
+        <a:font script="Orya" typeface="Kalinga"/>
+        <a:font script="Mlym" typeface="Kartika"/>
+        <a:font script="Laoo" typeface="DokChampa"/>
+        <a:font script="Sinh" typeface="Iskoola Pota"/>
+        <a:font script="Mong" typeface="Mongolian Baiti"/>
+        <a:font script="Viet" typeface="Times New Roman"/>
+        <a:font script="Uigh" typeface="Microsoft Uighur"/>
+        <a:font script="Geor" typeface="Sylfaen"/>
+        <a:font script="Armn" typeface="Arial"/>
+        <a:font script="Bugi" typeface="Leelawadee UI"/>
+        <a:font script="Bopo" typeface="Microsoft JhengHei"/>
+        <a:font script="Java" typeface="Javanese Text"/>
+        <a:font script="Lisu" typeface="Segoe UI"/>
+        <a:font script="Mymr" typeface="Myanmar Text"/>
+        <a:font script="Nkoo" typeface="Ebrima"/>
+        <a:font script="Olck" typeface="Nirmala UI"/>
+        <a:font script="Osma" typeface="Ebrima"/>
+        <a:font script="Phag" typeface="Phagspa"/>
+        <a:font script="Syrn" typeface="Estrangelo Edessa"/>
+        <a:font script="Syrj" typeface="Estrangelo Edessa"/>
+        <a:font script="Syre" typeface="Estrangelo Edessa"/>
+        <a:font script="Sora" typeface="Nirmala UI"/>
+        <a:font script="Tale" typeface="Microsoft Tai Le"/>
+        <a:font script="Talu" typeface="Microsoft New Tai Lue"/>
+        <a:font script="Tfng" typeface="Ebrima"/>
+      </a:majorFont>
+      <a:minorFont>
+        <a:latin typeface="Aptos" panose="02110004020202020204"/>
+        <a:ea typeface=""/>
+        <a:cs typeface=""/>
+        <a:font script="Jpan" typeface="游ゴシック"/>
+        <a:font script="Hang" typeface="맑은 고딕"/>
+        <a:font script="Hans" typeface="等线"/>
+        <a:font script="Hant" typeface="新細明體"/>
+        <a:font script="Arab" typeface="Arial"/>
+        <a:font script="Hebr" typeface="Arial"/>
+        <a:font script="Thai" typeface="Cordia New"/>
+        <a:font script="Ethi" typeface="Nyala"/>
+        <a:font script="Beng" typeface="Vrinda"/>
+        <a:font script="Gujr" typeface="Shruti"/>
+        <a:font script="Khmr" typeface="DaunPenh"/>
+        <a:font script="Knda" typeface="Tunga"/>
+        <a:font script="Guru" typeface="Raavi"/>
+        <a:font script="Cans" typeface="Euphemia"/>
+        <a:font script="Cher" typeface="Plantagenet Cherokee"/>
+        <a:font script="Yiii" typeface="Microsoft Yi Baiti"/>
+        <a:font script="Tibt" typeface="Microsoft Himalaya"/>
+        <a:font script="Thaa" typeface="MV Boli"/>
+        <a:font script="Deva" typeface="Mangal"/>
+        <a:font script="Telu" typeface="Gautami"/>
+        <a:font script="Taml" typeface="Latha"/>
+        <a:font script="Syrc" typeface="Estrangelo Edessa"/>
+        <a:font script="Orya" typeface="Kalinga"/>
+        <a:font script="Mlym" typeface="Kartika"/>
+        <a:font script="Laoo" typeface="DokChampa"/>
+        <a:font script="Sinh" typeface="Iskoola Pota"/>
+        <a:font script="Mong" typeface="Mongolian Baiti"/>
+        <a:font script="Viet" typeface="Arial"/>
+        <a:font script="Uigh" typeface="Microsoft Uighur"/>
+        <a:font script="Geor" typeface="Sylfaen"/>
+        <a:font script="Armn" typeface="Arial"/>
+        <a:font script="Bugi" typeface="Leelawadee UI"/>
+        <a:font script="Bopo" typeface="Microsoft JhengHei"/>
+        <a:font script="Java" typeface="Javanese Text"/>
+        <a:font script="Lisu" typeface="Segoe UI"/>
+        <a:font script="Mymr" typeface="Myanmar Text"/>
+        <a:font script="Nkoo" typeface="Ebrima"/>
+        <a:font script="Olck" typeface="Nirmala UI"/>
+        <a:font script="Osma" typeface="Ebrima"/>
+        <a:font script="Phag" typeface="Phagspa"/>
+        <a:font script="Syrn" typeface="Estrangelo Edessa"/>
+        <a:font script="Syrj" typeface="Estrangelo Edessa"/>
+        <a:font script="Syre" typeface="Estrangelo Edessa"/>
+        <a:font script="Sora" typeface="Nirmala UI"/>
+        <a:font script="Tale" typeface="Microsoft Tai Le"/>
+        <a:font script="Talu" typeface="Microsoft New Tai Lue"/>
+        <a:font script="Tfng" typeface="Ebrima"/>
+      </a:minorFont>
+    </a:fontScheme>
+    <a:fmtScheme name="Стандартная">
+      <a:fillStyleLst>
+        <a:solidFill>
+          <a:schemeClr val="phClr"/>
+        </a:solidFill>
+        <a:gradFill rotWithShape="1">
+          <a:gsLst>
+            <a:gs pos="0">
+              <a:schemeClr val="phClr">
+                <a:lumMod val="110000"/>
+                <a:satMod val="105000"/>
+                <a:tint val="67000"/>
+              </a:schemeClr>
+            </a:gs>
+            <a:gs pos="50000">
+              <a:schemeClr val="phClr">
+                <a:lumMod val="105000"/>
+                <a:satMod val="103000"/>
+                <a:tint val="73000"/>
+              </a:schemeClr>
+            </a:gs>
+            <a:gs pos="100000">
+              <a:schemeClr val="phClr">
+                <a:lumMod val="105000"/>
+                <a:satMod val="109000"/>
+                <a:tint val="81000"/>
+              </a:schemeClr>
+            </a:gs>
+          </a:gsLst>
+          <a:lin ang="5400000" scaled="0"/>
+        </a:gradFill>
+        <a:gradFill rotWithShape="1">
+          <a:gsLst>
+            <a:gs pos="0">
+              <a:schemeClr val="phClr">
+                <a:satMod val="103000"/>
+                <a:lumMod val="102000"/>
+                <a:tint val="94000"/>
+              </a:schemeClr>
+            </a:gs>
+            <a:gs pos="50000">
+              <a:schemeClr val="phClr">
+                <a:satMod val="110000"/>
+                <a:lumMod val="100000"/>
+                <a:shade val="100000"/>
+              </a:schemeClr>
+            </a:gs>
+            <a:gs pos="100000">
+              <a:schemeClr val="phClr">
+                <a:lumMod val="99000"/>
+                <a:satMod val="120000"/>
+                <a:shade val="78000"/>
+              </a:schemeClr>
+            </a:gs>
+          </a:gsLst>
+          <a:lin ang="5400000" scaled="0"/>
+        </a:gradFill>
+      </a:fillStyleLst>
+      <a:lnStyleLst>
+        <a:ln w="12700" cap="flat" cmpd="sng" algn="ctr">
+          <a:solidFill>
+            <a:schemeClr val="phClr"/>
+          </a:solidFill>
+          <a:prstDash val="solid"/>
+          <a:miter lim="800000"/>
+        </a:ln>
+        <a:ln w="19050" cap="flat" cmpd="sng" algn="ctr">
+          <a:solidFill>
+            <a:schemeClr val="phClr"/>
+          </a:solidFill>
+          <a:prstDash val="solid"/>
+          <a:miter lim="800000"/>
+        </a:ln>
+        <a:ln w="25400" cap="flat" cmpd="sng" algn="ctr">
+          <a:solidFill>
+            <a:schemeClr val="phClr"/>
+          </a:solidFill>
+          <a:prstDash val="solid"/>
+          <a:miter lim="800000"/>
+        </a:ln>
+      </a:lnStyleLst>
+      <a:effectStyleLst>
+        <a:effectStyle>
+          <a:effectLst/>
+        </a:effectStyle>
+        <a:effectStyle>
+          <a:effectLst/>
+        </a:effectStyle>
+        <a:effectStyle>
+          <a:effectLst>
+            <a:outerShdw blurRad="57150" dist="19050" dir="5400000" algn="ctr" rotWithShape="0">
+              <a:srgbClr val="000000">
+                <a:alpha val="63000"/>
+              </a:srgbClr>
+            </a:outerShdw>
+          </a:effectLst>
+        </a:effectStyle>
+      </a:effectStyleLst>
+      <a:bgFillStyleLst>
+        <a:solidFill>
+          <a:schemeClr val="phClr"/>
+        </a:solidFill>
+        <a:solidFill>
+          <a:schemeClr val="phClr">
+            <a:tint val="95000"/>
+            <a:satMod val="170000"/>
+          </a:schemeClr>
+        </a:solidFill>
+        <a:gradFill rotWithShape="1">
+          <a:gsLst>
+            <a:gs pos="0">
+              <a:schemeClr val="phClr">
+                <a:tint val="93000"/>
+                <a:satMod val="150000"/>
+                <a:shade val="98000"/>
+                <a:lumMod val="102000"/>
+              </a:schemeClr>
+            </a:gs>
+            <a:gs pos="50000">
+              <a:schemeClr val="phClr">
+                <a:tint val="98000"/>
+                <a:satMod val="130000"/>
+                <a:shade val="90000"/>
+                <a:lumMod val="103000"/>
+              </a:schemeClr>
+            </a:gs>
+            <a:gs pos="100000">
+              <a:schemeClr val="phClr">
+                <a:shade val="63000"/>
+                <a:satMod val="120000"/>
+              </a:schemeClr>
+            </a:gs>
+          </a:gsLst>
+          <a:lin ang="5400000" scaled="0"/>
+        </a:gradFill>
+      </a:bgFillStyleLst>
+    </a:fmtScheme>
+  </a:themeElements>
+  <a:objectDefaults>
+    <a:lnDef>
+      <a:spPr/>
+      <a:bodyPr/>
+      <a:lstStyle/>
+      <a:style>
+        <a:lnRef idx="2">
+          <a:schemeClr val="accent1"/>
+        </a:lnRef>
+        <a:fillRef idx="0">
+          <a:schemeClr val="accent1"/>
+        </a:fillRef>
+        <a:effectRef idx="1">
+          <a:schemeClr val="accent1"/>
+        </a:effectRef>
+        <a:fontRef idx="minor">
+          <a:schemeClr val="tx1"/>
+        </a:fontRef>
+      </a:style>
+    </a:lnDef>
+  </a:objectDefaults>
+  <a:extraClrSchemeLst/>
+  <a:extLst>
+    <a:ext uri="{05A4C25C-085E-4340-85A3-A5531E510DB2}">
+      <thm15:themeFamily xmlns:thm15="http://schemas.microsoft.com/office/thememl/2012/main" name="Office Theme" id="{2E142A2C-CD16-42D6-873A-C26D2A0506FA}" vid="{1BDDFF52-6CD6-40A5-AB3C-68EB2F1E4D0A}"/>
+    </a:ext>
+  </a:extLst>
+</a:theme>
 </file>
</xml_diff>

<commit_message>
feat: added qr to roadmap
</commit_message>
<xml_diff>
--- a/docs/Oopps! Trap!.pptx
+++ b/docs/Oopps! Trap!.pptx
@@ -112,6 +112,14 @@
       </a:defRPr>
     </a:lvl9pPr>
   </p:defaultTextStyle>
+  <p:extLst>
+    <p:ext uri="{EFAFB233-063F-42B5-8137-9DF3F51BA10A}">
+      <p15:sldGuideLst xmlns:p15="http://schemas.microsoft.com/office/powerpoint/2012/main"/>
+    </p:ext>
+    <p:ext uri="{2D200454-40CA-4A62-9FC3-DE9A4176ACB9}">
+      <p15:notesGuideLst xmlns:p15="http://schemas.microsoft.com/office/powerpoint/2012/main"/>
+    </p:ext>
+  </p:extLst>
 </p:presentation>
 </file>
 
@@ -197,7 +205,7 @@
           <a:p>
             <a:fld id="{6B26FC14-0283-4E9F-B486-5D7D6FD58771}" type="datetimeFigureOut">
               <a:rPr lang="ru-RU" smtClean="0"/>
-              <a:t>09.09.2025</a:t>
+              <a:t>10.09.2025</a:t>
             </a:fld>
             <a:endParaRPr lang="ru-RU"/>
           </a:p>
@@ -1036,7 +1044,7 @@
           <a:p>
             <a:fld id="{72345051-2045-45DA-935E-2E3CA1A69ADC}" type="datetimeFigureOut">
               <a:rPr lang="en-US" smtClean="0"/>
-              <a:t>9/9/2025</a:t>
+              <a:t>9/10/25</a:t>
             </a:fld>
             <a:endParaRPr lang="en-US" dirty="0"/>
           </a:p>
@@ -1235,7 +1243,7 @@
           <a:p>
             <a:fld id="{72345051-2045-45DA-935E-2E3CA1A69ADC}" type="datetimeFigureOut">
               <a:rPr lang="en-US" smtClean="0"/>
-              <a:t>9/9/2025</a:t>
+              <a:t>9/10/25</a:t>
             </a:fld>
             <a:endParaRPr lang="en-US"/>
           </a:p>
@@ -1444,7 +1452,7 @@
           <a:p>
             <a:fld id="{72345051-2045-45DA-935E-2E3CA1A69ADC}" type="datetimeFigureOut">
               <a:rPr lang="en-US" smtClean="0"/>
-              <a:t>9/9/2025</a:t>
+              <a:t>9/10/25</a:t>
             </a:fld>
             <a:endParaRPr lang="en-US"/>
           </a:p>
@@ -1667,7 +1675,7 @@
           <a:p>
             <a:fld id="{72345051-2045-45DA-935E-2E3CA1A69ADC}" type="datetimeFigureOut">
               <a:rPr lang="en-US" smtClean="0"/>
-              <a:t>9/9/2025</a:t>
+              <a:t>9/10/25</a:t>
             </a:fld>
             <a:endParaRPr lang="en-US"/>
           </a:p>
@@ -2579,7 +2587,7 @@
           <a:p>
             <a:fld id="{72345051-2045-45DA-935E-2E3CA1A69ADC}" type="datetimeFigureOut">
               <a:rPr lang="en-US" smtClean="0"/>
-              <a:t>9/9/2025</a:t>
+              <a:t>9/10/25</a:t>
             </a:fld>
             <a:endParaRPr lang="en-US"/>
           </a:p>
@@ -3183,7 +3191,7 @@
           <a:p>
             <a:fld id="{72345051-2045-45DA-935E-2E3CA1A69ADC}" type="datetimeFigureOut">
               <a:rPr lang="en-US" smtClean="0"/>
-              <a:t>9/9/2025</a:t>
+              <a:t>9/10/25</a:t>
             </a:fld>
             <a:endParaRPr lang="en-US"/>
           </a:p>
@@ -4232,7 +4240,7 @@
           <a:p>
             <a:fld id="{72345051-2045-45DA-935E-2E3CA1A69ADC}" type="datetimeFigureOut">
               <a:rPr lang="en-US" smtClean="0"/>
-              <a:t>9/9/2025</a:t>
+              <a:t>9/10/25</a:t>
             </a:fld>
             <a:endParaRPr lang="en-US"/>
           </a:p>
@@ -5017,7 +5025,7 @@
           <a:p>
             <a:fld id="{72345051-2045-45DA-935E-2E3CA1A69ADC}" type="datetimeFigureOut">
               <a:rPr lang="en-US" smtClean="0"/>
-              <a:t>9/9/2025</a:t>
+              <a:t>9/10/25</a:t>
             </a:fld>
             <a:endParaRPr lang="en-US"/>
           </a:p>
@@ -5467,7 +5475,7 @@
           <a:p>
             <a:fld id="{72345051-2045-45DA-935E-2E3CA1A69ADC}" type="datetimeFigureOut">
               <a:rPr lang="en-US" smtClean="0"/>
-              <a:t>9/9/2025</a:t>
+              <a:t>9/10/25</a:t>
             </a:fld>
             <a:endParaRPr lang="en-US"/>
           </a:p>
@@ -5785,7 +5793,7 @@
           <a:p>
             <a:fld id="{72345051-2045-45DA-935E-2E3CA1A69ADC}" type="datetimeFigureOut">
               <a:rPr lang="en-US" smtClean="0"/>
-              <a:t>9/9/2025</a:t>
+              <a:t>9/10/25</a:t>
             </a:fld>
             <a:endParaRPr lang="en-US"/>
           </a:p>
@@ -6414,7 +6422,7 @@
           <a:p>
             <a:fld id="{72345051-2045-45DA-935E-2E3CA1A69ADC}" type="datetimeFigureOut">
               <a:rPr lang="en-US" smtClean="0"/>
-              <a:t>9/9/2025</a:t>
+              <a:t>9/10/25</a:t>
             </a:fld>
             <a:endParaRPr lang="en-US"/>
           </a:p>
@@ -6988,7 +6996,7 @@
           <a:p>
             <a:fld id="{72345051-2045-45DA-935E-2E3CA1A69ADC}" type="datetimeFigureOut">
               <a:rPr lang="en-US" smtClean="0"/>
-              <a:t>9/9/2025</a:t>
+              <a:t>9/10/25</a:t>
             </a:fld>
             <a:endParaRPr lang="en-US" dirty="0"/>
           </a:p>
@@ -15215,7 +15223,7 @@
         </p:nvSpPr>
         <p:spPr>
           <a:xfrm>
-            <a:off x="836676" y="1821655"/>
+            <a:off x="836676" y="626091"/>
             <a:ext cx="10515600" cy="2245423"/>
           </a:xfrm>
         </p:spPr>
@@ -15235,17 +15243,46 @@
             <a:br>
               <a:rPr lang="en-US" sz="7200" dirty="0"/>
             </a:br>
-            <a:r>
-              <a:rPr lang="en-US" sz="7200" dirty="0"/>
-              <a:t>MMM… </a:t>
-            </a:r>
-            <a:r>
-              <a:rPr lang="ru-RU" sz="7200" dirty="0"/>
-              <a:t>Что-то знакомое</a:t>
-            </a:r>
+            <a:endParaRPr lang="ru-RU" sz="7200" dirty="0"/>
           </a:p>
         </p:txBody>
       </p:sp>
+      <p:pic>
+        <p:nvPicPr>
+          <p:cNvPr id="3" name="Picture 2" descr="A qr code with blue squares&#10;&#10;Description automatically generated">
+            <a:extLst>
+              <a:ext uri="{FF2B5EF4-FFF2-40B4-BE49-F238E27FC236}">
+                <a16:creationId xmlns:a16="http://schemas.microsoft.com/office/drawing/2014/main" id="{152FABFB-B3C3-FF40-8C6D-D68780B3F3D3}"/>
+              </a:ext>
+            </a:extLst>
+          </p:cNvPr>
+          <p:cNvPicPr>
+            <a:picLocks noChangeAspect="1"/>
+          </p:cNvPicPr>
+          <p:nvPr/>
+        </p:nvPicPr>
+        <p:blipFill>
+          <a:blip r:embed="rId3">
+            <a:extLst>
+              <a:ext uri="{28A0092B-C50C-407E-A947-70E740481C1C}">
+                <a14:useLocalDpi xmlns:a14="http://schemas.microsoft.com/office/drawing/2010/main" val="0"/>
+              </a:ext>
+            </a:extLst>
+          </a:blip>
+          <a:stretch>
+            <a:fillRect/>
+          </a:stretch>
+        </p:blipFill>
+        <p:spPr>
+          <a:xfrm>
+            <a:off x="3912949" y="2014226"/>
+            <a:ext cx="4366101" cy="4366101"/>
+          </a:xfrm>
+          <a:prstGeom prst="rect">
+            <a:avLst/>
+          </a:prstGeom>
+        </p:spPr>
+      </p:pic>
     </p:spTree>
     <p:extLst>
       <p:ext uri="{BB962C8B-B14F-4D97-AF65-F5344CB8AC3E}">

</xml_diff>